<commit_message>
Adding source for information to EF Core slides
</commit_message>
<xml_diff>
--- a/Courses/Software-Sciences/Module-3-Databases-New/12-Connection-Between-C#-and-Database/12-Connection-Between-C#-and-Database.pptx
+++ b/Courses/Software-Sciences/Module-3-Databases-New/12-Connection-Between-C#-and-Database/12-Connection-Between-C#-and-Database.pptx
@@ -136,7 +136,7 @@
   </p:defaultTextStyle>
   <p:extLst>
     <p:ext uri="{521415D9-36F7-43E2-AB2F-B90AF26B5E84}">
-      <p14:sectionLst xmlns:p14="http://schemas.microsoft.com/office/powerpoint/2010/main" xmlns="">
+      <p14:sectionLst xmlns="" xmlns:p14="http://schemas.microsoft.com/office/powerpoint/2010/main">
         <p14:section name="Въведение" id="{A0C7653D-1924-4F56-9E27-AA2B21F1DA92}">
           <p14:sldIdLst>
             <p14:sldId id="503"/>
@@ -221,7 +221,7 @@
       </p14:sectionLst>
     </p:ext>
     <p:ext uri="{EFAFB233-063F-42B5-8137-9DF3F51BA10A}">
-      <p15:sldGuideLst xmlns:p15="http://schemas.microsoft.com/office/powerpoint/2012/main" xmlns="">
+      <p15:sldGuideLst xmlns="" xmlns:p15="http://schemas.microsoft.com/office/powerpoint/2012/main">
         <p15:guide id="1" orient="horz" pos="2184" userDrawn="1">
           <p15:clr>
             <a:srgbClr val="A4A3A4"/>
@@ -235,7 +235,7 @@
       </p15:sldGuideLst>
     </p:ext>
     <p:ext uri="{2D200454-40CA-4A62-9FC3-DE9A4176ACB9}">
-      <p15:notesGuideLst xmlns:p15="http://schemas.microsoft.com/office/powerpoint/2012/main" xmlns=""/>
+      <p15:notesGuideLst xmlns="" xmlns:p15="http://schemas.microsoft.com/office/powerpoint/2012/main"/>
     </p:ext>
   </p:extLst>
 </p:presentation>
@@ -315,7 +315,7 @@
           <p:cNvPr id="2" name="Header Placeholder 1">
             <a:extLst>
               <a:ext uri="{FF2B5EF4-FFF2-40B4-BE49-F238E27FC236}">
-                <a16:creationId xmlns:a16="http://schemas.microsoft.com/office/drawing/2014/main" xmlns="" id="{56F20103-83CC-4A54-8FDE-9D37FC2629C0}"/>
+                <a16:creationId xmlns="" xmlns:a16="http://schemas.microsoft.com/office/drawing/2014/main" id="{56F20103-83CC-4A54-8FDE-9D37FC2629C0}"/>
               </a:ext>
             </a:extLst>
           </p:cNvPr>
@@ -352,7 +352,7 @@
           <p:cNvPr id="3" name="Date Placeholder 2">
             <a:extLst>
               <a:ext uri="{FF2B5EF4-FFF2-40B4-BE49-F238E27FC236}">
-                <a16:creationId xmlns:a16="http://schemas.microsoft.com/office/drawing/2014/main" xmlns="" id="{27A53962-26EF-44E4-9E69-61B1727AB1C2}"/>
+                <a16:creationId xmlns="" xmlns:a16="http://schemas.microsoft.com/office/drawing/2014/main" id="{27A53962-26EF-44E4-9E69-61B1727AB1C2}"/>
               </a:ext>
             </a:extLst>
           </p:cNvPr>
@@ -394,7 +394,7 @@
           <p:cNvPr id="4" name="Footer Placeholder 3">
             <a:extLst>
               <a:ext uri="{FF2B5EF4-FFF2-40B4-BE49-F238E27FC236}">
-                <a16:creationId xmlns:a16="http://schemas.microsoft.com/office/drawing/2014/main" xmlns="" id="{28A6967E-448F-4887-8FCB-34482EFBCC74}"/>
+                <a16:creationId xmlns="" xmlns:a16="http://schemas.microsoft.com/office/drawing/2014/main" id="{28A6967E-448F-4887-8FCB-34482EFBCC74}"/>
               </a:ext>
             </a:extLst>
           </p:cNvPr>
@@ -444,7 +444,7 @@
           <p:cNvPr id="5" name="Slide Number Placeholder 4">
             <a:extLst>
               <a:ext uri="{FF2B5EF4-FFF2-40B4-BE49-F238E27FC236}">
-                <a16:creationId xmlns:a16="http://schemas.microsoft.com/office/drawing/2014/main" xmlns="" id="{8B6554C2-DDBA-40E2-9536-53A07EC50274}"/>
+                <a16:creationId xmlns="" xmlns:a16="http://schemas.microsoft.com/office/drawing/2014/main" id="{8B6554C2-DDBA-40E2-9536-53A07EC50274}"/>
               </a:ext>
             </a:extLst>
           </p:cNvPr>
@@ -484,7 +484,7 @@
     </p:spTree>
     <p:extLst>
       <p:ext uri="{BB962C8B-B14F-4D97-AF65-F5344CB8AC3E}">
-        <p14:creationId xmlns:p14="http://schemas.microsoft.com/office/powerpoint/2010/main" xmlns="" val="4150602968"/>
+        <p14:creationId xmlns="" xmlns:p14="http://schemas.microsoft.com/office/powerpoint/2010/main" val="4150602968"/>
       </p:ext>
     </p:extLst>
   </p:cSld>
@@ -715,7 +715,7 @@
           <p:cNvPr id="8" name="Footer Placeholder 7">
             <a:extLst>
               <a:ext uri="{FF2B5EF4-FFF2-40B4-BE49-F238E27FC236}">
-                <a16:creationId xmlns:a16="http://schemas.microsoft.com/office/drawing/2014/main" xmlns="" id="{CAC3A49B-3196-44DF-AC28-085C72EFBFF0}"/>
+                <a16:creationId xmlns="" xmlns:a16="http://schemas.microsoft.com/office/drawing/2014/main" id="{CAC3A49B-3196-44DF-AC28-085C72EFBFF0}"/>
               </a:ext>
             </a:extLst>
           </p:cNvPr>
@@ -763,7 +763,7 @@
     </p:spTree>
     <p:extLst>
       <p:ext uri="{BB962C8B-B14F-4D97-AF65-F5344CB8AC3E}">
-        <p14:creationId xmlns:p14="http://schemas.microsoft.com/office/powerpoint/2010/main" xmlns="" val="1530847692"/>
+        <p14:creationId xmlns="" xmlns:p14="http://schemas.microsoft.com/office/powerpoint/2010/main" val="1530847692"/>
       </p:ext>
     </p:extLst>
   </p:cSld>
@@ -910,7 +910,7 @@
           <p:cNvPr id="8" name="Slide Image Placeholder 7">
             <a:extLst>
               <a:ext uri="{FF2B5EF4-FFF2-40B4-BE49-F238E27FC236}">
-                <a16:creationId xmlns:a16="http://schemas.microsoft.com/office/drawing/2014/main" xmlns="" id="{78811095-27E9-49AB-972B-D4E20B3963A6}"/>
+                <a16:creationId xmlns="" xmlns:a16="http://schemas.microsoft.com/office/drawing/2014/main" id="{78811095-27E9-49AB-972B-D4E20B3963A6}"/>
               </a:ext>
             </a:extLst>
           </p:cNvPr>
@@ -928,7 +928,7 @@
           <p:cNvPr id="9" name="Notes Placeholder 8">
             <a:extLst>
               <a:ext uri="{FF2B5EF4-FFF2-40B4-BE49-F238E27FC236}">
-                <a16:creationId xmlns:a16="http://schemas.microsoft.com/office/drawing/2014/main" xmlns="" id="{E923224B-0CC3-475A-8628-8A90751AE61A}"/>
+                <a16:creationId xmlns="" xmlns:a16="http://schemas.microsoft.com/office/drawing/2014/main" id="{E923224B-0CC3-475A-8628-8A90751AE61A}"/>
               </a:ext>
             </a:extLst>
           </p:cNvPr>
@@ -953,7 +953,7 @@
           <p:cNvPr id="2" name="Footer Placeholder 1">
             <a:extLst>
               <a:ext uri="{FF2B5EF4-FFF2-40B4-BE49-F238E27FC236}">
-                <a16:creationId xmlns:a16="http://schemas.microsoft.com/office/drawing/2014/main" xmlns="" id="{3288A3F3-90B1-4930-8D00-5603BDABEF10}"/>
+                <a16:creationId xmlns="" xmlns:a16="http://schemas.microsoft.com/office/drawing/2014/main" id="{3288A3F3-90B1-4930-8D00-5603BDABEF10}"/>
               </a:ext>
             </a:extLst>
           </p:cNvPr>
@@ -989,7 +989,7 @@
     </p:spTree>
     <p:extLst>
       <p:ext uri="{BB962C8B-B14F-4D97-AF65-F5344CB8AC3E}">
-        <p14:creationId xmlns:p14="http://schemas.microsoft.com/office/powerpoint/2010/main" xmlns="" val="2594489433"/>
+        <p14:creationId xmlns="" xmlns:p14="http://schemas.microsoft.com/office/powerpoint/2010/main" val="2594489433"/>
       </p:ext>
     </p:extLst>
   </p:cSld>
@@ -1021,7 +1021,7 @@
           <p:cNvPr id="14" name="Slide Image Placeholder 13">
             <a:extLst>
               <a:ext uri="{FF2B5EF4-FFF2-40B4-BE49-F238E27FC236}">
-                <a16:creationId xmlns:a16="http://schemas.microsoft.com/office/drawing/2014/main" xmlns="" id="{A1F0B3C6-2E53-4CA3-86D1-53D46EC35267}"/>
+                <a16:creationId xmlns="" xmlns:a16="http://schemas.microsoft.com/office/drawing/2014/main" id="{A1F0B3C6-2E53-4CA3-86D1-53D46EC35267}"/>
               </a:ext>
             </a:extLst>
           </p:cNvPr>
@@ -1039,7 +1039,7 @@
           <p:cNvPr id="15" name="Notes Placeholder 14">
             <a:extLst>
               <a:ext uri="{FF2B5EF4-FFF2-40B4-BE49-F238E27FC236}">
-                <a16:creationId xmlns:a16="http://schemas.microsoft.com/office/drawing/2014/main" xmlns="" id="{149CC699-A079-49A5-A4D6-73B7F849A7DC}"/>
+                <a16:creationId xmlns="" xmlns:a16="http://schemas.microsoft.com/office/drawing/2014/main" id="{149CC699-A079-49A5-A4D6-73B7F849A7DC}"/>
               </a:ext>
             </a:extLst>
           </p:cNvPr>
@@ -1064,7 +1064,7 @@
           <p:cNvPr id="19" name="Slide Number Placeholder 5">
             <a:extLst>
               <a:ext uri="{FF2B5EF4-FFF2-40B4-BE49-F238E27FC236}">
-                <a16:creationId xmlns:a16="http://schemas.microsoft.com/office/drawing/2014/main" xmlns="" id="{121F4233-7E9A-40D2-9066-2DB14E2FA5AD}"/>
+                <a16:creationId xmlns="" xmlns:a16="http://schemas.microsoft.com/office/drawing/2014/main" id="{121F4233-7E9A-40D2-9066-2DB14E2FA5AD}"/>
               </a:ext>
             </a:extLst>
           </p:cNvPr>
@@ -1194,7 +1194,7 @@
           <p:cNvPr id="2" name="Footer Placeholder 1">
             <a:extLst>
               <a:ext uri="{FF2B5EF4-FFF2-40B4-BE49-F238E27FC236}">
-                <a16:creationId xmlns:a16="http://schemas.microsoft.com/office/drawing/2014/main" xmlns="" id="{D18F1DFF-B3E7-4ABF-97EE-0BBF3A961EC5}"/>
+                <a16:creationId xmlns="" xmlns:a16="http://schemas.microsoft.com/office/drawing/2014/main" id="{D18F1DFF-B3E7-4ABF-97EE-0BBF3A961EC5}"/>
               </a:ext>
             </a:extLst>
           </p:cNvPr>
@@ -1230,7 +1230,7 @@
     </p:spTree>
     <p:extLst>
       <p:ext uri="{BB962C8B-B14F-4D97-AF65-F5344CB8AC3E}">
-        <p14:creationId xmlns:p14="http://schemas.microsoft.com/office/powerpoint/2010/main" xmlns="" val="4028530743"/>
+        <p14:creationId xmlns="" xmlns:p14="http://schemas.microsoft.com/office/powerpoint/2010/main" val="4028530743"/>
       </p:ext>
     </p:extLst>
   </p:cSld>
@@ -1432,7 +1432,7 @@
           <p:cNvPr id="5" name="Footer Placeholder 7">
             <a:extLst>
               <a:ext uri="{FF2B5EF4-FFF2-40B4-BE49-F238E27FC236}">
-                <a16:creationId xmlns:a16="http://schemas.microsoft.com/office/drawing/2014/main" xmlns="" id="{777168A0-5966-46CD-9728-A9B31A1B0EAA}"/>
+                <a16:creationId xmlns="" xmlns:a16="http://schemas.microsoft.com/office/drawing/2014/main" id="{777168A0-5966-46CD-9728-A9B31A1B0EAA}"/>
               </a:ext>
             </a:extLst>
           </p:cNvPr>
@@ -1480,7 +1480,7 @@
     </p:spTree>
     <p:extLst>
       <p:ext uri="{BB962C8B-B14F-4D97-AF65-F5344CB8AC3E}">
-        <p14:creationId xmlns:p14="http://schemas.microsoft.com/office/powerpoint/2010/main" xmlns="" val="3195930101"/>
+        <p14:creationId xmlns="" xmlns:p14="http://schemas.microsoft.com/office/powerpoint/2010/main" val="3195930101"/>
       </p:ext>
     </p:extLst>
   </p:cSld>
@@ -1543,7 +1543,7 @@
           <p:cNvPr id="7" name="Slide Number Placeholder 5">
             <a:extLst>
               <a:ext uri="{FF2B5EF4-FFF2-40B4-BE49-F238E27FC236}">
-                <a16:creationId xmlns:a16="http://schemas.microsoft.com/office/drawing/2014/main" xmlns="" id="{E65F1CA9-65DC-416B-8882-B3A5E415CE67}"/>
+                <a16:creationId xmlns="" xmlns:a16="http://schemas.microsoft.com/office/drawing/2014/main" id="{E65F1CA9-65DC-416B-8882-B3A5E415CE67}"/>
               </a:ext>
             </a:extLst>
           </p:cNvPr>
@@ -1673,7 +1673,7 @@
           <p:cNvPr id="4" name="Footer Placeholder 3">
             <a:extLst>
               <a:ext uri="{FF2B5EF4-FFF2-40B4-BE49-F238E27FC236}">
-                <a16:creationId xmlns:a16="http://schemas.microsoft.com/office/drawing/2014/main" xmlns="" id="{C5BD11C3-9FCD-4EAE-876D-E766924FAFF2}"/>
+                <a16:creationId xmlns="" xmlns:a16="http://schemas.microsoft.com/office/drawing/2014/main" id="{C5BD11C3-9FCD-4EAE-876D-E766924FAFF2}"/>
               </a:ext>
             </a:extLst>
           </p:cNvPr>
@@ -1709,7 +1709,7 @@
     </p:spTree>
     <p:extLst>
       <p:ext uri="{BB962C8B-B14F-4D97-AF65-F5344CB8AC3E}">
-        <p14:creationId xmlns:p14="http://schemas.microsoft.com/office/powerpoint/2010/main" xmlns="" val="1860974293"/>
+        <p14:creationId xmlns="" xmlns:p14="http://schemas.microsoft.com/office/powerpoint/2010/main" val="1860974293"/>
       </p:ext>
     </p:extLst>
   </p:cSld>
@@ -1794,7 +1794,7 @@
     </p:spTree>
     <p:extLst>
       <p:ext uri="{BB962C8B-B14F-4D97-AF65-F5344CB8AC3E}">
-        <p14:creationId xmlns:p14="http://schemas.microsoft.com/office/powerpoint/2010/main" xmlns="" val="1201445929"/>
+        <p14:creationId xmlns="" xmlns:p14="http://schemas.microsoft.com/office/powerpoint/2010/main" val="1201445929"/>
       </p:ext>
     </p:extLst>
   </p:cSld>
@@ -1857,7 +1857,7 @@
           <p:cNvPr id="6" name="Slide Number Placeholder 5">
             <a:extLst>
               <a:ext uri="{FF2B5EF4-FFF2-40B4-BE49-F238E27FC236}">
-                <a16:creationId xmlns:a16="http://schemas.microsoft.com/office/drawing/2014/main" xmlns="" id="{6627548A-4D3C-449B-81A5-FA4BE4628490}"/>
+                <a16:creationId xmlns="" xmlns:a16="http://schemas.microsoft.com/office/drawing/2014/main" id="{6627548A-4D3C-449B-81A5-FA4BE4628490}"/>
               </a:ext>
             </a:extLst>
           </p:cNvPr>
@@ -1987,7 +1987,7 @@
           <p:cNvPr id="4" name="Footer Placeholder 3">
             <a:extLst>
               <a:ext uri="{FF2B5EF4-FFF2-40B4-BE49-F238E27FC236}">
-                <a16:creationId xmlns:a16="http://schemas.microsoft.com/office/drawing/2014/main" xmlns="" id="{D2472CE7-61C1-4B7B-B0C8-5A45F0178717}"/>
+                <a16:creationId xmlns="" xmlns:a16="http://schemas.microsoft.com/office/drawing/2014/main" id="{D2472CE7-61C1-4B7B-B0C8-5A45F0178717}"/>
               </a:ext>
             </a:extLst>
           </p:cNvPr>
@@ -2023,7 +2023,7 @@
     </p:spTree>
     <p:extLst>
       <p:ext uri="{BB962C8B-B14F-4D97-AF65-F5344CB8AC3E}">
-        <p14:creationId xmlns:p14="http://schemas.microsoft.com/office/powerpoint/2010/main" xmlns="" val="729041308"/>
+        <p14:creationId xmlns="" xmlns:p14="http://schemas.microsoft.com/office/powerpoint/2010/main" val="729041308"/>
       </p:ext>
     </p:extLst>
   </p:cSld>
@@ -2055,7 +2055,7 @@
           <p:cNvPr id="16" name="Rectangle Bottom">
             <a:extLst>
               <a:ext uri="{FF2B5EF4-FFF2-40B4-BE49-F238E27FC236}">
-                <a16:creationId xmlns:a16="http://schemas.microsoft.com/office/drawing/2014/main" xmlns="" id="{6854D183-0374-4B3E-B2CE-32F308A81591}"/>
+                <a16:creationId xmlns="" xmlns:a16="http://schemas.microsoft.com/office/drawing/2014/main" id="{6854D183-0374-4B3E-B2CE-32F308A81591}"/>
               </a:ext>
             </a:extLst>
           </p:cNvPr>
@@ -2136,7 +2136,7 @@
           <p:cNvPr id="14" name="Picture Logo SoftUni" descr="SoftUni logo">
             <a:extLst>
               <a:ext uri="{FF2B5EF4-FFF2-40B4-BE49-F238E27FC236}">
-                <a16:creationId xmlns:a16="http://schemas.microsoft.com/office/drawing/2014/main" xmlns="" id="{C4D6B2A2-DFF0-4712-BFEC-6676BEC99FEC}"/>
+                <a16:creationId xmlns="" xmlns:a16="http://schemas.microsoft.com/office/drawing/2014/main" id="{C4D6B2A2-DFF0-4712-BFEC-6676BEC99FEC}"/>
               </a:ext>
             </a:extLst>
           </p:cNvPr>
@@ -2159,7 +2159,7 @@
             </a:clrChange>
             <a:extLst>
               <a:ext uri="{28A0092B-C50C-407E-A947-70E740481C1C}">
-                <a14:useLocalDpi xmlns:a14="http://schemas.microsoft.com/office/drawing/2010/main" xmlns="" val="0"/>
+                <a14:useLocalDpi xmlns="" xmlns:a14="http://schemas.microsoft.com/office/drawing/2010/main" val="0"/>
               </a:ext>
             </a:extLst>
           </a:blip>
@@ -2182,7 +2182,7 @@
           <p:cNvPr id="31" name="Text Placeholder Company Site">
             <a:extLst>
               <a:ext uri="{FF2B5EF4-FFF2-40B4-BE49-F238E27FC236}">
-                <a16:creationId xmlns:a16="http://schemas.microsoft.com/office/drawing/2014/main" xmlns="" id="{3E6B87B7-9D33-4EBB-BD4F-C0436BA3FD72}"/>
+                <a16:creationId xmlns="" xmlns:a16="http://schemas.microsoft.com/office/drawing/2014/main" id="{3E6B87B7-9D33-4EBB-BD4F-C0436BA3FD72}"/>
               </a:ext>
             </a:extLst>
           </p:cNvPr>
@@ -2244,7 +2244,7 @@
           <p:cNvPr id="30" name="Text Placeholder Company Name">
             <a:extLst>
               <a:ext uri="{FF2B5EF4-FFF2-40B4-BE49-F238E27FC236}">
-                <a16:creationId xmlns:a16="http://schemas.microsoft.com/office/drawing/2014/main" xmlns="" id="{2EA92DCA-4DB5-4D03-ACD3-A6A296592D0C}"/>
+                <a16:creationId xmlns="" xmlns:a16="http://schemas.microsoft.com/office/drawing/2014/main" id="{2EA92DCA-4DB5-4D03-ACD3-A6A296592D0C}"/>
               </a:ext>
             </a:extLst>
           </p:cNvPr>
@@ -2306,7 +2306,7 @@
           <p:cNvPr id="35" name="Picture SoftUni Mascot" descr="SoftUni mascot">
             <a:extLst>
               <a:ext uri="{FF2B5EF4-FFF2-40B4-BE49-F238E27FC236}">
-                <a16:creationId xmlns:a16="http://schemas.microsoft.com/office/drawing/2014/main" xmlns="" id="{951E7DA9-C5F0-43D9-B013-3BDF9EEF029D}"/>
+                <a16:creationId xmlns="" xmlns:a16="http://schemas.microsoft.com/office/drawing/2014/main" id="{951E7DA9-C5F0-43D9-B013-3BDF9EEF029D}"/>
               </a:ext>
             </a:extLst>
           </p:cNvPr>
@@ -2319,7 +2319,7 @@
           <a:blip r:embed="rId3" cstate="print">
             <a:extLst>
               <a:ext uri="{28A0092B-C50C-407E-A947-70E740481C1C}">
-                <a14:useLocalDpi xmlns:a14="http://schemas.microsoft.com/office/drawing/2010/main" xmlns="" val="0"/>
+                <a14:useLocalDpi xmlns="" xmlns:a14="http://schemas.microsoft.com/office/drawing/2010/main" val="0"/>
               </a:ext>
             </a:extLst>
           </a:blip>
@@ -2342,7 +2342,7 @@
             <a:hlinkClick r:id="rId4"/>
             <a:extLst>
               <a:ext uri="{FF2B5EF4-FFF2-40B4-BE49-F238E27FC236}">
-                <a16:creationId xmlns:a16="http://schemas.microsoft.com/office/drawing/2014/main" xmlns="" id="{F2315EB3-3FE4-4D3B-921E-5F209CEC13CB}"/>
+                <a16:creationId xmlns="" xmlns:a16="http://schemas.microsoft.com/office/drawing/2014/main" id="{F2315EB3-3FE4-4D3B-921E-5F209CEC13CB}"/>
               </a:ext>
             </a:extLst>
           </p:cNvPr>
@@ -2365,7 +2365,7 @@
             </a:clrChange>
             <a:extLst>
               <a:ext uri="{28A0092B-C50C-407E-A947-70E740481C1C}">
-                <a14:useLocalDpi xmlns:a14="http://schemas.microsoft.com/office/drawing/2010/main" xmlns="" val="0"/>
+                <a14:useLocalDpi xmlns="" xmlns:a14="http://schemas.microsoft.com/office/drawing/2010/main" val="0"/>
               </a:ext>
             </a:extLst>
           </a:blip>
@@ -2388,7 +2388,7 @@
           <p:cNvPr id="40" name="Text Placeholder Author Position">
             <a:extLst>
               <a:ext uri="{FF2B5EF4-FFF2-40B4-BE49-F238E27FC236}">
-                <a16:creationId xmlns:a16="http://schemas.microsoft.com/office/drawing/2014/main" xmlns="" id="{CD940256-851E-46C8-8BFB-A5ECA6C7DA07}"/>
+                <a16:creationId xmlns="" xmlns:a16="http://schemas.microsoft.com/office/drawing/2014/main" id="{CD940256-851E-46C8-8BFB-A5ECA6C7DA07}"/>
               </a:ext>
             </a:extLst>
           </p:cNvPr>
@@ -2448,7 +2448,7 @@
           <p:cNvPr id="36" name="Text Placeholder Author Name">
             <a:extLst>
               <a:ext uri="{FF2B5EF4-FFF2-40B4-BE49-F238E27FC236}">
-                <a16:creationId xmlns:a16="http://schemas.microsoft.com/office/drawing/2014/main" xmlns="" id="{3B21F47B-DE1F-442D-A2B7-6866F8786704}"/>
+                <a16:creationId xmlns="" xmlns:a16="http://schemas.microsoft.com/office/drawing/2014/main" id="{3B21F47B-DE1F-442D-A2B7-6866F8786704}"/>
               </a:ext>
             </a:extLst>
           </p:cNvPr>
@@ -2508,7 +2508,7 @@
           <p:cNvPr id="33" name="Picture Placeholder Title Image">
             <a:extLst>
               <a:ext uri="{FF2B5EF4-FFF2-40B4-BE49-F238E27FC236}">
-                <a16:creationId xmlns:a16="http://schemas.microsoft.com/office/drawing/2014/main" xmlns="" id="{A04D819A-89E2-4714-8C56-1838BF467EF7}"/>
+                <a16:creationId xmlns="" xmlns:a16="http://schemas.microsoft.com/office/drawing/2014/main" id="{A04D819A-89E2-4714-8C56-1838BF467EF7}"/>
               </a:ext>
             </a:extLst>
           </p:cNvPr>
@@ -2550,7 +2550,7 @@
           <p:cNvPr id="43" name="Presentation Subtitle">
             <a:extLst>
               <a:ext uri="{FF2B5EF4-FFF2-40B4-BE49-F238E27FC236}">
-                <a16:creationId xmlns:a16="http://schemas.microsoft.com/office/drawing/2014/main" xmlns="" id="{37BDB812-1395-4B02-ABCF-6A331EEE23E5}"/>
+                <a16:creationId xmlns="" xmlns:a16="http://schemas.microsoft.com/office/drawing/2014/main" id="{37BDB812-1395-4B02-ABCF-6A331EEE23E5}"/>
               </a:ext>
             </a:extLst>
           </p:cNvPr>
@@ -2594,7 +2594,7 @@
           <p:cNvPr id="2" name="Presentation Title">
             <a:extLst>
               <a:ext uri="{FF2B5EF4-FFF2-40B4-BE49-F238E27FC236}">
-                <a16:creationId xmlns:a16="http://schemas.microsoft.com/office/drawing/2014/main" xmlns="" id="{A4DF3AB8-E6E3-4FCE-8A4A-ECD147720A5D}"/>
+                <a16:creationId xmlns="" xmlns:a16="http://schemas.microsoft.com/office/drawing/2014/main" id="{A4DF3AB8-E6E3-4FCE-8A4A-ECD147720A5D}"/>
               </a:ext>
             </a:extLst>
           </p:cNvPr>
@@ -2629,7 +2629,7 @@
     </p:spTree>
     <p:extLst>
       <p:ext uri="{BB962C8B-B14F-4D97-AF65-F5344CB8AC3E}">
-        <p14:creationId xmlns:p14="http://schemas.microsoft.com/office/powerpoint/2010/main" xmlns="" val="970179299"/>
+        <p14:creationId xmlns="" xmlns:p14="http://schemas.microsoft.com/office/powerpoint/2010/main" val="970179299"/>
       </p:ext>
     </p:extLst>
   </p:cSld>
@@ -2637,7 +2637,7 @@
     <a:masterClrMapping/>
   </p:clrMapOvr>
   <mc:AlternateContent xmlns:mc="http://schemas.openxmlformats.org/markup-compatibility/2006">
-    <mc:Choice xmlns:p14="http://schemas.microsoft.com/office/powerpoint/2010/main" xmlns="" Requires="p14">
+    <mc:Choice xmlns="" xmlns:p14="http://schemas.microsoft.com/office/powerpoint/2010/main" Requires="p14">
       <p:transition spd="slow" p14:dur="2000" advClick="0" advTm="5000"/>
     </mc:Choice>
     <mc:Fallback>
@@ -2646,7 +2646,7 @@
   </mc:AlternateContent>
   <p:extLst>
     <p:ext uri="{DCECCB84-F9BA-43D5-87BE-67443E8EF086}">
-      <p15:sldGuideLst xmlns:p15="http://schemas.microsoft.com/office/powerpoint/2012/main" xmlns="">
+      <p15:sldGuideLst xmlns="" xmlns:p15="http://schemas.microsoft.com/office/powerpoint/2012/main">
         <p15:guide id="1" orient="horz" pos="2160">
           <p15:clr>
             <a:srgbClr val="FBAE40"/>
@@ -2685,7 +2685,7 @@
           <p:cNvPr id="15" name="Slide Number">
             <a:extLst>
               <a:ext uri="{FF2B5EF4-FFF2-40B4-BE49-F238E27FC236}">
-                <a16:creationId xmlns:a16="http://schemas.microsoft.com/office/drawing/2014/main" xmlns="" id="{F888EE71-82B3-40F1-A63F-7417422FB4A4}"/>
+                <a16:creationId xmlns="" xmlns:a16="http://schemas.microsoft.com/office/drawing/2014/main" id="{F888EE71-82B3-40F1-A63F-7417422FB4A4}"/>
               </a:ext>
             </a:extLst>
           </p:cNvPr>
@@ -2727,7 +2727,7 @@
           <p:cNvPr id="14" name="Text Placeholder Body">
             <a:extLst>
               <a:ext uri="{FF2B5EF4-FFF2-40B4-BE49-F238E27FC236}">
-                <a16:creationId xmlns:a16="http://schemas.microsoft.com/office/drawing/2014/main" xmlns="" id="{A2ABE920-240F-4CF6-AD45-23ED489FAD6E}"/>
+                <a16:creationId xmlns="" xmlns:a16="http://schemas.microsoft.com/office/drawing/2014/main" id="{A2ABE920-240F-4CF6-AD45-23ED489FAD6E}"/>
               </a:ext>
             </a:extLst>
           </p:cNvPr>
@@ -3033,7 +3033,7 @@
           <p:cNvPr id="10" name="Rectangle Down">
             <a:extLst>
               <a:ext uri="{FF2B5EF4-FFF2-40B4-BE49-F238E27FC236}">
-                <a16:creationId xmlns:a16="http://schemas.microsoft.com/office/drawing/2014/main" xmlns="" id="{E9B994EC-35A8-4A11-98CB-25DC28852F94}"/>
+                <a16:creationId xmlns="" xmlns:a16="http://schemas.microsoft.com/office/drawing/2014/main" id="{E9B994EC-35A8-4A11-98CB-25DC28852F94}"/>
               </a:ext>
             </a:extLst>
           </p:cNvPr>
@@ -3114,7 +3114,7 @@
           <p:cNvPr id="11" name="Rectangle Top">
             <a:extLst>
               <a:ext uri="{FF2B5EF4-FFF2-40B4-BE49-F238E27FC236}">
-                <a16:creationId xmlns:a16="http://schemas.microsoft.com/office/drawing/2014/main" xmlns="" id="{274B8F05-DFCE-47BD-BAFD-DF93E1A63BDD}"/>
+                <a16:creationId xmlns="" xmlns:a16="http://schemas.microsoft.com/office/drawing/2014/main" id="{274B8F05-DFCE-47BD-BAFD-DF93E1A63BDD}"/>
               </a:ext>
             </a:extLst>
           </p:cNvPr>
@@ -3195,7 +3195,7 @@
           <p:cNvPr id="12" name="Logo Software University" descr="Software University logo">
             <a:extLst>
               <a:ext uri="{FF2B5EF4-FFF2-40B4-BE49-F238E27FC236}">
-                <a16:creationId xmlns:a16="http://schemas.microsoft.com/office/drawing/2014/main" xmlns="" id="{233CBB95-791E-4630-B3D9-FADFCE7BCF52}"/>
+                <a16:creationId xmlns="" xmlns:a16="http://schemas.microsoft.com/office/drawing/2014/main" id="{233CBB95-791E-4630-B3D9-FADFCE7BCF52}"/>
               </a:ext>
             </a:extLst>
           </p:cNvPr>
@@ -3208,7 +3208,7 @@
           <a:blip r:embed="rId2" cstate="print">
             <a:extLst>
               <a:ext uri="{28A0092B-C50C-407E-A947-70E740481C1C}">
-                <a14:useLocalDpi xmlns:a14="http://schemas.microsoft.com/office/drawing/2010/main" xmlns="" val="0"/>
+                <a14:useLocalDpi xmlns="" xmlns:a14="http://schemas.microsoft.com/office/drawing/2010/main" val="0"/>
               </a:ext>
             </a:extLst>
           </a:blip>
@@ -3231,7 +3231,7 @@
           <p:cNvPr id="13" name="Slide Title">
             <a:extLst>
               <a:ext uri="{FF2B5EF4-FFF2-40B4-BE49-F238E27FC236}">
-                <a16:creationId xmlns:a16="http://schemas.microsoft.com/office/drawing/2014/main" xmlns="" id="{3F218E34-55D7-4290-BFE4-80F31F941551}"/>
+                <a16:creationId xmlns="" xmlns:a16="http://schemas.microsoft.com/office/drawing/2014/main" id="{3F218E34-55D7-4290-BFE4-80F31F941551}"/>
               </a:ext>
             </a:extLst>
           </p:cNvPr>
@@ -3270,7 +3270,7 @@
     </p:spTree>
     <p:extLst>
       <p:ext uri="{BB962C8B-B14F-4D97-AF65-F5344CB8AC3E}">
-        <p14:creationId xmlns:p14="http://schemas.microsoft.com/office/powerpoint/2010/main" xmlns="" val="3774019400"/>
+        <p14:creationId xmlns="" xmlns:p14="http://schemas.microsoft.com/office/powerpoint/2010/main" val="3774019400"/>
       </p:ext>
     </p:extLst>
   </p:cSld>
@@ -3278,7 +3278,7 @@
     <a:masterClrMapping/>
   </p:clrMapOvr>
   <mc:AlternateContent xmlns:mc="http://schemas.openxmlformats.org/markup-compatibility/2006">
-    <mc:Choice xmlns:p14="http://schemas.microsoft.com/office/powerpoint/2010/main" xmlns="" Requires="p14">
+    <mc:Choice xmlns="" xmlns:p14="http://schemas.microsoft.com/office/powerpoint/2010/main" Requires="p14">
       <p:transition spd="slow" p14:dur="2000" advClick="0" advTm="5000"/>
     </mc:Choice>
     <mc:Fallback>
@@ -3318,7 +3318,7 @@
           <p:cNvPr id="35" name="Rectangle Bottom">
             <a:extLst>
               <a:ext uri="{FF2B5EF4-FFF2-40B4-BE49-F238E27FC236}">
-                <a16:creationId xmlns:a16="http://schemas.microsoft.com/office/drawing/2014/main" xmlns="" id="{550A59F9-9A9D-4956-95B4-F78CC0DB1D59}"/>
+                <a16:creationId xmlns="" xmlns:a16="http://schemas.microsoft.com/office/drawing/2014/main" id="{550A59F9-9A9D-4956-95B4-F78CC0DB1D59}"/>
               </a:ext>
             </a:extLst>
           </p:cNvPr>
@@ -3399,7 +3399,7 @@
           <p:cNvPr id="53" name="Rectangle Bottom Copyright">
             <a:extLst>
               <a:ext uri="{FF2B5EF4-FFF2-40B4-BE49-F238E27FC236}">
-                <a16:creationId xmlns:a16="http://schemas.microsoft.com/office/drawing/2014/main" xmlns="" id="{B07FB7FB-DA6C-4F5D-B068-357F0FCE27D8}"/>
+                <a16:creationId xmlns="" xmlns:a16="http://schemas.microsoft.com/office/drawing/2014/main" id="{B07FB7FB-DA6C-4F5D-B068-357F0FCE27D8}"/>
               </a:ext>
             </a:extLst>
           </p:cNvPr>
@@ -3456,7 +3456,7 @@
                 <a:hlinkClick r:id="rId2">
                   <a:extLst>
                     <a:ext uri="{A12FA001-AC4F-418D-AE19-62706E023703}">
-                      <ahyp:hlinkClr xmlns:ahyp="http://schemas.microsoft.com/office/drawing/2018/hyperlinkcolor" xmlns="" val="tx"/>
+                      <ahyp:hlinkClr xmlns="" xmlns:ahyp="http://schemas.microsoft.com/office/drawing/2018/hyperlinkcolor" val="tx"/>
                     </a:ext>
                   </a:extLst>
                 </a:hlinkClick>
@@ -3492,7 +3492,7 @@
           <p:cNvPr id="26" name="Picture SoftUni Mascot" descr="SoftUni mascot with open hand">
             <a:extLst>
               <a:ext uri="{FF2B5EF4-FFF2-40B4-BE49-F238E27FC236}">
-                <a16:creationId xmlns:a16="http://schemas.microsoft.com/office/drawing/2014/main" xmlns="" id="{247CFF3C-C4FA-493D-8505-DF469F4D36A4}"/>
+                <a16:creationId xmlns="" xmlns:a16="http://schemas.microsoft.com/office/drawing/2014/main" id="{247CFF3C-C4FA-493D-8505-DF469F4D36A4}"/>
               </a:ext>
             </a:extLst>
           </p:cNvPr>
@@ -3505,7 +3505,7 @@
           <a:blip r:embed="rId3" cstate="print">
             <a:extLst>
               <a:ext uri="{28A0092B-C50C-407E-A947-70E740481C1C}">
-                <a14:useLocalDpi xmlns:a14="http://schemas.microsoft.com/office/drawing/2010/main" xmlns="" val="0"/>
+                <a14:useLocalDpi xmlns="" xmlns:a14="http://schemas.microsoft.com/office/drawing/2010/main" val="0"/>
               </a:ext>
             </a:extLst>
           </a:blip>
@@ -3528,7 +3528,7 @@
           <p:cNvPr id="2" name="Group SoftUni Brands">
             <a:extLst>
               <a:ext uri="{FF2B5EF4-FFF2-40B4-BE49-F238E27FC236}">
-                <a16:creationId xmlns:a16="http://schemas.microsoft.com/office/drawing/2014/main" xmlns="" id="{418FAE34-C1F8-46C7-A4AE-F270D1E70F25}"/>
+                <a16:creationId xmlns="" xmlns:a16="http://schemas.microsoft.com/office/drawing/2014/main" id="{418FAE34-C1F8-46C7-A4AE-F270D1E70F25}"/>
               </a:ext>
             </a:extLst>
           </p:cNvPr>
@@ -3548,7 +3548,7 @@
             <p:cNvPr id="24" name="Picture SoftUni Kids Logo" descr="SoftUni Kids logo">
               <a:extLst>
                 <a:ext uri="{FF2B5EF4-FFF2-40B4-BE49-F238E27FC236}">
-                  <a16:creationId xmlns:a16="http://schemas.microsoft.com/office/drawing/2014/main" xmlns="" id="{B0812936-74B6-4265-8C08-AEDC8C798702}"/>
+                  <a16:creationId xmlns="" xmlns:a16="http://schemas.microsoft.com/office/drawing/2014/main" id="{B0812936-74B6-4265-8C08-AEDC8C798702}"/>
                 </a:ext>
               </a:extLst>
             </p:cNvPr>
@@ -3561,7 +3561,7 @@
             <a:blip r:embed="rId4" cstate="print">
               <a:extLst>
                 <a:ext uri="{28A0092B-C50C-407E-A947-70E740481C1C}">
-                  <a14:useLocalDpi xmlns:a14="http://schemas.microsoft.com/office/drawing/2010/main" xmlns="" val="0"/>
+                  <a14:useLocalDpi xmlns="" xmlns:a14="http://schemas.microsoft.com/office/drawing/2010/main" val="0"/>
                 </a:ext>
               </a:extLst>
             </a:blip>
@@ -3584,7 +3584,7 @@
             <p:cNvPr id="23" name="Picture SoftUni Foundation Logo" descr="SoftUni Foundation logo">
               <a:extLst>
                 <a:ext uri="{FF2B5EF4-FFF2-40B4-BE49-F238E27FC236}">
-                  <a16:creationId xmlns:a16="http://schemas.microsoft.com/office/drawing/2014/main" xmlns="" id="{6643F71A-2013-433A-8322-FBAAED3162D8}"/>
+                  <a16:creationId xmlns="" xmlns:a16="http://schemas.microsoft.com/office/drawing/2014/main" id="{6643F71A-2013-433A-8322-FBAAED3162D8}"/>
                 </a:ext>
               </a:extLst>
             </p:cNvPr>
@@ -3597,7 +3597,7 @@
             <a:blip r:embed="rId5" cstate="print">
               <a:extLst>
                 <a:ext uri="{28A0092B-C50C-407E-A947-70E740481C1C}">
-                  <a14:useLocalDpi xmlns:a14="http://schemas.microsoft.com/office/drawing/2010/main" xmlns="" val="0"/>
+                  <a14:useLocalDpi xmlns="" xmlns:a14="http://schemas.microsoft.com/office/drawing/2010/main" val="0"/>
                 </a:ext>
               </a:extLst>
             </a:blip>
@@ -3620,7 +3620,7 @@
             <p:cNvPr id="22" name="Picture SoftUni Digital Logo" descr="SoftUni Digital logo">
               <a:extLst>
                 <a:ext uri="{FF2B5EF4-FFF2-40B4-BE49-F238E27FC236}">
-                  <a16:creationId xmlns:a16="http://schemas.microsoft.com/office/drawing/2014/main" xmlns="" id="{0A83D66F-855B-463B-920B-BF239B01A206}"/>
+                  <a16:creationId xmlns="" xmlns:a16="http://schemas.microsoft.com/office/drawing/2014/main" id="{0A83D66F-855B-463B-920B-BF239B01A206}"/>
                 </a:ext>
               </a:extLst>
             </p:cNvPr>
@@ -3633,7 +3633,7 @@
             <a:blip r:embed="rId6" cstate="print">
               <a:extLst>
                 <a:ext uri="{28A0092B-C50C-407E-A947-70E740481C1C}">
-                  <a14:useLocalDpi xmlns:a14="http://schemas.microsoft.com/office/drawing/2010/main" xmlns="" val="0"/>
+                  <a14:useLocalDpi xmlns="" xmlns:a14="http://schemas.microsoft.com/office/drawing/2010/main" val="0"/>
                 </a:ext>
               </a:extLst>
             </a:blip>
@@ -3656,7 +3656,7 @@
             <p:cNvPr id="21" name="Picture SoftUni Creative Logo" descr="SoftUni Creative logo">
               <a:extLst>
                 <a:ext uri="{FF2B5EF4-FFF2-40B4-BE49-F238E27FC236}">
-                  <a16:creationId xmlns:a16="http://schemas.microsoft.com/office/drawing/2014/main" xmlns="" id="{EA755AAE-BA08-481C-9224-0061170EE4B8}"/>
+                  <a16:creationId xmlns="" xmlns:a16="http://schemas.microsoft.com/office/drawing/2014/main" id="{EA755AAE-BA08-481C-9224-0061170EE4B8}"/>
                 </a:ext>
               </a:extLst>
             </p:cNvPr>
@@ -3669,7 +3669,7 @@
             <a:blip r:embed="rId7" cstate="print">
               <a:extLst>
                 <a:ext uri="{28A0092B-C50C-407E-A947-70E740481C1C}">
-                  <a14:useLocalDpi xmlns:a14="http://schemas.microsoft.com/office/drawing/2010/main" xmlns="" val="0"/>
+                  <a14:useLocalDpi xmlns="" xmlns:a14="http://schemas.microsoft.com/office/drawing/2010/main" val="0"/>
                 </a:ext>
               </a:extLst>
             </a:blip>
@@ -3692,7 +3692,7 @@
             <p:cNvPr id="20" name="Picture SoftUni Svetlina Logo" descr="SoftUni Svetlina logo">
               <a:extLst>
                 <a:ext uri="{FF2B5EF4-FFF2-40B4-BE49-F238E27FC236}">
-                  <a16:creationId xmlns:a16="http://schemas.microsoft.com/office/drawing/2014/main" xmlns="" id="{827D15FD-4C66-4B85-98E6-7826AA8F61C6}"/>
+                  <a16:creationId xmlns="" xmlns:a16="http://schemas.microsoft.com/office/drawing/2014/main" id="{827D15FD-4C66-4B85-98E6-7826AA8F61C6}"/>
                 </a:ext>
               </a:extLst>
             </p:cNvPr>
@@ -3705,7 +3705,7 @@
             <a:blip r:embed="rId8" cstate="print">
               <a:extLst>
                 <a:ext uri="{28A0092B-C50C-407E-A947-70E740481C1C}">
-                  <a14:useLocalDpi xmlns:a14="http://schemas.microsoft.com/office/drawing/2010/main" xmlns="" val="0"/>
+                  <a14:useLocalDpi xmlns="" xmlns:a14="http://schemas.microsoft.com/office/drawing/2010/main" val="0"/>
                 </a:ext>
               </a:extLst>
             </a:blip>
@@ -3728,7 +3728,7 @@
             <p:cNvPr id="25" name="Picture Software University Logo" descr="Software University logo">
               <a:extLst>
                 <a:ext uri="{FF2B5EF4-FFF2-40B4-BE49-F238E27FC236}">
-                  <a16:creationId xmlns:a16="http://schemas.microsoft.com/office/drawing/2014/main" xmlns="" id="{C74C190C-5856-41B9-8819-AE8DE0E10980}"/>
+                  <a16:creationId xmlns="" xmlns:a16="http://schemas.microsoft.com/office/drawing/2014/main" id="{C74C190C-5856-41B9-8819-AE8DE0E10980}"/>
                 </a:ext>
               </a:extLst>
             </p:cNvPr>
@@ -3741,7 +3741,7 @@
             <a:blip r:embed="rId9" cstate="print">
               <a:extLst>
                 <a:ext uri="{28A0092B-C50C-407E-A947-70E740481C1C}">
-                  <a14:useLocalDpi xmlns:a14="http://schemas.microsoft.com/office/drawing/2010/main" xmlns="" val="0"/>
+                  <a14:useLocalDpi xmlns="" xmlns:a14="http://schemas.microsoft.com/office/drawing/2010/main" val="0"/>
                 </a:ext>
               </a:extLst>
             </a:blip>
@@ -3764,7 +3764,7 @@
             <p:cNvPr id="33" name="Straight Connector 6">
               <a:extLst>
                 <a:ext uri="{FF2B5EF4-FFF2-40B4-BE49-F238E27FC236}">
-                  <a16:creationId xmlns:a16="http://schemas.microsoft.com/office/drawing/2014/main" xmlns="" id="{5C63D1E8-4A92-4691-8A24-A2FC7E8008E5}"/>
+                  <a16:creationId xmlns="" xmlns:a16="http://schemas.microsoft.com/office/drawing/2014/main" id="{5C63D1E8-4A92-4691-8A24-A2FC7E8008E5}"/>
                 </a:ext>
               </a:extLst>
             </p:cNvPr>
@@ -3803,7 +3803,7 @@
             <p:cNvPr id="32" name="Straight Connector 5">
               <a:extLst>
                 <a:ext uri="{FF2B5EF4-FFF2-40B4-BE49-F238E27FC236}">
-                  <a16:creationId xmlns:a16="http://schemas.microsoft.com/office/drawing/2014/main" xmlns="" id="{6E91D320-3732-40B8-864D-142D0A277ED1}"/>
+                  <a16:creationId xmlns="" xmlns:a16="http://schemas.microsoft.com/office/drawing/2014/main" id="{6E91D320-3732-40B8-864D-142D0A277ED1}"/>
                 </a:ext>
               </a:extLst>
             </p:cNvPr>
@@ -3842,7 +3842,7 @@
             <p:cNvPr id="31" name="Straight Connector 4">
               <a:extLst>
                 <a:ext uri="{FF2B5EF4-FFF2-40B4-BE49-F238E27FC236}">
-                  <a16:creationId xmlns:a16="http://schemas.microsoft.com/office/drawing/2014/main" xmlns="" id="{299ABE09-E33C-46B7-A80D-7BF4A6956211}"/>
+                  <a16:creationId xmlns="" xmlns:a16="http://schemas.microsoft.com/office/drawing/2014/main" id="{299ABE09-E33C-46B7-A80D-7BF4A6956211}"/>
                 </a:ext>
               </a:extLst>
             </p:cNvPr>
@@ -3879,7 +3879,7 @@
             <p:cNvPr id="30" name="Straight Connector 3">
               <a:extLst>
                 <a:ext uri="{FF2B5EF4-FFF2-40B4-BE49-F238E27FC236}">
-                  <a16:creationId xmlns:a16="http://schemas.microsoft.com/office/drawing/2014/main" xmlns="" id="{93DDBF37-0764-47AA-94E3-9A44F3ED8FB5}"/>
+                  <a16:creationId xmlns="" xmlns:a16="http://schemas.microsoft.com/office/drawing/2014/main" id="{93DDBF37-0764-47AA-94E3-9A44F3ED8FB5}"/>
                 </a:ext>
               </a:extLst>
             </p:cNvPr>
@@ -3916,7 +3916,7 @@
             <p:cNvPr id="29" name="Straight Connector 2">
               <a:extLst>
                 <a:ext uri="{FF2B5EF4-FFF2-40B4-BE49-F238E27FC236}">
-                  <a16:creationId xmlns:a16="http://schemas.microsoft.com/office/drawing/2014/main" xmlns="" id="{72BFE2F3-0845-4E5B-9375-E9D4027DD675}"/>
+                  <a16:creationId xmlns="" xmlns:a16="http://schemas.microsoft.com/office/drawing/2014/main" id="{72BFE2F3-0845-4E5B-9375-E9D4027DD675}"/>
                 </a:ext>
               </a:extLst>
             </p:cNvPr>
@@ -3953,7 +3953,7 @@
             <p:cNvPr id="28" name="Straight Connector 1">
               <a:extLst>
                 <a:ext uri="{FF2B5EF4-FFF2-40B4-BE49-F238E27FC236}">
-                  <a16:creationId xmlns:a16="http://schemas.microsoft.com/office/drawing/2014/main" xmlns="" id="{D4E5982E-3110-47E1-A5BB-91B7BECC3093}"/>
+                  <a16:creationId xmlns="" xmlns:a16="http://schemas.microsoft.com/office/drawing/2014/main" id="{D4E5982E-3110-47E1-A5BB-91B7BECC3093}"/>
                 </a:ext>
               </a:extLst>
             </p:cNvPr>
@@ -3990,7 +3990,7 @@
             <p:cNvPr id="27" name="Straight Connector Horizontal">
               <a:extLst>
                 <a:ext uri="{FF2B5EF4-FFF2-40B4-BE49-F238E27FC236}">
-                  <a16:creationId xmlns:a16="http://schemas.microsoft.com/office/drawing/2014/main" xmlns="" id="{5F62FB7C-BD6E-4383-98C1-2CF30F34CAFD}"/>
+                  <a16:creationId xmlns="" xmlns:a16="http://schemas.microsoft.com/office/drawing/2014/main" id="{5F62FB7C-BD6E-4383-98C1-2CF30F34CAFD}"/>
                 </a:ext>
               </a:extLst>
             </p:cNvPr>
@@ -4029,7 +4029,7 @@
             <p:cNvPr id="34" name="Straight Connector 0">
               <a:extLst>
                 <a:ext uri="{FF2B5EF4-FFF2-40B4-BE49-F238E27FC236}">
-                  <a16:creationId xmlns:a16="http://schemas.microsoft.com/office/drawing/2014/main" xmlns="" id="{C84A0FE1-723D-4682-8682-77BAD950EE15}"/>
+                  <a16:creationId xmlns="" xmlns:a16="http://schemas.microsoft.com/office/drawing/2014/main" id="{C84A0FE1-723D-4682-8682-77BAD950EE15}"/>
                 </a:ext>
               </a:extLst>
             </p:cNvPr>
@@ -4066,7 +4066,7 @@
             <p:cNvPr id="18" name="Picture SoftUni Logo" descr="SoftUni logo">
               <a:extLst>
                 <a:ext uri="{FF2B5EF4-FFF2-40B4-BE49-F238E27FC236}">
-                  <a16:creationId xmlns:a16="http://schemas.microsoft.com/office/drawing/2014/main" xmlns="" id="{A0675455-B7FA-4569-A5FD-A3B0F20B2A26}"/>
+                  <a16:creationId xmlns="" xmlns:a16="http://schemas.microsoft.com/office/drawing/2014/main" id="{A0675455-B7FA-4569-A5FD-A3B0F20B2A26}"/>
                 </a:ext>
               </a:extLst>
             </p:cNvPr>
@@ -4079,7 +4079,7 @@
             <a:blip r:embed="rId10" cstate="print">
               <a:extLst>
                 <a:ext uri="{28A0092B-C50C-407E-A947-70E740481C1C}">
-                  <a14:useLocalDpi xmlns:a14="http://schemas.microsoft.com/office/drawing/2010/main" xmlns="" val="0"/>
+                  <a14:useLocalDpi xmlns="" xmlns:a14="http://schemas.microsoft.com/office/drawing/2010/main" val="0"/>
                 </a:ext>
               </a:extLst>
             </a:blip>
@@ -4103,7 +4103,7 @@
           <p:cNvPr id="19" name="Slide Title">
             <a:extLst>
               <a:ext uri="{FF2B5EF4-FFF2-40B4-BE49-F238E27FC236}">
-                <a16:creationId xmlns:a16="http://schemas.microsoft.com/office/drawing/2014/main" xmlns="" id="{7CFDBB16-985C-4CC7-B6DB-B81B36037922}"/>
+                <a16:creationId xmlns="" xmlns:a16="http://schemas.microsoft.com/office/drawing/2014/main" id="{7CFDBB16-985C-4CC7-B6DB-B81B36037922}"/>
               </a:ext>
             </a:extLst>
           </p:cNvPr>
@@ -4206,7 +4206,7 @@
           <p:cNvPr id="36" name="Logo Software University" descr="Software University logo">
             <a:extLst>
               <a:ext uri="{FF2B5EF4-FFF2-40B4-BE49-F238E27FC236}">
-                <a16:creationId xmlns:a16="http://schemas.microsoft.com/office/drawing/2014/main" xmlns="" id="{67FC4D2E-913D-432A-B658-F0D82839FA5E}"/>
+                <a16:creationId xmlns="" xmlns:a16="http://schemas.microsoft.com/office/drawing/2014/main" id="{67FC4D2E-913D-432A-B658-F0D82839FA5E}"/>
               </a:ext>
             </a:extLst>
           </p:cNvPr>
@@ -4229,7 +4229,7 @@
             </a:clrChange>
             <a:extLst>
               <a:ext uri="{28A0092B-C50C-407E-A947-70E740481C1C}">
-                <a14:useLocalDpi xmlns:a14="http://schemas.microsoft.com/office/drawing/2010/main" xmlns="" val="0"/>
+                <a14:useLocalDpi xmlns="" xmlns:a14="http://schemas.microsoft.com/office/drawing/2010/main" val="0"/>
               </a:ext>
             </a:extLst>
           </a:blip>
@@ -4250,7 +4250,7 @@
     </p:spTree>
     <p:extLst>
       <p:ext uri="{BB962C8B-B14F-4D97-AF65-F5344CB8AC3E}">
-        <p14:creationId xmlns:p14="http://schemas.microsoft.com/office/powerpoint/2010/main" xmlns="" val="4192061223"/>
+        <p14:creationId xmlns="" xmlns:p14="http://schemas.microsoft.com/office/powerpoint/2010/main" val="4192061223"/>
       </p:ext>
     </p:extLst>
   </p:cSld>
@@ -4258,7 +4258,7 @@
     <a:masterClrMapping/>
   </p:clrMapOvr>
   <mc:AlternateContent xmlns:mc="http://schemas.openxmlformats.org/markup-compatibility/2006">
-    <mc:Choice xmlns:p14="http://schemas.microsoft.com/office/powerpoint/2010/main" xmlns="" Requires="p14">
+    <mc:Choice xmlns="" xmlns:p14="http://schemas.microsoft.com/office/powerpoint/2010/main" Requires="p14">
       <p:transition spd="slow" p14:dur="2000" advClick="0" advTm="5000"/>
     </mc:Choice>
     <mc:Fallback>
@@ -4267,7 +4267,7 @@
   </mc:AlternateContent>
   <p:extLst>
     <p:ext uri="{DCECCB84-F9BA-43D5-87BE-67443E8EF086}">
-      <p15:sldGuideLst xmlns:p15="http://schemas.microsoft.com/office/powerpoint/2012/main" xmlns="">
+      <p15:sldGuideLst xmlns="" xmlns:p15="http://schemas.microsoft.com/office/powerpoint/2012/main">
         <p15:guide id="1" orient="horz" pos="2160">
           <p15:clr>
             <a:srgbClr val="FBAE40"/>
@@ -4306,7 +4306,7 @@
           <p:cNvPr id="13" name="Slide Number">
             <a:extLst>
               <a:ext uri="{FF2B5EF4-FFF2-40B4-BE49-F238E27FC236}">
-                <a16:creationId xmlns:a16="http://schemas.microsoft.com/office/drawing/2014/main" xmlns="" id="{5B8761D8-B42F-4A70-A0CE-682CEB2AE31B}"/>
+                <a16:creationId xmlns="" xmlns:a16="http://schemas.microsoft.com/office/drawing/2014/main" id="{5B8761D8-B42F-4A70-A0CE-682CEB2AE31B}"/>
               </a:ext>
             </a:extLst>
           </p:cNvPr>
@@ -4349,7 +4349,7 @@
             <a:hlinkClick r:id="rId2" tooltip="Software University Discussion Forum"/>
             <a:extLst>
               <a:ext uri="{FF2B5EF4-FFF2-40B4-BE49-F238E27FC236}">
-                <a16:creationId xmlns:a16="http://schemas.microsoft.com/office/drawing/2014/main" xmlns="" id="{98C579AD-FAF5-4B28-9B52-5457F1E90061}"/>
+                <a16:creationId xmlns="" xmlns:a16="http://schemas.microsoft.com/office/drawing/2014/main" id="{98C579AD-FAF5-4B28-9B52-5457F1E90061}"/>
               </a:ext>
             </a:extLst>
           </p:cNvPr>
@@ -4362,7 +4362,7 @@
           <a:blip r:embed="rId3" cstate="print">
             <a:extLst>
               <a:ext uri="{28A0092B-C50C-407E-A947-70E740481C1C}">
-                <a14:useLocalDpi xmlns:a14="http://schemas.microsoft.com/office/drawing/2010/main" xmlns=""/>
+                <a14:useLocalDpi xmlns="" xmlns:a14="http://schemas.microsoft.com/office/drawing/2010/main"/>
               </a:ext>
             </a:extLst>
           </a:blip>
@@ -4386,7 +4386,7 @@
             <a:hlinkClick r:id="rId4" tooltip="Software University @ Facebook"/>
             <a:extLst>
               <a:ext uri="{FF2B5EF4-FFF2-40B4-BE49-F238E27FC236}">
-                <a16:creationId xmlns:a16="http://schemas.microsoft.com/office/drawing/2014/main" xmlns="" id="{6B2C510E-5EF2-49F6-B926-2BD74CD3C7F8}"/>
+                <a16:creationId xmlns="" xmlns:a16="http://schemas.microsoft.com/office/drawing/2014/main" id="{6B2C510E-5EF2-49F6-B926-2BD74CD3C7F8}"/>
               </a:ext>
             </a:extLst>
           </p:cNvPr>
@@ -4399,7 +4399,7 @@
           <a:blip r:embed="rId5" cstate="print">
             <a:extLst>
               <a:ext uri="{28A0092B-C50C-407E-A947-70E740481C1C}">
-                <a14:useLocalDpi xmlns:a14="http://schemas.microsoft.com/office/drawing/2010/main" xmlns=""/>
+                <a14:useLocalDpi xmlns="" xmlns:a14="http://schemas.microsoft.com/office/drawing/2010/main"/>
               </a:ext>
             </a:extLst>
           </a:blip>
@@ -4417,7 +4417,7 @@
           <a:noFill/>
           <a:extLst>
             <a:ext uri="{909E8E84-426E-40DD-AFC4-6F175D3DCCD1}">
-              <a14:hiddenFill xmlns:a14="http://schemas.microsoft.com/office/drawing/2010/main" xmlns="">
+              <a14:hiddenFill xmlns="" xmlns:a14="http://schemas.microsoft.com/office/drawing/2010/main">
                 <a:solidFill>
                   <a:srgbClr val="FFFFFF"/>
                 </a:solidFill>
@@ -4432,7 +4432,7 @@
             <a:hlinkClick r:id="rId6"/>
             <a:extLst>
               <a:ext uri="{FF2B5EF4-FFF2-40B4-BE49-F238E27FC236}">
-                <a16:creationId xmlns:a16="http://schemas.microsoft.com/office/drawing/2014/main" xmlns="" id="{F4604840-E810-44B7-9FF1-3B28CD68B758}"/>
+                <a16:creationId xmlns="" xmlns:a16="http://schemas.microsoft.com/office/drawing/2014/main" id="{F4604840-E810-44B7-9FF1-3B28CD68B758}"/>
               </a:ext>
             </a:extLst>
           </p:cNvPr>
@@ -4445,7 +4445,7 @@
           <a:blip r:embed="rId7" cstate="print">
             <a:extLst>
               <a:ext uri="{28A0092B-C50C-407E-A947-70E740481C1C}">
-                <a14:useLocalDpi xmlns:a14="http://schemas.microsoft.com/office/drawing/2010/main" xmlns="" val="0"/>
+                <a14:useLocalDpi xmlns="" xmlns:a14="http://schemas.microsoft.com/office/drawing/2010/main" val="0"/>
               </a:ext>
             </a:extLst>
           </a:blip>
@@ -4469,7 +4469,7 @@
             <a:hlinkClick r:id="rId8"/>
             <a:extLst>
               <a:ext uri="{FF2B5EF4-FFF2-40B4-BE49-F238E27FC236}">
-                <a16:creationId xmlns:a16="http://schemas.microsoft.com/office/drawing/2014/main" xmlns="" id="{07C965FA-A87E-4824-AFA8-C67AF548A76A}"/>
+                <a16:creationId xmlns="" xmlns:a16="http://schemas.microsoft.com/office/drawing/2014/main" id="{07C965FA-A87E-4824-AFA8-C67AF548A76A}"/>
               </a:ext>
             </a:extLst>
           </p:cNvPr>
@@ -4482,7 +4482,7 @@
           <a:blip r:embed="rId9" cstate="print">
             <a:extLst>
               <a:ext uri="{28A0092B-C50C-407E-A947-70E740481C1C}">
-                <a14:useLocalDpi xmlns:a14="http://schemas.microsoft.com/office/drawing/2010/main" xmlns="" val="0"/>
+                <a14:useLocalDpi xmlns="" xmlns:a14="http://schemas.microsoft.com/office/drawing/2010/main" val="0"/>
               </a:ext>
             </a:extLst>
           </a:blip>
@@ -4504,7 +4504,7 @@
           <p:cNvPr id="12" name="Slide Body Text">
             <a:extLst>
               <a:ext uri="{FF2B5EF4-FFF2-40B4-BE49-F238E27FC236}">
-                <a16:creationId xmlns:a16="http://schemas.microsoft.com/office/drawing/2014/main" xmlns="" id="{0C1F9416-8B6E-46DE-973C-777785E27A26}"/>
+                <a16:creationId xmlns="" xmlns:a16="http://schemas.microsoft.com/office/drawing/2014/main" id="{0C1F9416-8B6E-46DE-973C-777785E27A26}"/>
               </a:ext>
             </a:extLst>
           </p:cNvPr>
@@ -4629,7 +4629,7 @@
           <p:cNvPr id="10" name="Rectangle Top">
             <a:extLst>
               <a:ext uri="{FF2B5EF4-FFF2-40B4-BE49-F238E27FC236}">
-                <a16:creationId xmlns:a16="http://schemas.microsoft.com/office/drawing/2014/main" xmlns="" id="{86646B95-5E3B-4DE8-9118-031C2C296D8C}"/>
+                <a16:creationId xmlns="" xmlns:a16="http://schemas.microsoft.com/office/drawing/2014/main" id="{86646B95-5E3B-4DE8-9118-031C2C296D8C}"/>
               </a:ext>
             </a:extLst>
           </p:cNvPr>
@@ -4710,7 +4710,7 @@
           <p:cNvPr id="11" name="Logo Software University" descr="Software University logo">
             <a:extLst>
               <a:ext uri="{FF2B5EF4-FFF2-40B4-BE49-F238E27FC236}">
-                <a16:creationId xmlns:a16="http://schemas.microsoft.com/office/drawing/2014/main" xmlns="" id="{58AB1944-B146-4E89-B2D9-426EB610F319}"/>
+                <a16:creationId xmlns="" xmlns:a16="http://schemas.microsoft.com/office/drawing/2014/main" id="{58AB1944-B146-4E89-B2D9-426EB610F319}"/>
               </a:ext>
             </a:extLst>
           </p:cNvPr>
@@ -4723,7 +4723,7 @@
           <a:blip r:embed="rId11" cstate="print">
             <a:extLst>
               <a:ext uri="{28A0092B-C50C-407E-A947-70E740481C1C}">
-                <a14:useLocalDpi xmlns:a14="http://schemas.microsoft.com/office/drawing/2010/main" xmlns="" val="0"/>
+                <a14:useLocalDpi xmlns="" xmlns:a14="http://schemas.microsoft.com/office/drawing/2010/main" val="0"/>
               </a:ext>
             </a:extLst>
           </a:blip>
@@ -4746,7 +4746,7 @@
           <p:cNvPr id="18" name="Slide Title">
             <a:extLst>
               <a:ext uri="{FF2B5EF4-FFF2-40B4-BE49-F238E27FC236}">
-                <a16:creationId xmlns:a16="http://schemas.microsoft.com/office/drawing/2014/main" xmlns="" id="{AE87ED9C-76E1-4D85-9B06-3AF44AABB668}"/>
+                <a16:creationId xmlns="" xmlns:a16="http://schemas.microsoft.com/office/drawing/2014/main" id="{AE87ED9C-76E1-4D85-9B06-3AF44AABB668}"/>
               </a:ext>
             </a:extLst>
           </p:cNvPr>
@@ -4785,7 +4785,7 @@
     </p:spTree>
     <p:extLst>
       <p:ext uri="{BB962C8B-B14F-4D97-AF65-F5344CB8AC3E}">
-        <p14:creationId xmlns:p14="http://schemas.microsoft.com/office/powerpoint/2010/main" xmlns="" val="2196466322"/>
+        <p14:creationId xmlns="" xmlns:p14="http://schemas.microsoft.com/office/powerpoint/2010/main" val="2196466322"/>
       </p:ext>
     </p:extLst>
   </p:cSld>
@@ -4793,7 +4793,7 @@
     <a:masterClrMapping/>
   </p:clrMapOvr>
   <mc:AlternateContent xmlns:mc="http://schemas.openxmlformats.org/markup-compatibility/2006">
-    <mc:Choice xmlns:p14="http://schemas.microsoft.com/office/powerpoint/2010/main" xmlns="" Requires="p14">
+    <mc:Choice xmlns="" xmlns:p14="http://schemas.microsoft.com/office/powerpoint/2010/main" Requires="p14">
       <p:transition spd="slow" p14:dur="2000" advClick="0" advTm="5000"/>
     </mc:Choice>
     <mc:Fallback>
@@ -4825,7 +4825,7 @@
           <p:cNvPr id="9" name="Oval Center Icon">
             <a:extLst>
               <a:ext uri="{FF2B5EF4-FFF2-40B4-BE49-F238E27FC236}">
-                <a16:creationId xmlns:a16="http://schemas.microsoft.com/office/drawing/2014/main" xmlns="" id="{13B9A8FE-2718-4F2C-98D4-CBF86AD69D58}"/>
+                <a16:creationId xmlns="" xmlns:a16="http://schemas.microsoft.com/office/drawing/2014/main" id="{13B9A8FE-2718-4F2C-98D4-CBF86AD69D58}"/>
               </a:ext>
             </a:extLst>
           </p:cNvPr>
@@ -4906,7 +4906,7 @@
           <p:cNvPr id="8" name="Slide Subtitle">
             <a:extLst>
               <a:ext uri="{FF2B5EF4-FFF2-40B4-BE49-F238E27FC236}">
-                <a16:creationId xmlns:a16="http://schemas.microsoft.com/office/drawing/2014/main" xmlns="" id="{588387B4-E99E-4145-9D1D-F17CA5190DFD}"/>
+                <a16:creationId xmlns="" xmlns:a16="http://schemas.microsoft.com/office/drawing/2014/main" id="{588387B4-E99E-4145-9D1D-F17CA5190DFD}"/>
               </a:ext>
             </a:extLst>
           </p:cNvPr>
@@ -4956,7 +4956,7 @@
           <p:cNvPr id="13" name="Slide Title">
             <a:extLst>
               <a:ext uri="{FF2B5EF4-FFF2-40B4-BE49-F238E27FC236}">
-                <a16:creationId xmlns:a16="http://schemas.microsoft.com/office/drawing/2014/main" xmlns="" id="{8A28C56F-AE84-49D0-9AD1-1F0CEEABF710}"/>
+                <a16:creationId xmlns="" xmlns:a16="http://schemas.microsoft.com/office/drawing/2014/main" id="{8A28C56F-AE84-49D0-9AD1-1F0CEEABF710}"/>
               </a:ext>
             </a:extLst>
           </p:cNvPr>
@@ -5001,7 +5001,7 @@
     </p:spTree>
     <p:extLst>
       <p:ext uri="{BB962C8B-B14F-4D97-AF65-F5344CB8AC3E}">
-        <p14:creationId xmlns:p14="http://schemas.microsoft.com/office/powerpoint/2010/main" xmlns="" val="475389923"/>
+        <p14:creationId xmlns="" xmlns:p14="http://schemas.microsoft.com/office/powerpoint/2010/main" val="475389923"/>
       </p:ext>
     </p:extLst>
   </p:cSld>
@@ -5009,7 +5009,7 @@
     <a:masterClrMapping/>
   </p:clrMapOvr>
   <mc:AlternateContent xmlns:mc="http://schemas.openxmlformats.org/markup-compatibility/2006">
-    <mc:Choice xmlns:p14="http://schemas.microsoft.com/office/powerpoint/2010/main" xmlns="" Requires="p14">
+    <mc:Choice xmlns="" xmlns:p14="http://schemas.microsoft.com/office/powerpoint/2010/main" Requires="p14">
       <p:transition spd="slow" p14:dur="2000" advClick="0" advTm="5000"/>
     </mc:Choice>
     <mc:Fallback>
@@ -5042,7 +5042,7 @@
           <p:cNvPr id="2" name="Title 1">
             <a:extLst>
               <a:ext uri="{FF2B5EF4-FFF2-40B4-BE49-F238E27FC236}">
-                <a16:creationId xmlns:a16="http://schemas.microsoft.com/office/drawing/2014/main" xmlns="" id="{5213C145-EA12-94EF-AA17-5F628EA0AD2D}"/>
+                <a16:creationId xmlns="" xmlns:a16="http://schemas.microsoft.com/office/drawing/2014/main" id="{5213C145-EA12-94EF-AA17-5F628EA0AD2D}"/>
               </a:ext>
             </a:extLst>
           </p:cNvPr>
@@ -5080,7 +5080,7 @@
           <p:cNvPr id="3" name="Subtitle 2">
             <a:extLst>
               <a:ext uri="{FF2B5EF4-FFF2-40B4-BE49-F238E27FC236}">
-                <a16:creationId xmlns:a16="http://schemas.microsoft.com/office/drawing/2014/main" xmlns="" id="{5F55E72E-5B45-B6EE-75AE-03B188AD9A08}"/>
+                <a16:creationId xmlns="" xmlns:a16="http://schemas.microsoft.com/office/drawing/2014/main" id="{5F55E72E-5B45-B6EE-75AE-03B188AD9A08}"/>
               </a:ext>
             </a:extLst>
           </p:cNvPr>
@@ -5151,7 +5151,7 @@
           <p:cNvPr id="4" name="Date Placeholder 3">
             <a:extLst>
               <a:ext uri="{FF2B5EF4-FFF2-40B4-BE49-F238E27FC236}">
-                <a16:creationId xmlns:a16="http://schemas.microsoft.com/office/drawing/2014/main" xmlns="" id="{30C6A8EA-0240-01AB-A7C2-BD1CD885E1C1}"/>
+                <a16:creationId xmlns="" xmlns:a16="http://schemas.microsoft.com/office/drawing/2014/main" id="{30C6A8EA-0240-01AB-A7C2-BD1CD885E1C1}"/>
               </a:ext>
             </a:extLst>
           </p:cNvPr>
@@ -5181,7 +5181,7 @@
           <p:cNvPr id="5" name="Footer Placeholder 4">
             <a:extLst>
               <a:ext uri="{FF2B5EF4-FFF2-40B4-BE49-F238E27FC236}">
-                <a16:creationId xmlns:a16="http://schemas.microsoft.com/office/drawing/2014/main" xmlns="" id="{F95CBF96-4249-1541-E44E-FBCECA233B3C}"/>
+                <a16:creationId xmlns="" xmlns:a16="http://schemas.microsoft.com/office/drawing/2014/main" id="{F95CBF96-4249-1541-E44E-FBCECA233B3C}"/>
               </a:ext>
             </a:extLst>
           </p:cNvPr>
@@ -5206,7 +5206,7 @@
           <p:cNvPr id="6" name="Slide Number Placeholder 5">
             <a:extLst>
               <a:ext uri="{FF2B5EF4-FFF2-40B4-BE49-F238E27FC236}">
-                <a16:creationId xmlns:a16="http://schemas.microsoft.com/office/drawing/2014/main" xmlns="" id="{7ACB54F2-814F-F79B-8CD7-FA3133365CBC}"/>
+                <a16:creationId xmlns="" xmlns:a16="http://schemas.microsoft.com/office/drawing/2014/main" id="{7ACB54F2-814F-F79B-8CD7-FA3133365CBC}"/>
               </a:ext>
             </a:extLst>
           </p:cNvPr>
@@ -5234,7 +5234,7 @@
     </p:spTree>
     <p:extLst>
       <p:ext uri="{BB962C8B-B14F-4D97-AF65-F5344CB8AC3E}">
-        <p14:creationId xmlns:p14="http://schemas.microsoft.com/office/powerpoint/2010/main" xmlns="" val="2773863354"/>
+        <p14:creationId xmlns="" xmlns:p14="http://schemas.microsoft.com/office/powerpoint/2010/main" val="2773863354"/>
       </p:ext>
     </p:extLst>
   </p:cSld>
@@ -6344,7 +6344,7 @@
     </p:spTree>
     <p:extLst>
       <p:ext uri="{BB962C8B-B14F-4D97-AF65-F5344CB8AC3E}">
-        <p14:creationId xmlns:p14="http://schemas.microsoft.com/office/powerpoint/2010/main" xmlns="" val="2531485629"/>
+        <p14:creationId xmlns="" xmlns:p14="http://schemas.microsoft.com/office/powerpoint/2010/main" val="2531485629"/>
       </p:ext>
     </p:extLst>
   </p:cSld>
@@ -6376,7 +6376,7 @@
           <p:cNvPr id="8" name="Rectangle Top">
             <a:extLst>
               <a:ext uri="{FF2B5EF4-FFF2-40B4-BE49-F238E27FC236}">
-                <a16:creationId xmlns="" xmlns:a16="http://schemas.microsoft.com/office/drawing/2014/main" id="{454BD9C2-93A6-4860-A758-846ED0E1C8FA}"/>
+                <a16:creationId xmlns:a16="http://schemas.microsoft.com/office/drawing/2014/main" xmlns="" id="{454BD9C2-93A6-4860-A758-846ED0E1C8FA}"/>
               </a:ext>
             </a:extLst>
           </p:cNvPr>
@@ -6457,7 +6457,7 @@
           <p:cNvPr id="7" name="Slide Number">
             <a:extLst>
               <a:ext uri="{FF2B5EF4-FFF2-40B4-BE49-F238E27FC236}">
-                <a16:creationId xmlns="" xmlns:a16="http://schemas.microsoft.com/office/drawing/2014/main" id="{C1780DB1-0AF0-4108-AFE1-9DA99F0DBCB8}"/>
+                <a16:creationId xmlns:a16="http://schemas.microsoft.com/office/drawing/2014/main" xmlns="" id="{C1780DB1-0AF0-4108-AFE1-9DA99F0DBCB8}"/>
               </a:ext>
             </a:extLst>
           </p:cNvPr>
@@ -6499,7 +6499,7 @@
           <p:cNvPr id="3" name="Slide Body Text">
             <a:extLst>
               <a:ext uri="{FF2B5EF4-FFF2-40B4-BE49-F238E27FC236}">
-                <a16:creationId xmlns="" xmlns:a16="http://schemas.microsoft.com/office/drawing/2014/main" id="{5A9D2960-6D42-439F-82E8-812822013A10}"/>
+                <a16:creationId xmlns:a16="http://schemas.microsoft.com/office/drawing/2014/main" xmlns="" id="{5A9D2960-6D42-439F-82E8-812822013A10}"/>
               </a:ext>
             </a:extLst>
           </p:cNvPr>
@@ -6577,7 +6577,7 @@
           <p:cNvPr id="13" name="Rectangle Top">
             <a:extLst>
               <a:ext uri="{FF2B5EF4-FFF2-40B4-BE49-F238E27FC236}">
-                <a16:creationId xmlns="" xmlns:a16="http://schemas.microsoft.com/office/drawing/2014/main" id="{391AFA4E-7870-4561-A1B8-AC956B0C8931}"/>
+                <a16:creationId xmlns:a16="http://schemas.microsoft.com/office/drawing/2014/main" xmlns="" id="{391AFA4E-7870-4561-A1B8-AC956B0C8931}"/>
               </a:ext>
             </a:extLst>
           </p:cNvPr>
@@ -6658,7 +6658,7 @@
           <p:cNvPr id="12" name="Logo Software University" descr="Software University logo">
             <a:extLst>
               <a:ext uri="{FF2B5EF4-FFF2-40B4-BE49-F238E27FC236}">
-                <a16:creationId xmlns="" xmlns:a16="http://schemas.microsoft.com/office/drawing/2014/main" id="{B1D3B425-B9BF-43ED-9DEC-C05002FBA22F}"/>
+                <a16:creationId xmlns:a16="http://schemas.microsoft.com/office/drawing/2014/main" xmlns="" id="{B1D3B425-B9BF-43ED-9DEC-C05002FBA22F}"/>
               </a:ext>
             </a:extLst>
           </p:cNvPr>
@@ -6671,7 +6671,7 @@
           <a:blip r:embed="rId2" cstate="print">
             <a:extLst>
               <a:ext uri="{28A0092B-C50C-407E-A947-70E740481C1C}">
-                <a14:useLocalDpi xmlns="" xmlns:a14="http://schemas.microsoft.com/office/drawing/2010/main" val="0"/>
+                <a14:useLocalDpi xmlns:a14="http://schemas.microsoft.com/office/drawing/2010/main" xmlns="" val="0"/>
               </a:ext>
             </a:extLst>
           </a:blip>
@@ -6694,7 +6694,7 @@
           <p:cNvPr id="6" name="Slide Title">
             <a:extLst>
               <a:ext uri="{FF2B5EF4-FFF2-40B4-BE49-F238E27FC236}">
-                <a16:creationId xmlns="" xmlns:a16="http://schemas.microsoft.com/office/drawing/2014/main" id="{19B5B676-7892-440F-8191-7109B2C59885}"/>
+                <a16:creationId xmlns:a16="http://schemas.microsoft.com/office/drawing/2014/main" xmlns="" id="{19B5B676-7892-440F-8191-7109B2C59885}"/>
               </a:ext>
             </a:extLst>
           </p:cNvPr>
@@ -6733,7 +6733,7 @@
     </p:spTree>
     <p:extLst>
       <p:ext uri="{BB962C8B-B14F-4D97-AF65-F5344CB8AC3E}">
-        <p14:creationId xmlns="" xmlns:p14="http://schemas.microsoft.com/office/powerpoint/2010/main" val="2685365194"/>
+        <p14:creationId xmlns:p14="http://schemas.microsoft.com/office/powerpoint/2010/main" xmlns="" val="2685365194"/>
       </p:ext>
     </p:extLst>
   </p:cSld>
@@ -6741,7 +6741,7 @@
     <a:masterClrMapping/>
   </p:clrMapOvr>
   <mc:AlternateContent xmlns:mc="http://schemas.openxmlformats.org/markup-compatibility/2006">
-    <mc:Choice xmlns="" xmlns:p14="http://schemas.microsoft.com/office/powerpoint/2010/main" Requires="p14">
+    <mc:Choice xmlns:p14="http://schemas.microsoft.com/office/powerpoint/2010/main" xmlns="" Requires="p14">
       <p:transition spd="slow" p14:dur="2000" advClick="0" advTm="5000"/>
     </mc:Choice>
     <mc:Fallback>
@@ -6937,7 +6937,7 @@
     </p:spTree>
     <p:extLst>
       <p:ext uri="{BB962C8B-B14F-4D97-AF65-F5344CB8AC3E}">
-        <p14:creationId xmlns:p14="http://schemas.microsoft.com/office/powerpoint/2010/main" xmlns="" val="3529216409"/>
+        <p14:creationId xmlns="" xmlns:p14="http://schemas.microsoft.com/office/powerpoint/2010/main" val="3529216409"/>
       </p:ext>
     </p:extLst>
   </p:cSld>
@@ -6945,7 +6945,7 @@
     <a:masterClrMapping/>
   </p:clrMapOvr>
   <mc:AlternateContent xmlns:mc="http://schemas.openxmlformats.org/markup-compatibility/2006">
-    <mc:Choice xmlns:p14="http://schemas.microsoft.com/office/powerpoint/2010/main" xmlns="" Requires="p14">
+    <mc:Choice xmlns="" xmlns:p14="http://schemas.microsoft.com/office/powerpoint/2010/main" Requires="p14">
       <p:transition spd="slow" p14:dur="2000" advClick="0" advTm="5000"/>
     </mc:Choice>
     <mc:Fallback>
@@ -6977,7 +6977,7 @@
           <p:cNvPr id="7" name="Slide Number">
             <a:extLst>
               <a:ext uri="{FF2B5EF4-FFF2-40B4-BE49-F238E27FC236}">
-                <a16:creationId xmlns:a16="http://schemas.microsoft.com/office/drawing/2014/main" xmlns="" id="{C1780DB1-0AF0-4108-AFE1-9DA99F0DBCB8}"/>
+                <a16:creationId xmlns="" xmlns:a16="http://schemas.microsoft.com/office/drawing/2014/main" id="{C1780DB1-0AF0-4108-AFE1-9DA99F0DBCB8}"/>
               </a:ext>
             </a:extLst>
           </p:cNvPr>
@@ -7019,7 +7019,7 @@
           <p:cNvPr id="3" name="Slide Body Text">
             <a:extLst>
               <a:ext uri="{FF2B5EF4-FFF2-40B4-BE49-F238E27FC236}">
-                <a16:creationId xmlns:a16="http://schemas.microsoft.com/office/drawing/2014/main" xmlns="" id="{5A9D2960-6D42-439F-82E8-812822013A10}"/>
+                <a16:creationId xmlns="" xmlns:a16="http://schemas.microsoft.com/office/drawing/2014/main" id="{5A9D2960-6D42-439F-82E8-812822013A10}"/>
               </a:ext>
             </a:extLst>
           </p:cNvPr>
@@ -7097,7 +7097,7 @@
           <p:cNvPr id="13" name="Rectangle Top">
             <a:extLst>
               <a:ext uri="{FF2B5EF4-FFF2-40B4-BE49-F238E27FC236}">
-                <a16:creationId xmlns:a16="http://schemas.microsoft.com/office/drawing/2014/main" xmlns="" id="{391AFA4E-7870-4561-A1B8-AC956B0C8931}"/>
+                <a16:creationId xmlns="" xmlns:a16="http://schemas.microsoft.com/office/drawing/2014/main" id="{391AFA4E-7870-4561-A1B8-AC956B0C8931}"/>
               </a:ext>
             </a:extLst>
           </p:cNvPr>
@@ -7178,7 +7178,7 @@
           <p:cNvPr id="12" name="Logo Software University" descr="Software University logo">
             <a:extLst>
               <a:ext uri="{FF2B5EF4-FFF2-40B4-BE49-F238E27FC236}">
-                <a16:creationId xmlns:a16="http://schemas.microsoft.com/office/drawing/2014/main" xmlns="" id="{B1D3B425-B9BF-43ED-9DEC-C05002FBA22F}"/>
+                <a16:creationId xmlns="" xmlns:a16="http://schemas.microsoft.com/office/drawing/2014/main" id="{B1D3B425-B9BF-43ED-9DEC-C05002FBA22F}"/>
               </a:ext>
             </a:extLst>
           </p:cNvPr>
@@ -7191,7 +7191,7 @@
           <a:blip r:embed="rId2" cstate="print">
             <a:extLst>
               <a:ext uri="{28A0092B-C50C-407E-A947-70E740481C1C}">
-                <a14:useLocalDpi xmlns:a14="http://schemas.microsoft.com/office/drawing/2010/main" xmlns="" val="0"/>
+                <a14:useLocalDpi xmlns="" xmlns:a14="http://schemas.microsoft.com/office/drawing/2010/main" val="0"/>
               </a:ext>
             </a:extLst>
           </a:blip>
@@ -7214,7 +7214,7 @@
           <p:cNvPr id="6" name="Slide Title">
             <a:extLst>
               <a:ext uri="{FF2B5EF4-FFF2-40B4-BE49-F238E27FC236}">
-                <a16:creationId xmlns:a16="http://schemas.microsoft.com/office/drawing/2014/main" xmlns="" id="{19B5B676-7892-440F-8191-7109B2C59885}"/>
+                <a16:creationId xmlns="" xmlns:a16="http://schemas.microsoft.com/office/drawing/2014/main" id="{19B5B676-7892-440F-8191-7109B2C59885}"/>
               </a:ext>
             </a:extLst>
           </p:cNvPr>
@@ -7253,7 +7253,7 @@
     </p:spTree>
     <p:extLst>
       <p:ext uri="{BB962C8B-B14F-4D97-AF65-F5344CB8AC3E}">
-        <p14:creationId xmlns:p14="http://schemas.microsoft.com/office/powerpoint/2010/main" xmlns="" val="1102970716"/>
+        <p14:creationId xmlns="" xmlns:p14="http://schemas.microsoft.com/office/powerpoint/2010/main" val="1102970716"/>
       </p:ext>
     </p:extLst>
   </p:cSld>
@@ -7261,7 +7261,7 @@
     <a:masterClrMapping/>
   </p:clrMapOvr>
   <mc:AlternateContent xmlns:mc="http://schemas.openxmlformats.org/markup-compatibility/2006">
-    <mc:Choice xmlns:p14="http://schemas.microsoft.com/office/powerpoint/2010/main" xmlns="" Requires="p14">
+    <mc:Choice xmlns="" xmlns:p14="http://schemas.microsoft.com/office/powerpoint/2010/main" Requires="p14">
       <p:transition spd="slow" p14:dur="2000" advClick="0" advTm="5000"/>
     </mc:Choice>
     <mc:Fallback>
@@ -7293,7 +7293,7 @@
           <p:cNvPr id="9" name="Slide Number">
             <a:extLst>
               <a:ext uri="{FF2B5EF4-FFF2-40B4-BE49-F238E27FC236}">
-                <a16:creationId xmlns:a16="http://schemas.microsoft.com/office/drawing/2014/main" xmlns="" id="{0020EB61-2079-41A3-B356-B1D8D48D786E}"/>
+                <a16:creationId xmlns="" xmlns:a16="http://schemas.microsoft.com/office/drawing/2014/main" id="{0020EB61-2079-41A3-B356-B1D8D48D786E}"/>
               </a:ext>
             </a:extLst>
           </p:cNvPr>
@@ -7410,7 +7410,7 @@
           <p:cNvPr id="7" name="Slide Body Text">
             <a:extLst>
               <a:ext uri="{FF2B5EF4-FFF2-40B4-BE49-F238E27FC236}">
-                <a16:creationId xmlns:a16="http://schemas.microsoft.com/office/drawing/2014/main" xmlns="" id="{CB4CB13C-66A1-466B-A6C1-B0BABF5CFEC1}"/>
+                <a16:creationId xmlns="" xmlns:a16="http://schemas.microsoft.com/office/drawing/2014/main" id="{CB4CB13C-66A1-466B-A6C1-B0BABF5CFEC1}"/>
               </a:ext>
             </a:extLst>
           </p:cNvPr>
@@ -7508,7 +7508,7 @@
           <p:cNvPr id="3" name="Logo Software University" descr="Software University logo">
             <a:extLst>
               <a:ext uri="{FF2B5EF4-FFF2-40B4-BE49-F238E27FC236}">
-                <a16:creationId xmlns:a16="http://schemas.microsoft.com/office/drawing/2014/main" xmlns="" id="{5573C101-930B-47AC-967A-A64513DFFDEE}"/>
+                <a16:creationId xmlns="" xmlns:a16="http://schemas.microsoft.com/office/drawing/2014/main" id="{5573C101-930B-47AC-967A-A64513DFFDEE}"/>
               </a:ext>
             </a:extLst>
           </p:cNvPr>
@@ -7531,7 +7531,7 @@
             </a:clrChange>
             <a:extLst>
               <a:ext uri="{28A0092B-C50C-407E-A947-70E740481C1C}">
-                <a14:useLocalDpi xmlns:a14="http://schemas.microsoft.com/office/drawing/2010/main" xmlns="" val="0"/>
+                <a14:useLocalDpi xmlns="" xmlns:a14="http://schemas.microsoft.com/office/drawing/2010/main" val="0"/>
               </a:ext>
             </a:extLst>
           </a:blip>
@@ -7554,7 +7554,7 @@
           <p:cNvPr id="8" name="Slide Title">
             <a:extLst>
               <a:ext uri="{FF2B5EF4-FFF2-40B4-BE49-F238E27FC236}">
-                <a16:creationId xmlns:a16="http://schemas.microsoft.com/office/drawing/2014/main" xmlns="" id="{E2DA9691-CDF5-499C-94BB-AAA61DAC1BFB}"/>
+                <a16:creationId xmlns="" xmlns:a16="http://schemas.microsoft.com/office/drawing/2014/main" id="{E2DA9691-CDF5-499C-94BB-AAA61DAC1BFB}"/>
               </a:ext>
             </a:extLst>
           </p:cNvPr>
@@ -7591,7 +7591,7 @@
           <p:cNvPr id="10" name="Group 9">
             <a:extLst>
               <a:ext uri="{FF2B5EF4-FFF2-40B4-BE49-F238E27FC236}">
-                <a16:creationId xmlns:a16="http://schemas.microsoft.com/office/drawing/2014/main" xmlns="" id="{43CDBCC2-1C96-44BC-B992-7B0C49C34904}"/>
+                <a16:creationId xmlns="" xmlns:a16="http://schemas.microsoft.com/office/drawing/2014/main" id="{43CDBCC2-1C96-44BC-B992-7B0C49C34904}"/>
               </a:ext>
             </a:extLst>
           </p:cNvPr>
@@ -7611,7 +7611,7 @@
             <p:cNvPr id="11" name="Group 10">
               <a:extLst>
                 <a:ext uri="{FF2B5EF4-FFF2-40B4-BE49-F238E27FC236}">
-                  <a16:creationId xmlns:a16="http://schemas.microsoft.com/office/drawing/2014/main" xmlns="" id="{7D71B3A8-4D39-42CF-9255-81EA3A622DD6}"/>
+                  <a16:creationId xmlns="" xmlns:a16="http://schemas.microsoft.com/office/drawing/2014/main" id="{7D71B3A8-4D39-42CF-9255-81EA3A622DD6}"/>
                 </a:ext>
               </a:extLst>
             </p:cNvPr>
@@ -7631,7 +7631,7 @@
               <p:cNvPr id="25" name="Oval 24">
                 <a:extLst>
                   <a:ext uri="{FF2B5EF4-FFF2-40B4-BE49-F238E27FC236}">
-                    <a16:creationId xmlns:a16="http://schemas.microsoft.com/office/drawing/2014/main" xmlns="" id="{B98059F9-1874-426D-8AF7-A12C21F37DD9}"/>
+                    <a16:creationId xmlns="" xmlns:a16="http://schemas.microsoft.com/office/drawing/2014/main" id="{B98059F9-1874-426D-8AF7-A12C21F37DD9}"/>
                   </a:ext>
                 </a:extLst>
               </p:cNvPr>
@@ -7683,7 +7683,7 @@
               <p:cNvPr id="26" name="Rectangle 5">
                 <a:extLst>
                   <a:ext uri="{FF2B5EF4-FFF2-40B4-BE49-F238E27FC236}">
-                    <a16:creationId xmlns:a16="http://schemas.microsoft.com/office/drawing/2014/main" xmlns="" id="{A3A1E077-DBDF-48F0-A924-604984B940A2}"/>
+                    <a16:creationId xmlns="" xmlns:a16="http://schemas.microsoft.com/office/drawing/2014/main" id="{A3A1E077-DBDF-48F0-A924-604984B940A2}"/>
                   </a:ext>
                 </a:extLst>
               </p:cNvPr>
@@ -7828,7 +7828,7 @@
               <p:cNvPr id="27" name="Rectangle 5">
                 <a:extLst>
                   <a:ext uri="{FF2B5EF4-FFF2-40B4-BE49-F238E27FC236}">
-                    <a16:creationId xmlns:a16="http://schemas.microsoft.com/office/drawing/2014/main" xmlns="" id="{798B1F51-1FA4-4199-81C7-62356C936CC9}"/>
+                    <a16:creationId xmlns="" xmlns:a16="http://schemas.microsoft.com/office/drawing/2014/main" id="{798B1F51-1FA4-4199-81C7-62356C936CC9}"/>
                   </a:ext>
                 </a:extLst>
               </p:cNvPr>
@@ -7973,7 +7973,7 @@
               <p:cNvPr id="28" name="Arc 27">
                 <a:extLst>
                   <a:ext uri="{FF2B5EF4-FFF2-40B4-BE49-F238E27FC236}">
-                    <a16:creationId xmlns:a16="http://schemas.microsoft.com/office/drawing/2014/main" xmlns="" id="{40A224C8-1233-40F7-96AB-BFF79AF6CDCB}"/>
+                    <a16:creationId xmlns="" xmlns:a16="http://schemas.microsoft.com/office/drawing/2014/main" id="{40A224C8-1233-40F7-96AB-BFF79AF6CDCB}"/>
                   </a:ext>
                 </a:extLst>
               </p:cNvPr>
@@ -8032,7 +8032,7 @@
               <p:cNvPr id="29" name="Arc 28">
                 <a:extLst>
                   <a:ext uri="{FF2B5EF4-FFF2-40B4-BE49-F238E27FC236}">
-                    <a16:creationId xmlns:a16="http://schemas.microsoft.com/office/drawing/2014/main" xmlns="" id="{B57C7CCC-E218-4321-8C7B-3F0C5753C7A1}"/>
+                    <a16:creationId xmlns="" xmlns:a16="http://schemas.microsoft.com/office/drawing/2014/main" id="{B57C7CCC-E218-4321-8C7B-3F0C5753C7A1}"/>
                   </a:ext>
                 </a:extLst>
               </p:cNvPr>
@@ -8092,7 +8092,7 @@
             <p:cNvPr id="13" name="Rectangle: Rounded Corners 12">
               <a:extLst>
                 <a:ext uri="{FF2B5EF4-FFF2-40B4-BE49-F238E27FC236}">
-                  <a16:creationId xmlns:a16="http://schemas.microsoft.com/office/drawing/2014/main" xmlns="" id="{6AF309CA-A56C-4ABC-B293-420F4EB1A9B4}"/>
+                  <a16:creationId xmlns="" xmlns:a16="http://schemas.microsoft.com/office/drawing/2014/main" id="{6AF309CA-A56C-4ABC-B293-420F4EB1A9B4}"/>
                 </a:ext>
               </a:extLst>
             </p:cNvPr>
@@ -8146,7 +8146,7 @@
             <p:cNvPr id="14" name="Rectangle: Rounded Corners 13">
               <a:extLst>
                 <a:ext uri="{FF2B5EF4-FFF2-40B4-BE49-F238E27FC236}">
-                  <a16:creationId xmlns:a16="http://schemas.microsoft.com/office/drawing/2014/main" xmlns="" id="{07955808-2AC7-44EB-8B6D-82B974E53A3C}"/>
+                  <a16:creationId xmlns="" xmlns:a16="http://schemas.microsoft.com/office/drawing/2014/main" id="{07955808-2AC7-44EB-8B6D-82B974E53A3C}"/>
                 </a:ext>
               </a:extLst>
             </p:cNvPr>
@@ -8207,7 +8207,7 @@
             <p:cNvPr id="15" name="Straight Connector 14">
               <a:extLst>
                 <a:ext uri="{FF2B5EF4-FFF2-40B4-BE49-F238E27FC236}">
-                  <a16:creationId xmlns:a16="http://schemas.microsoft.com/office/drawing/2014/main" xmlns="" id="{AC6420D7-AEAB-45EF-8D46-11EB06E4AFEA}"/>
+                  <a16:creationId xmlns="" xmlns:a16="http://schemas.microsoft.com/office/drawing/2014/main" id="{AC6420D7-AEAB-45EF-8D46-11EB06E4AFEA}"/>
                 </a:ext>
               </a:extLst>
             </p:cNvPr>
@@ -8253,7 +8253,7 @@
             <p:cNvPr id="16" name="Straight Connector 15">
               <a:extLst>
                 <a:ext uri="{FF2B5EF4-FFF2-40B4-BE49-F238E27FC236}">
-                  <a16:creationId xmlns:a16="http://schemas.microsoft.com/office/drawing/2014/main" xmlns="" id="{76C7FABC-6773-44F6-990B-3EB082BE9B35}"/>
+                  <a16:creationId xmlns="" xmlns:a16="http://schemas.microsoft.com/office/drawing/2014/main" id="{76C7FABC-6773-44F6-990B-3EB082BE9B35}"/>
                 </a:ext>
               </a:extLst>
             </p:cNvPr>
@@ -8299,7 +8299,7 @@
             <p:cNvPr id="17" name="Group 16">
               <a:extLst>
                 <a:ext uri="{FF2B5EF4-FFF2-40B4-BE49-F238E27FC236}">
-                  <a16:creationId xmlns:a16="http://schemas.microsoft.com/office/drawing/2014/main" xmlns="" id="{1FAD48E1-DC45-4B3D-9CE5-613250708496}"/>
+                  <a16:creationId xmlns="" xmlns:a16="http://schemas.microsoft.com/office/drawing/2014/main" id="{1FAD48E1-DC45-4B3D-9CE5-613250708496}"/>
                 </a:ext>
               </a:extLst>
             </p:cNvPr>
@@ -8322,7 +8322,7 @@
               <p:cNvPr id="23" name="Straight Connector 22">
                 <a:extLst>
                   <a:ext uri="{FF2B5EF4-FFF2-40B4-BE49-F238E27FC236}">
-                    <a16:creationId xmlns:a16="http://schemas.microsoft.com/office/drawing/2014/main" xmlns="" id="{B01FD1D1-046F-457B-AB63-2702CE3E906E}"/>
+                    <a16:creationId xmlns="" xmlns:a16="http://schemas.microsoft.com/office/drawing/2014/main" id="{B01FD1D1-046F-457B-AB63-2702CE3E906E}"/>
                   </a:ext>
                 </a:extLst>
               </p:cNvPr>
@@ -8366,7 +8366,7 @@
               <p:cNvPr id="24" name="Straight Connector 23">
                 <a:extLst>
                   <a:ext uri="{FF2B5EF4-FFF2-40B4-BE49-F238E27FC236}">
-                    <a16:creationId xmlns:a16="http://schemas.microsoft.com/office/drawing/2014/main" xmlns="" id="{895660C3-C72C-43EE-9C4A-170F85E5BE08}"/>
+                    <a16:creationId xmlns="" xmlns:a16="http://schemas.microsoft.com/office/drawing/2014/main" id="{895660C3-C72C-43EE-9C4A-170F85E5BE08}"/>
                   </a:ext>
                 </a:extLst>
               </p:cNvPr>
@@ -8411,7 +8411,7 @@
             <p:cNvPr id="19" name="Straight Connector 18">
               <a:extLst>
                 <a:ext uri="{FF2B5EF4-FFF2-40B4-BE49-F238E27FC236}">
-                  <a16:creationId xmlns:a16="http://schemas.microsoft.com/office/drawing/2014/main" xmlns="" id="{A74EE503-8FC0-42A6-8860-CA4EE42272E4}"/>
+                  <a16:creationId xmlns="" xmlns:a16="http://schemas.microsoft.com/office/drawing/2014/main" id="{A74EE503-8FC0-42A6-8860-CA4EE42272E4}"/>
                 </a:ext>
               </a:extLst>
             </p:cNvPr>
@@ -8457,7 +8457,7 @@
             <p:cNvPr id="12" name="Rectangle: Rounded Corners 11">
               <a:extLst>
                 <a:ext uri="{FF2B5EF4-FFF2-40B4-BE49-F238E27FC236}">
-                  <a16:creationId xmlns:a16="http://schemas.microsoft.com/office/drawing/2014/main" xmlns="" id="{F4189FDA-9FE8-490B-8A70-2E941811021F}"/>
+                  <a16:creationId xmlns="" xmlns:a16="http://schemas.microsoft.com/office/drawing/2014/main" id="{F4189FDA-9FE8-490B-8A70-2E941811021F}"/>
                 </a:ext>
               </a:extLst>
             </p:cNvPr>
@@ -8511,7 +8511,7 @@
             <p:cNvPr id="18" name="Group 17">
               <a:extLst>
                 <a:ext uri="{FF2B5EF4-FFF2-40B4-BE49-F238E27FC236}">
-                  <a16:creationId xmlns:a16="http://schemas.microsoft.com/office/drawing/2014/main" xmlns="" id="{FDA3EFCD-0DF8-419D-8533-D781521E597E}"/>
+                  <a16:creationId xmlns="" xmlns:a16="http://schemas.microsoft.com/office/drawing/2014/main" id="{FDA3EFCD-0DF8-419D-8533-D781521E597E}"/>
                 </a:ext>
               </a:extLst>
             </p:cNvPr>
@@ -8534,7 +8534,7 @@
               <p:cNvPr id="21" name="Straight Connector 20">
                 <a:extLst>
                   <a:ext uri="{FF2B5EF4-FFF2-40B4-BE49-F238E27FC236}">
-                    <a16:creationId xmlns:a16="http://schemas.microsoft.com/office/drawing/2014/main" xmlns="" id="{C3CC6A5A-182E-4A09-9C04-EB191881D789}"/>
+                    <a16:creationId xmlns="" xmlns:a16="http://schemas.microsoft.com/office/drawing/2014/main" id="{C3CC6A5A-182E-4A09-9C04-EB191881D789}"/>
                   </a:ext>
                 </a:extLst>
               </p:cNvPr>
@@ -8578,7 +8578,7 @@
               <p:cNvPr id="22" name="Straight Connector 21">
                 <a:extLst>
                   <a:ext uri="{FF2B5EF4-FFF2-40B4-BE49-F238E27FC236}">
-                    <a16:creationId xmlns:a16="http://schemas.microsoft.com/office/drawing/2014/main" xmlns="" id="{440C8953-0555-48CC-8255-78F17E053EE7}"/>
+                    <a16:creationId xmlns="" xmlns:a16="http://schemas.microsoft.com/office/drawing/2014/main" id="{440C8953-0555-48CC-8255-78F17E053EE7}"/>
                   </a:ext>
                 </a:extLst>
               </p:cNvPr>
@@ -8624,7 +8624,7 @@
           <p:cNvPr id="34" name="Straight Connector 33">
             <a:extLst>
               <a:ext uri="{FF2B5EF4-FFF2-40B4-BE49-F238E27FC236}">
-                <a16:creationId xmlns:a16="http://schemas.microsoft.com/office/drawing/2014/main" xmlns="" id="{29B538CA-8CCB-43FB-B5E5-5FC04EBC1F54}"/>
+                <a16:creationId xmlns="" xmlns:a16="http://schemas.microsoft.com/office/drawing/2014/main" id="{29B538CA-8CCB-43FB-B5E5-5FC04EBC1F54}"/>
               </a:ext>
             </a:extLst>
           </p:cNvPr>
@@ -8669,7 +8669,7 @@
     </p:spTree>
     <p:extLst>
       <p:ext uri="{BB962C8B-B14F-4D97-AF65-F5344CB8AC3E}">
-        <p14:creationId xmlns:p14="http://schemas.microsoft.com/office/powerpoint/2010/main" xmlns="" val="743545348"/>
+        <p14:creationId xmlns="" xmlns:p14="http://schemas.microsoft.com/office/powerpoint/2010/main" val="743545348"/>
       </p:ext>
     </p:extLst>
   </p:cSld>
@@ -8677,7 +8677,7 @@
     <a:masterClrMapping/>
   </p:clrMapOvr>
   <mc:AlternateContent xmlns:mc="http://schemas.openxmlformats.org/markup-compatibility/2006">
-    <mc:Choice xmlns:p14="http://schemas.microsoft.com/office/powerpoint/2010/main" xmlns="" Requires="p14">
+    <mc:Choice xmlns="" xmlns:p14="http://schemas.microsoft.com/office/powerpoint/2010/main" Requires="p14">
       <p:transition spd="slow" p14:dur="2000" advClick="0" advTm="5000"/>
     </mc:Choice>
     <mc:Fallback>
@@ -8709,7 +8709,7 @@
           <p:cNvPr id="9" name="Slide Number">
             <a:extLst>
               <a:ext uri="{FF2B5EF4-FFF2-40B4-BE49-F238E27FC236}">
-                <a16:creationId xmlns:a16="http://schemas.microsoft.com/office/drawing/2014/main" xmlns="" id="{1865BF6B-7F07-4E9C-879F-80E36EEB3405}"/>
+                <a16:creationId xmlns="" xmlns:a16="http://schemas.microsoft.com/office/drawing/2014/main" id="{1865BF6B-7F07-4E9C-879F-80E36EEB3405}"/>
               </a:ext>
             </a:extLst>
           </p:cNvPr>
@@ -8751,7 +8751,7 @@
           <p:cNvPr id="12" name="Rectangle Left">
             <a:extLst>
               <a:ext uri="{FF2B5EF4-FFF2-40B4-BE49-F238E27FC236}">
-                <a16:creationId xmlns:a16="http://schemas.microsoft.com/office/drawing/2014/main" xmlns="" id="{345FB1C8-7F66-4D5C-ACCE-AE919936BCFD}"/>
+                <a16:creationId xmlns="" xmlns:a16="http://schemas.microsoft.com/office/drawing/2014/main" id="{345FB1C8-7F66-4D5C-ACCE-AE919936BCFD}"/>
               </a:ext>
             </a:extLst>
           </p:cNvPr>
@@ -8832,7 +8832,7 @@
           <p:cNvPr id="15" name="Slide Body Text">
             <a:extLst>
               <a:ext uri="{FF2B5EF4-FFF2-40B4-BE49-F238E27FC236}">
-                <a16:creationId xmlns:a16="http://schemas.microsoft.com/office/drawing/2014/main" xmlns="" id="{6157C8DE-E0AF-422B-BBB1-F0AF1264B5E9}"/>
+                <a16:creationId xmlns="" xmlns:a16="http://schemas.microsoft.com/office/drawing/2014/main" id="{6157C8DE-E0AF-422B-BBB1-F0AF1264B5E9}"/>
               </a:ext>
             </a:extLst>
           </p:cNvPr>
@@ -8930,7 +8930,7 @@
           <p:cNvPr id="16" name="Logo Software University" descr="Software University logo">
             <a:extLst>
               <a:ext uri="{FF2B5EF4-FFF2-40B4-BE49-F238E27FC236}">
-                <a16:creationId xmlns:a16="http://schemas.microsoft.com/office/drawing/2014/main" xmlns="" id="{EFEBB553-EACE-4B4F-8B4F-7629FDD910A4}"/>
+                <a16:creationId xmlns="" xmlns:a16="http://schemas.microsoft.com/office/drawing/2014/main" id="{EFEBB553-EACE-4B4F-8B4F-7629FDD910A4}"/>
               </a:ext>
             </a:extLst>
           </p:cNvPr>
@@ -8953,7 +8953,7 @@
             </a:clrChange>
             <a:extLst>
               <a:ext uri="{28A0092B-C50C-407E-A947-70E740481C1C}">
-                <a14:useLocalDpi xmlns:a14="http://schemas.microsoft.com/office/drawing/2010/main" xmlns="" val="0"/>
+                <a14:useLocalDpi xmlns="" xmlns:a14="http://schemas.microsoft.com/office/drawing/2010/main" val="0"/>
               </a:ext>
             </a:extLst>
           </a:blip>
@@ -8976,7 +8976,7 @@
           <p:cNvPr id="13" name="Slide Title">
             <a:extLst>
               <a:ext uri="{FF2B5EF4-FFF2-40B4-BE49-F238E27FC236}">
-                <a16:creationId xmlns:a16="http://schemas.microsoft.com/office/drawing/2014/main" xmlns="" id="{0D5CC956-5C4A-44BE-8F8B-327FAFA51E97}"/>
+                <a16:creationId xmlns="" xmlns:a16="http://schemas.microsoft.com/office/drawing/2014/main" id="{0D5CC956-5C4A-44BE-8F8B-327FAFA51E97}"/>
               </a:ext>
             </a:extLst>
           </p:cNvPr>
@@ -9013,7 +9013,7 @@
           <p:cNvPr id="33" name="Group 32">
             <a:extLst>
               <a:ext uri="{FF2B5EF4-FFF2-40B4-BE49-F238E27FC236}">
-                <a16:creationId xmlns:a16="http://schemas.microsoft.com/office/drawing/2014/main" xmlns="" id="{7CF60135-47AA-48F0-96BA-0E795668ABDB}"/>
+                <a16:creationId xmlns="" xmlns:a16="http://schemas.microsoft.com/office/drawing/2014/main" id="{7CF60135-47AA-48F0-96BA-0E795668ABDB}"/>
               </a:ext>
             </a:extLst>
           </p:cNvPr>
@@ -9033,7 +9033,7 @@
             <p:cNvPr id="34" name="Group 33">
               <a:extLst>
                 <a:ext uri="{FF2B5EF4-FFF2-40B4-BE49-F238E27FC236}">
-                  <a16:creationId xmlns:a16="http://schemas.microsoft.com/office/drawing/2014/main" xmlns="" id="{2823380E-3936-41AF-BDF7-DA54D75BBF6B}"/>
+                  <a16:creationId xmlns="" xmlns:a16="http://schemas.microsoft.com/office/drawing/2014/main" id="{2823380E-3936-41AF-BDF7-DA54D75BBF6B}"/>
                 </a:ext>
               </a:extLst>
             </p:cNvPr>
@@ -9053,7 +9053,7 @@
               <p:cNvPr id="47" name="Oval 46">
                 <a:extLst>
                   <a:ext uri="{FF2B5EF4-FFF2-40B4-BE49-F238E27FC236}">
-                    <a16:creationId xmlns:a16="http://schemas.microsoft.com/office/drawing/2014/main" xmlns="" id="{52B047D9-D8DD-45C7-9BC8-6D4F682F5182}"/>
+                    <a16:creationId xmlns="" xmlns:a16="http://schemas.microsoft.com/office/drawing/2014/main" id="{52B047D9-D8DD-45C7-9BC8-6D4F682F5182}"/>
                   </a:ext>
                 </a:extLst>
               </p:cNvPr>
@@ -9105,7 +9105,7 @@
               <p:cNvPr id="48" name="Rectangle 5">
                 <a:extLst>
                   <a:ext uri="{FF2B5EF4-FFF2-40B4-BE49-F238E27FC236}">
-                    <a16:creationId xmlns:a16="http://schemas.microsoft.com/office/drawing/2014/main" xmlns="" id="{4D84FE51-BD8E-47EA-9463-CE02FEA31766}"/>
+                    <a16:creationId xmlns="" xmlns:a16="http://schemas.microsoft.com/office/drawing/2014/main" id="{4D84FE51-BD8E-47EA-9463-CE02FEA31766}"/>
                   </a:ext>
                 </a:extLst>
               </p:cNvPr>
@@ -9250,7 +9250,7 @@
               <p:cNvPr id="49" name="Rectangle 5">
                 <a:extLst>
                   <a:ext uri="{FF2B5EF4-FFF2-40B4-BE49-F238E27FC236}">
-                    <a16:creationId xmlns:a16="http://schemas.microsoft.com/office/drawing/2014/main" xmlns="" id="{F5C8F037-C197-4219-AC87-3A81763512BC}"/>
+                    <a16:creationId xmlns="" xmlns:a16="http://schemas.microsoft.com/office/drawing/2014/main" id="{F5C8F037-C197-4219-AC87-3A81763512BC}"/>
                   </a:ext>
                 </a:extLst>
               </p:cNvPr>
@@ -9395,7 +9395,7 @@
               <p:cNvPr id="50" name="Arc 49">
                 <a:extLst>
                   <a:ext uri="{FF2B5EF4-FFF2-40B4-BE49-F238E27FC236}">
-                    <a16:creationId xmlns:a16="http://schemas.microsoft.com/office/drawing/2014/main" xmlns="" id="{786EE401-CF8E-439B-94A0-EE6F3A7D5798}"/>
+                    <a16:creationId xmlns="" xmlns:a16="http://schemas.microsoft.com/office/drawing/2014/main" id="{786EE401-CF8E-439B-94A0-EE6F3A7D5798}"/>
                   </a:ext>
                 </a:extLst>
               </p:cNvPr>
@@ -9454,7 +9454,7 @@
               <p:cNvPr id="51" name="Arc 50">
                 <a:extLst>
                   <a:ext uri="{FF2B5EF4-FFF2-40B4-BE49-F238E27FC236}">
-                    <a16:creationId xmlns:a16="http://schemas.microsoft.com/office/drawing/2014/main" xmlns="" id="{8D9ACD38-B3EB-4A63-9730-CBF0501BF235}"/>
+                    <a16:creationId xmlns="" xmlns:a16="http://schemas.microsoft.com/office/drawing/2014/main" id="{8D9ACD38-B3EB-4A63-9730-CBF0501BF235}"/>
                   </a:ext>
                 </a:extLst>
               </p:cNvPr>
@@ -9514,7 +9514,7 @@
             <p:cNvPr id="35" name="Rectangle: Rounded Corners 34">
               <a:extLst>
                 <a:ext uri="{FF2B5EF4-FFF2-40B4-BE49-F238E27FC236}">
-                  <a16:creationId xmlns:a16="http://schemas.microsoft.com/office/drawing/2014/main" xmlns="" id="{64EE493E-A353-4C75-A3B9-D48ABA2C57CC}"/>
+                  <a16:creationId xmlns="" xmlns:a16="http://schemas.microsoft.com/office/drawing/2014/main" id="{64EE493E-A353-4C75-A3B9-D48ABA2C57CC}"/>
                 </a:ext>
               </a:extLst>
             </p:cNvPr>
@@ -9568,7 +9568,7 @@
             <p:cNvPr id="36" name="Rectangle: Rounded Corners 35">
               <a:extLst>
                 <a:ext uri="{FF2B5EF4-FFF2-40B4-BE49-F238E27FC236}">
-                  <a16:creationId xmlns:a16="http://schemas.microsoft.com/office/drawing/2014/main" xmlns="" id="{718408B9-204E-42E3-9E79-33E047E869BC}"/>
+                  <a16:creationId xmlns="" xmlns:a16="http://schemas.microsoft.com/office/drawing/2014/main" id="{718408B9-204E-42E3-9E79-33E047E869BC}"/>
                 </a:ext>
               </a:extLst>
             </p:cNvPr>
@@ -9629,7 +9629,7 @@
             <p:cNvPr id="37" name="Straight Connector 36">
               <a:extLst>
                 <a:ext uri="{FF2B5EF4-FFF2-40B4-BE49-F238E27FC236}">
-                  <a16:creationId xmlns:a16="http://schemas.microsoft.com/office/drawing/2014/main" xmlns="" id="{0AB66D97-DF6F-4CD2-AF13-42B5C852F673}"/>
+                  <a16:creationId xmlns="" xmlns:a16="http://schemas.microsoft.com/office/drawing/2014/main" id="{0AB66D97-DF6F-4CD2-AF13-42B5C852F673}"/>
                 </a:ext>
               </a:extLst>
             </p:cNvPr>
@@ -9675,7 +9675,7 @@
             <p:cNvPr id="38" name="Straight Connector 37">
               <a:extLst>
                 <a:ext uri="{FF2B5EF4-FFF2-40B4-BE49-F238E27FC236}">
-                  <a16:creationId xmlns:a16="http://schemas.microsoft.com/office/drawing/2014/main" xmlns="" id="{F2AFBA69-C196-4703-8AAB-5F72A8EDCEB5}"/>
+                  <a16:creationId xmlns="" xmlns:a16="http://schemas.microsoft.com/office/drawing/2014/main" id="{F2AFBA69-C196-4703-8AAB-5F72A8EDCEB5}"/>
                 </a:ext>
               </a:extLst>
             </p:cNvPr>
@@ -9721,7 +9721,7 @@
             <p:cNvPr id="39" name="Group 38">
               <a:extLst>
                 <a:ext uri="{FF2B5EF4-FFF2-40B4-BE49-F238E27FC236}">
-                  <a16:creationId xmlns:a16="http://schemas.microsoft.com/office/drawing/2014/main" xmlns="" id="{9AFC66C1-0C1C-4332-9C4E-782574C896B8}"/>
+                  <a16:creationId xmlns="" xmlns:a16="http://schemas.microsoft.com/office/drawing/2014/main" id="{9AFC66C1-0C1C-4332-9C4E-782574C896B8}"/>
                 </a:ext>
               </a:extLst>
             </p:cNvPr>
@@ -9744,7 +9744,7 @@
               <p:cNvPr id="45" name="Straight Connector 44">
                 <a:extLst>
                   <a:ext uri="{FF2B5EF4-FFF2-40B4-BE49-F238E27FC236}">
-                    <a16:creationId xmlns:a16="http://schemas.microsoft.com/office/drawing/2014/main" xmlns="" id="{872CA8AD-EAF6-40BE-9DDE-ECDB4A980CA5}"/>
+                    <a16:creationId xmlns="" xmlns:a16="http://schemas.microsoft.com/office/drawing/2014/main" id="{872CA8AD-EAF6-40BE-9DDE-ECDB4A980CA5}"/>
                   </a:ext>
                 </a:extLst>
               </p:cNvPr>
@@ -9788,7 +9788,7 @@
               <p:cNvPr id="46" name="Straight Connector 45">
                 <a:extLst>
                   <a:ext uri="{FF2B5EF4-FFF2-40B4-BE49-F238E27FC236}">
-                    <a16:creationId xmlns:a16="http://schemas.microsoft.com/office/drawing/2014/main" xmlns="" id="{57DD3EC7-1A13-4AFE-BD6F-DA12C281FAFB}"/>
+                    <a16:creationId xmlns="" xmlns:a16="http://schemas.microsoft.com/office/drawing/2014/main" id="{57DD3EC7-1A13-4AFE-BD6F-DA12C281FAFB}"/>
                   </a:ext>
                 </a:extLst>
               </p:cNvPr>
@@ -9833,7 +9833,7 @@
             <p:cNvPr id="40" name="Straight Connector 39">
               <a:extLst>
                 <a:ext uri="{FF2B5EF4-FFF2-40B4-BE49-F238E27FC236}">
-                  <a16:creationId xmlns:a16="http://schemas.microsoft.com/office/drawing/2014/main" xmlns="" id="{E46151FA-19E9-4E84-A082-EDAC6F76EA9D}"/>
+                  <a16:creationId xmlns="" xmlns:a16="http://schemas.microsoft.com/office/drawing/2014/main" id="{E46151FA-19E9-4E84-A082-EDAC6F76EA9D}"/>
                 </a:ext>
               </a:extLst>
             </p:cNvPr>
@@ -9879,7 +9879,7 @@
             <p:cNvPr id="41" name="Rectangle: Rounded Corners 40">
               <a:extLst>
                 <a:ext uri="{FF2B5EF4-FFF2-40B4-BE49-F238E27FC236}">
-                  <a16:creationId xmlns:a16="http://schemas.microsoft.com/office/drawing/2014/main" xmlns="" id="{3423EEF0-5B70-4091-B2DA-0740D2609643}"/>
+                  <a16:creationId xmlns="" xmlns:a16="http://schemas.microsoft.com/office/drawing/2014/main" id="{3423EEF0-5B70-4091-B2DA-0740D2609643}"/>
                 </a:ext>
               </a:extLst>
             </p:cNvPr>
@@ -9933,7 +9933,7 @@
             <p:cNvPr id="42" name="Group 41">
               <a:extLst>
                 <a:ext uri="{FF2B5EF4-FFF2-40B4-BE49-F238E27FC236}">
-                  <a16:creationId xmlns:a16="http://schemas.microsoft.com/office/drawing/2014/main" xmlns="" id="{49A8AAA7-98E7-4224-B027-830FFCC285A3}"/>
+                  <a16:creationId xmlns="" xmlns:a16="http://schemas.microsoft.com/office/drawing/2014/main" id="{49A8AAA7-98E7-4224-B027-830FFCC285A3}"/>
                 </a:ext>
               </a:extLst>
             </p:cNvPr>
@@ -9956,7 +9956,7 @@
               <p:cNvPr id="43" name="Straight Connector 42">
                 <a:extLst>
                   <a:ext uri="{FF2B5EF4-FFF2-40B4-BE49-F238E27FC236}">
-                    <a16:creationId xmlns:a16="http://schemas.microsoft.com/office/drawing/2014/main" xmlns="" id="{2129EC38-471E-4685-973E-BA7A7F567C42}"/>
+                    <a16:creationId xmlns="" xmlns:a16="http://schemas.microsoft.com/office/drawing/2014/main" id="{2129EC38-471E-4685-973E-BA7A7F567C42}"/>
                   </a:ext>
                 </a:extLst>
               </p:cNvPr>
@@ -10000,7 +10000,7 @@
               <p:cNvPr id="44" name="Straight Connector 43">
                 <a:extLst>
                   <a:ext uri="{FF2B5EF4-FFF2-40B4-BE49-F238E27FC236}">
-                    <a16:creationId xmlns:a16="http://schemas.microsoft.com/office/drawing/2014/main" xmlns="" id="{678142BE-84C9-4834-B6CC-6623E401661C}"/>
+                    <a16:creationId xmlns="" xmlns:a16="http://schemas.microsoft.com/office/drawing/2014/main" id="{678142BE-84C9-4834-B6CC-6623E401661C}"/>
                   </a:ext>
                 </a:extLst>
               </p:cNvPr>
@@ -10044,7 +10044,7 @@
     </p:spTree>
     <p:extLst>
       <p:ext uri="{BB962C8B-B14F-4D97-AF65-F5344CB8AC3E}">
-        <p14:creationId xmlns:p14="http://schemas.microsoft.com/office/powerpoint/2010/main" xmlns="" val="1679651758"/>
+        <p14:creationId xmlns="" xmlns:p14="http://schemas.microsoft.com/office/powerpoint/2010/main" val="1679651758"/>
       </p:ext>
     </p:extLst>
   </p:cSld>
@@ -10052,7 +10052,7 @@
     <a:masterClrMapping/>
   </p:clrMapOvr>
   <mc:AlternateContent xmlns:mc="http://schemas.openxmlformats.org/markup-compatibility/2006">
-    <mc:Choice xmlns:p14="http://schemas.microsoft.com/office/powerpoint/2010/main" xmlns="" Requires="p14">
+    <mc:Choice xmlns="" xmlns:p14="http://schemas.microsoft.com/office/powerpoint/2010/main" Requires="p14">
       <p:transition spd="slow" p14:dur="2000" advClick="0" advTm="5000"/>
     </mc:Choice>
     <mc:Fallback>
@@ -10084,7 +10084,7 @@
           <p:cNvPr id="5" name="Slide Number">
             <a:extLst>
               <a:ext uri="{FF2B5EF4-FFF2-40B4-BE49-F238E27FC236}">
-                <a16:creationId xmlns:a16="http://schemas.microsoft.com/office/drawing/2014/main" xmlns="" id="{F0B8C963-1813-4B69-AD27-6D02EBBBB569}"/>
+                <a16:creationId xmlns="" xmlns:a16="http://schemas.microsoft.com/office/drawing/2014/main" id="{F0B8C963-1813-4B69-AD27-6D02EBBBB569}"/>
               </a:ext>
             </a:extLst>
           </p:cNvPr>
@@ -10126,7 +10126,7 @@
           <p:cNvPr id="3" name="Rectangle Left">
             <a:extLst>
               <a:ext uri="{FF2B5EF4-FFF2-40B4-BE49-F238E27FC236}">
-                <a16:creationId xmlns:a16="http://schemas.microsoft.com/office/drawing/2014/main" xmlns="" id="{345FB1C8-7F66-4D5C-ACCE-AE919936BCFD}"/>
+                <a16:creationId xmlns="" xmlns:a16="http://schemas.microsoft.com/office/drawing/2014/main" id="{345FB1C8-7F66-4D5C-ACCE-AE919936BCFD}"/>
               </a:ext>
             </a:extLst>
           </p:cNvPr>
@@ -10207,7 +10207,7 @@
           <p:cNvPr id="7" name="Slide Body Text">
             <a:extLst>
               <a:ext uri="{FF2B5EF4-FFF2-40B4-BE49-F238E27FC236}">
-                <a16:creationId xmlns:a16="http://schemas.microsoft.com/office/drawing/2014/main" xmlns="" id="{7296EDA7-D37D-4B31-A888-371F0804124F}"/>
+                <a16:creationId xmlns="" xmlns:a16="http://schemas.microsoft.com/office/drawing/2014/main" id="{7296EDA7-D37D-4B31-A888-371F0804124F}"/>
               </a:ext>
             </a:extLst>
           </p:cNvPr>
@@ -10305,7 +10305,7 @@
           <p:cNvPr id="6" name="Slide Title">
             <a:extLst>
               <a:ext uri="{FF2B5EF4-FFF2-40B4-BE49-F238E27FC236}">
-                <a16:creationId xmlns:a16="http://schemas.microsoft.com/office/drawing/2014/main" xmlns="" id="{55A88B09-3557-48A3-BF27-42699C269215}"/>
+                <a16:creationId xmlns="" xmlns:a16="http://schemas.microsoft.com/office/drawing/2014/main" id="{55A88B09-3557-48A3-BF27-42699C269215}"/>
               </a:ext>
             </a:extLst>
           </p:cNvPr>
@@ -10342,7 +10342,7 @@
           <p:cNvPr id="28" name="Group 27">
             <a:extLst>
               <a:ext uri="{FF2B5EF4-FFF2-40B4-BE49-F238E27FC236}">
-                <a16:creationId xmlns:a16="http://schemas.microsoft.com/office/drawing/2014/main" xmlns="" id="{C4248838-4E67-439E-AE0A-0043D2CB04D6}"/>
+                <a16:creationId xmlns="" xmlns:a16="http://schemas.microsoft.com/office/drawing/2014/main" id="{C4248838-4E67-439E-AE0A-0043D2CB04D6}"/>
               </a:ext>
             </a:extLst>
           </p:cNvPr>
@@ -10362,7 +10362,7 @@
             <p:cNvPr id="29" name="Group 28">
               <a:extLst>
                 <a:ext uri="{FF2B5EF4-FFF2-40B4-BE49-F238E27FC236}">
-                  <a16:creationId xmlns:a16="http://schemas.microsoft.com/office/drawing/2014/main" xmlns="" id="{810CFD6A-2427-49D5-846A-5F93601D4184}"/>
+                  <a16:creationId xmlns="" xmlns:a16="http://schemas.microsoft.com/office/drawing/2014/main" id="{810CFD6A-2427-49D5-846A-5F93601D4184}"/>
                 </a:ext>
               </a:extLst>
             </p:cNvPr>
@@ -10382,7 +10382,7 @@
               <p:cNvPr id="42" name="Oval 41">
                 <a:extLst>
                   <a:ext uri="{FF2B5EF4-FFF2-40B4-BE49-F238E27FC236}">
-                    <a16:creationId xmlns:a16="http://schemas.microsoft.com/office/drawing/2014/main" xmlns="" id="{017B1AE5-5C36-4839-BA1F-B404EA44E701}"/>
+                    <a16:creationId xmlns="" xmlns:a16="http://schemas.microsoft.com/office/drawing/2014/main" id="{017B1AE5-5C36-4839-BA1F-B404EA44E701}"/>
                   </a:ext>
                 </a:extLst>
               </p:cNvPr>
@@ -10434,7 +10434,7 @@
               <p:cNvPr id="43" name="Rectangle 5">
                 <a:extLst>
                   <a:ext uri="{FF2B5EF4-FFF2-40B4-BE49-F238E27FC236}">
-                    <a16:creationId xmlns:a16="http://schemas.microsoft.com/office/drawing/2014/main" xmlns="" id="{FB963D79-BB49-4A1D-BA66-EA0670C79BAE}"/>
+                    <a16:creationId xmlns="" xmlns:a16="http://schemas.microsoft.com/office/drawing/2014/main" id="{FB963D79-BB49-4A1D-BA66-EA0670C79BAE}"/>
                   </a:ext>
                 </a:extLst>
               </p:cNvPr>
@@ -10579,7 +10579,7 @@
               <p:cNvPr id="44" name="Rectangle 5">
                 <a:extLst>
                   <a:ext uri="{FF2B5EF4-FFF2-40B4-BE49-F238E27FC236}">
-                    <a16:creationId xmlns:a16="http://schemas.microsoft.com/office/drawing/2014/main" xmlns="" id="{6D7746D8-B913-493B-AAE9-25BC6893D40E}"/>
+                    <a16:creationId xmlns="" xmlns:a16="http://schemas.microsoft.com/office/drawing/2014/main" id="{6D7746D8-B913-493B-AAE9-25BC6893D40E}"/>
                   </a:ext>
                 </a:extLst>
               </p:cNvPr>
@@ -10724,7 +10724,7 @@
               <p:cNvPr id="45" name="Arc 44">
                 <a:extLst>
                   <a:ext uri="{FF2B5EF4-FFF2-40B4-BE49-F238E27FC236}">
-                    <a16:creationId xmlns:a16="http://schemas.microsoft.com/office/drawing/2014/main" xmlns="" id="{29031C02-E965-417B-8799-96061B14F30D}"/>
+                    <a16:creationId xmlns="" xmlns:a16="http://schemas.microsoft.com/office/drawing/2014/main" id="{29031C02-E965-417B-8799-96061B14F30D}"/>
                   </a:ext>
                 </a:extLst>
               </p:cNvPr>
@@ -10783,7 +10783,7 @@
               <p:cNvPr id="46" name="Arc 45">
                 <a:extLst>
                   <a:ext uri="{FF2B5EF4-FFF2-40B4-BE49-F238E27FC236}">
-                    <a16:creationId xmlns:a16="http://schemas.microsoft.com/office/drawing/2014/main" xmlns="" id="{26BFD8A6-BC99-4B16-BA10-08A9E5C681C0}"/>
+                    <a16:creationId xmlns="" xmlns:a16="http://schemas.microsoft.com/office/drawing/2014/main" id="{26BFD8A6-BC99-4B16-BA10-08A9E5C681C0}"/>
                   </a:ext>
                 </a:extLst>
               </p:cNvPr>
@@ -10843,7 +10843,7 @@
             <p:cNvPr id="30" name="Rectangle: Rounded Corners 29">
               <a:extLst>
                 <a:ext uri="{FF2B5EF4-FFF2-40B4-BE49-F238E27FC236}">
-                  <a16:creationId xmlns:a16="http://schemas.microsoft.com/office/drawing/2014/main" xmlns="" id="{B310277F-A78E-4FB9-9EA9-88BE4F1D585B}"/>
+                  <a16:creationId xmlns="" xmlns:a16="http://schemas.microsoft.com/office/drawing/2014/main" id="{B310277F-A78E-4FB9-9EA9-88BE4F1D585B}"/>
                 </a:ext>
               </a:extLst>
             </p:cNvPr>
@@ -10897,7 +10897,7 @@
             <p:cNvPr id="31" name="Rectangle: Rounded Corners 30">
               <a:extLst>
                 <a:ext uri="{FF2B5EF4-FFF2-40B4-BE49-F238E27FC236}">
-                  <a16:creationId xmlns:a16="http://schemas.microsoft.com/office/drawing/2014/main" xmlns="" id="{A92CF92B-C212-4542-83AE-A0058B5BB5EA}"/>
+                  <a16:creationId xmlns="" xmlns:a16="http://schemas.microsoft.com/office/drawing/2014/main" id="{A92CF92B-C212-4542-83AE-A0058B5BB5EA}"/>
                 </a:ext>
               </a:extLst>
             </p:cNvPr>
@@ -10958,7 +10958,7 @@
             <p:cNvPr id="32" name="Straight Connector 31">
               <a:extLst>
                 <a:ext uri="{FF2B5EF4-FFF2-40B4-BE49-F238E27FC236}">
-                  <a16:creationId xmlns:a16="http://schemas.microsoft.com/office/drawing/2014/main" xmlns="" id="{563B4374-5C0D-461F-B3BD-78D99614D365}"/>
+                  <a16:creationId xmlns="" xmlns:a16="http://schemas.microsoft.com/office/drawing/2014/main" id="{563B4374-5C0D-461F-B3BD-78D99614D365}"/>
                 </a:ext>
               </a:extLst>
             </p:cNvPr>
@@ -11004,7 +11004,7 @@
             <p:cNvPr id="33" name="Straight Connector 32">
               <a:extLst>
                 <a:ext uri="{FF2B5EF4-FFF2-40B4-BE49-F238E27FC236}">
-                  <a16:creationId xmlns:a16="http://schemas.microsoft.com/office/drawing/2014/main" xmlns="" id="{FBC6FDE7-AEA1-4230-8433-4C088A0FF5F9}"/>
+                  <a16:creationId xmlns="" xmlns:a16="http://schemas.microsoft.com/office/drawing/2014/main" id="{FBC6FDE7-AEA1-4230-8433-4C088A0FF5F9}"/>
                 </a:ext>
               </a:extLst>
             </p:cNvPr>
@@ -11050,7 +11050,7 @@
             <p:cNvPr id="34" name="Group 33">
               <a:extLst>
                 <a:ext uri="{FF2B5EF4-FFF2-40B4-BE49-F238E27FC236}">
-                  <a16:creationId xmlns:a16="http://schemas.microsoft.com/office/drawing/2014/main" xmlns="" id="{C4D1021D-07C7-4331-8FF6-36980A30978B}"/>
+                  <a16:creationId xmlns="" xmlns:a16="http://schemas.microsoft.com/office/drawing/2014/main" id="{C4D1021D-07C7-4331-8FF6-36980A30978B}"/>
                 </a:ext>
               </a:extLst>
             </p:cNvPr>
@@ -11073,7 +11073,7 @@
               <p:cNvPr id="40" name="Straight Connector 39">
                 <a:extLst>
                   <a:ext uri="{FF2B5EF4-FFF2-40B4-BE49-F238E27FC236}">
-                    <a16:creationId xmlns:a16="http://schemas.microsoft.com/office/drawing/2014/main" xmlns="" id="{13B7FE99-95CF-45D5-966B-87A979B93431}"/>
+                    <a16:creationId xmlns="" xmlns:a16="http://schemas.microsoft.com/office/drawing/2014/main" id="{13B7FE99-95CF-45D5-966B-87A979B93431}"/>
                   </a:ext>
                 </a:extLst>
               </p:cNvPr>
@@ -11117,7 +11117,7 @@
               <p:cNvPr id="41" name="Straight Connector 40">
                 <a:extLst>
                   <a:ext uri="{FF2B5EF4-FFF2-40B4-BE49-F238E27FC236}">
-                    <a16:creationId xmlns:a16="http://schemas.microsoft.com/office/drawing/2014/main" xmlns="" id="{71BBA69B-19FF-4ADB-A739-AD8136A5F0A6}"/>
+                    <a16:creationId xmlns="" xmlns:a16="http://schemas.microsoft.com/office/drawing/2014/main" id="{71BBA69B-19FF-4ADB-A739-AD8136A5F0A6}"/>
                   </a:ext>
                 </a:extLst>
               </p:cNvPr>
@@ -11162,7 +11162,7 @@
             <p:cNvPr id="35" name="Straight Connector 34">
               <a:extLst>
                 <a:ext uri="{FF2B5EF4-FFF2-40B4-BE49-F238E27FC236}">
-                  <a16:creationId xmlns:a16="http://schemas.microsoft.com/office/drawing/2014/main" xmlns="" id="{BFD1D86B-562B-40B2-8E46-34233EFEE7FC}"/>
+                  <a16:creationId xmlns="" xmlns:a16="http://schemas.microsoft.com/office/drawing/2014/main" id="{BFD1D86B-562B-40B2-8E46-34233EFEE7FC}"/>
                 </a:ext>
               </a:extLst>
             </p:cNvPr>
@@ -11208,7 +11208,7 @@
             <p:cNvPr id="36" name="Rectangle: Rounded Corners 35">
               <a:extLst>
                 <a:ext uri="{FF2B5EF4-FFF2-40B4-BE49-F238E27FC236}">
-                  <a16:creationId xmlns:a16="http://schemas.microsoft.com/office/drawing/2014/main" xmlns="" id="{388C17BD-16A1-43C5-BFFA-2FF9174719E1}"/>
+                  <a16:creationId xmlns="" xmlns:a16="http://schemas.microsoft.com/office/drawing/2014/main" id="{388C17BD-16A1-43C5-BFFA-2FF9174719E1}"/>
                 </a:ext>
               </a:extLst>
             </p:cNvPr>
@@ -11262,7 +11262,7 @@
             <p:cNvPr id="37" name="Group 36">
               <a:extLst>
                 <a:ext uri="{FF2B5EF4-FFF2-40B4-BE49-F238E27FC236}">
-                  <a16:creationId xmlns:a16="http://schemas.microsoft.com/office/drawing/2014/main" xmlns="" id="{1B3B910E-ACFC-4F28-8E28-F02E1588B87E}"/>
+                  <a16:creationId xmlns="" xmlns:a16="http://schemas.microsoft.com/office/drawing/2014/main" id="{1B3B910E-ACFC-4F28-8E28-F02E1588B87E}"/>
                 </a:ext>
               </a:extLst>
             </p:cNvPr>
@@ -11285,7 +11285,7 @@
               <p:cNvPr id="38" name="Straight Connector 37">
                 <a:extLst>
                   <a:ext uri="{FF2B5EF4-FFF2-40B4-BE49-F238E27FC236}">
-                    <a16:creationId xmlns:a16="http://schemas.microsoft.com/office/drawing/2014/main" xmlns="" id="{F57772B6-06C0-4F54-AA94-D3F92DA4716A}"/>
+                    <a16:creationId xmlns="" xmlns:a16="http://schemas.microsoft.com/office/drawing/2014/main" id="{F57772B6-06C0-4F54-AA94-D3F92DA4716A}"/>
                   </a:ext>
                 </a:extLst>
               </p:cNvPr>
@@ -11329,7 +11329,7 @@
               <p:cNvPr id="39" name="Straight Connector 38">
                 <a:extLst>
                   <a:ext uri="{FF2B5EF4-FFF2-40B4-BE49-F238E27FC236}">
-                    <a16:creationId xmlns:a16="http://schemas.microsoft.com/office/drawing/2014/main" xmlns="" id="{23370C1F-7876-4278-AB20-78F6CAA385E2}"/>
+                    <a16:creationId xmlns="" xmlns:a16="http://schemas.microsoft.com/office/drawing/2014/main" id="{23370C1F-7876-4278-AB20-78F6CAA385E2}"/>
                   </a:ext>
                 </a:extLst>
               </p:cNvPr>
@@ -11373,7 +11373,7 @@
     </p:spTree>
     <p:extLst>
       <p:ext uri="{BB962C8B-B14F-4D97-AF65-F5344CB8AC3E}">
-        <p14:creationId xmlns:p14="http://schemas.microsoft.com/office/powerpoint/2010/main" xmlns="" val="3284562556"/>
+        <p14:creationId xmlns="" xmlns:p14="http://schemas.microsoft.com/office/powerpoint/2010/main" val="3284562556"/>
       </p:ext>
     </p:extLst>
   </p:cSld>
@@ -11381,7 +11381,7 @@
     <a:masterClrMapping/>
   </p:clrMapOvr>
   <mc:AlternateContent xmlns:mc="http://schemas.openxmlformats.org/markup-compatibility/2006">
-    <mc:Choice xmlns:p14="http://schemas.microsoft.com/office/powerpoint/2010/main" xmlns="" Requires="p14">
+    <mc:Choice xmlns="" xmlns:p14="http://schemas.microsoft.com/office/powerpoint/2010/main" Requires="p14">
       <p:transition spd="slow" p14:dur="2000" advClick="0" advTm="5000"/>
     </mc:Choice>
     <mc:Fallback>
@@ -11413,7 +11413,7 @@
           <p:cNvPr id="8" name="Slide Number">
             <a:extLst>
               <a:ext uri="{FF2B5EF4-FFF2-40B4-BE49-F238E27FC236}">
-                <a16:creationId xmlns:a16="http://schemas.microsoft.com/office/drawing/2014/main" xmlns="" id="{509D954E-A844-4072-A556-DE584BEB9321}"/>
+                <a16:creationId xmlns="" xmlns:a16="http://schemas.microsoft.com/office/drawing/2014/main" id="{509D954E-A844-4072-A556-DE584BEB9321}"/>
               </a:ext>
             </a:extLst>
           </p:cNvPr>
@@ -11455,7 +11455,7 @@
           <p:cNvPr id="6" name="Code Box">
             <a:extLst>
               <a:ext uri="{FF2B5EF4-FFF2-40B4-BE49-F238E27FC236}">
-                <a16:creationId xmlns:a16="http://schemas.microsoft.com/office/drawing/2014/main" xmlns="" id="{3278A82F-5546-4977-9F75-2A933B415945}"/>
+                <a16:creationId xmlns="" xmlns:a16="http://schemas.microsoft.com/office/drawing/2014/main" id="{3278A82F-5546-4977-9F75-2A933B415945}"/>
               </a:ext>
             </a:extLst>
           </p:cNvPr>
@@ -11542,7 +11542,7 @@
           <p:cNvPr id="21" name="Slide Body Text">
             <a:extLst>
               <a:ext uri="{FF2B5EF4-FFF2-40B4-BE49-F238E27FC236}">
-                <a16:creationId xmlns:a16="http://schemas.microsoft.com/office/drawing/2014/main" xmlns="" id="{04F318BE-2BAD-4677-871C-D78A4BF0CBA6}"/>
+                <a16:creationId xmlns="" xmlns:a16="http://schemas.microsoft.com/office/drawing/2014/main" id="{04F318BE-2BAD-4677-871C-D78A4BF0CBA6}"/>
               </a:ext>
             </a:extLst>
           </p:cNvPr>
@@ -11589,7 +11589,7 @@
           <p:cNvPr id="9" name="Rectangle Top">
             <a:extLst>
               <a:ext uri="{FF2B5EF4-FFF2-40B4-BE49-F238E27FC236}">
-                <a16:creationId xmlns:a16="http://schemas.microsoft.com/office/drawing/2014/main" xmlns="" id="{A15CE03A-0933-4E5D-9EA1-718D4F802FFC}"/>
+                <a16:creationId xmlns="" xmlns:a16="http://schemas.microsoft.com/office/drawing/2014/main" id="{A15CE03A-0933-4E5D-9EA1-718D4F802FFC}"/>
               </a:ext>
             </a:extLst>
           </p:cNvPr>
@@ -11670,7 +11670,7 @@
           <p:cNvPr id="10" name="Logo Software University" descr="Software University logo">
             <a:extLst>
               <a:ext uri="{FF2B5EF4-FFF2-40B4-BE49-F238E27FC236}">
-                <a16:creationId xmlns:a16="http://schemas.microsoft.com/office/drawing/2014/main" xmlns="" id="{8C01D7AF-7CBD-46E1-99F3-8EB60E838D91}"/>
+                <a16:creationId xmlns="" xmlns:a16="http://schemas.microsoft.com/office/drawing/2014/main" id="{8C01D7AF-7CBD-46E1-99F3-8EB60E838D91}"/>
               </a:ext>
             </a:extLst>
           </p:cNvPr>
@@ -11683,7 +11683,7 @@
           <a:blip r:embed="rId2" cstate="print">
             <a:extLst>
               <a:ext uri="{28A0092B-C50C-407E-A947-70E740481C1C}">
-                <a14:useLocalDpi xmlns:a14="http://schemas.microsoft.com/office/drawing/2010/main" xmlns="" val="0"/>
+                <a14:useLocalDpi xmlns="" xmlns:a14="http://schemas.microsoft.com/office/drawing/2010/main" val="0"/>
               </a:ext>
             </a:extLst>
           </a:blip>
@@ -11706,7 +11706,7 @@
           <p:cNvPr id="11" name="Slide Title">
             <a:extLst>
               <a:ext uri="{FF2B5EF4-FFF2-40B4-BE49-F238E27FC236}">
-                <a16:creationId xmlns:a16="http://schemas.microsoft.com/office/drawing/2014/main" xmlns="" id="{47D60833-F0A9-4F29-8C06-A963A7C8BE93}"/>
+                <a16:creationId xmlns="" xmlns:a16="http://schemas.microsoft.com/office/drawing/2014/main" id="{47D60833-F0A9-4F29-8C06-A963A7C8BE93}"/>
               </a:ext>
             </a:extLst>
           </p:cNvPr>
@@ -11745,7 +11745,7 @@
     </p:spTree>
     <p:extLst>
       <p:ext uri="{BB962C8B-B14F-4D97-AF65-F5344CB8AC3E}">
-        <p14:creationId xmlns:p14="http://schemas.microsoft.com/office/powerpoint/2010/main" xmlns="" val="1000829826"/>
+        <p14:creationId xmlns="" xmlns:p14="http://schemas.microsoft.com/office/powerpoint/2010/main" val="1000829826"/>
       </p:ext>
     </p:extLst>
   </p:cSld>
@@ -11753,7 +11753,7 @@
     <a:masterClrMapping/>
   </p:clrMapOvr>
   <mc:AlternateContent xmlns:mc="http://schemas.openxmlformats.org/markup-compatibility/2006">
-    <mc:Choice xmlns:p14="http://schemas.microsoft.com/office/powerpoint/2010/main" xmlns="" Requires="p14">
+    <mc:Choice xmlns="" xmlns:p14="http://schemas.microsoft.com/office/powerpoint/2010/main" Requires="p14">
       <p:transition spd="slow" p14:dur="2000" advClick="0" advTm="5000"/>
     </mc:Choice>
     <mc:Fallback>
@@ -11785,7 +11785,7 @@
           <p:cNvPr id="10" name="Slide Number">
             <a:extLst>
               <a:ext uri="{FF2B5EF4-FFF2-40B4-BE49-F238E27FC236}">
-                <a16:creationId xmlns:a16="http://schemas.microsoft.com/office/drawing/2014/main" xmlns="" id="{39DDE17E-5472-41F3-AF5F-54DFF10DC63C}"/>
+                <a16:creationId xmlns="" xmlns:a16="http://schemas.microsoft.com/office/drawing/2014/main" id="{39DDE17E-5472-41F3-AF5F-54DFF10DC63C}"/>
               </a:ext>
             </a:extLst>
           </p:cNvPr>
@@ -11827,7 +11827,7 @@
           <p:cNvPr id="9" name="Picture SoftUni Mascot" descr="SoftUni mascot with laptop">
             <a:extLst>
               <a:ext uri="{FF2B5EF4-FFF2-40B4-BE49-F238E27FC236}">
-                <a16:creationId xmlns:a16="http://schemas.microsoft.com/office/drawing/2014/main" xmlns="" id="{DC4365F6-D2C1-47B4-8477-38FD2C7711AA}"/>
+                <a16:creationId xmlns="" xmlns:a16="http://schemas.microsoft.com/office/drawing/2014/main" id="{DC4365F6-D2C1-47B4-8477-38FD2C7711AA}"/>
               </a:ext>
             </a:extLst>
           </p:cNvPr>
@@ -11840,7 +11840,7 @@
           <a:blip r:embed="rId2" cstate="print">
             <a:extLst>
               <a:ext uri="{28A0092B-C50C-407E-A947-70E740481C1C}">
-                <a14:useLocalDpi xmlns:a14="http://schemas.microsoft.com/office/drawing/2010/main" xmlns="" val="0"/>
+                <a14:useLocalDpi xmlns="" xmlns:a14="http://schemas.microsoft.com/office/drawing/2010/main" val="0"/>
               </a:ext>
             </a:extLst>
           </a:blip>
@@ -11863,7 +11863,7 @@
           <p:cNvPr id="23" name="Slide Body Text">
             <a:extLst>
               <a:ext uri="{FF2B5EF4-FFF2-40B4-BE49-F238E27FC236}">
-                <a16:creationId xmlns:a16="http://schemas.microsoft.com/office/drawing/2014/main" xmlns="" id="{889D93F4-ABFA-46BF-8E5D-FE6562ACB20F}"/>
+                <a16:creationId xmlns="" xmlns:a16="http://schemas.microsoft.com/office/drawing/2014/main" id="{889D93F4-ABFA-46BF-8E5D-FE6562ACB20F}"/>
               </a:ext>
             </a:extLst>
           </p:cNvPr>
@@ -11954,7 +11954,7 @@
           <p:cNvPr id="8" name="Rectangle Top">
             <a:extLst>
               <a:ext uri="{FF2B5EF4-FFF2-40B4-BE49-F238E27FC236}">
-                <a16:creationId xmlns:a16="http://schemas.microsoft.com/office/drawing/2014/main" xmlns="" id="{930E0800-9260-4369-8330-8264DD33C5CE}"/>
+                <a16:creationId xmlns="" xmlns:a16="http://schemas.microsoft.com/office/drawing/2014/main" id="{930E0800-9260-4369-8330-8264DD33C5CE}"/>
               </a:ext>
             </a:extLst>
           </p:cNvPr>
@@ -12035,7 +12035,7 @@
           <p:cNvPr id="11" name="Logo Software University" descr="Software University logo">
             <a:extLst>
               <a:ext uri="{FF2B5EF4-FFF2-40B4-BE49-F238E27FC236}">
-                <a16:creationId xmlns:a16="http://schemas.microsoft.com/office/drawing/2014/main" xmlns="" id="{14F779A7-4A91-448B-BEFA-956C70A1C22F}"/>
+                <a16:creationId xmlns="" xmlns:a16="http://schemas.microsoft.com/office/drawing/2014/main" id="{14F779A7-4A91-448B-BEFA-956C70A1C22F}"/>
               </a:ext>
             </a:extLst>
           </p:cNvPr>
@@ -12048,7 +12048,7 @@
           <a:blip r:embed="rId3" cstate="print">
             <a:extLst>
               <a:ext uri="{28A0092B-C50C-407E-A947-70E740481C1C}">
-                <a14:useLocalDpi xmlns:a14="http://schemas.microsoft.com/office/drawing/2010/main" xmlns="" val="0"/>
+                <a14:useLocalDpi xmlns="" xmlns:a14="http://schemas.microsoft.com/office/drawing/2010/main" val="0"/>
               </a:ext>
             </a:extLst>
           </a:blip>
@@ -12071,7 +12071,7 @@
           <p:cNvPr id="13" name="Slide Title">
             <a:extLst>
               <a:ext uri="{FF2B5EF4-FFF2-40B4-BE49-F238E27FC236}">
-                <a16:creationId xmlns:a16="http://schemas.microsoft.com/office/drawing/2014/main" xmlns="" id="{357D7BE1-6358-42CC-94F3-7BCDD91DCB6D}"/>
+                <a16:creationId xmlns="" xmlns:a16="http://schemas.microsoft.com/office/drawing/2014/main" id="{357D7BE1-6358-42CC-94F3-7BCDD91DCB6D}"/>
               </a:ext>
             </a:extLst>
           </p:cNvPr>
@@ -12110,7 +12110,7 @@
     </p:spTree>
     <p:extLst>
       <p:ext uri="{BB962C8B-B14F-4D97-AF65-F5344CB8AC3E}">
-        <p14:creationId xmlns:p14="http://schemas.microsoft.com/office/powerpoint/2010/main" xmlns="" val="1028724482"/>
+        <p14:creationId xmlns="" xmlns:p14="http://schemas.microsoft.com/office/powerpoint/2010/main" val="1028724482"/>
       </p:ext>
     </p:extLst>
   </p:cSld>
@@ -12118,7 +12118,7 @@
     <a:masterClrMapping/>
   </p:clrMapOvr>
   <mc:AlternateContent xmlns:mc="http://schemas.openxmlformats.org/markup-compatibility/2006">
-    <mc:Choice xmlns:p14="http://schemas.microsoft.com/office/powerpoint/2010/main" xmlns="" Requires="p14">
+    <mc:Choice xmlns="" xmlns:p14="http://schemas.microsoft.com/office/powerpoint/2010/main" Requires="p14">
       <p:transition spd="slow" p14:dur="2000" advClick="0" advTm="5000"/>
     </mc:Choice>
     <mc:Fallback>
@@ -12230,7 +12230,7 @@
           <p:cNvPr id="11" name="Slide Number">
             <a:extLst>
               <a:ext uri="{FF2B5EF4-FFF2-40B4-BE49-F238E27FC236}">
-                <a16:creationId xmlns:a16="http://schemas.microsoft.com/office/drawing/2014/main" xmlns="" id="{6750ECE4-94E0-469B-B8E4-562792823B0F}"/>
+                <a16:creationId xmlns="" xmlns:a16="http://schemas.microsoft.com/office/drawing/2014/main" id="{6750ECE4-94E0-469B-B8E4-562792823B0F}"/>
               </a:ext>
             </a:extLst>
           </p:cNvPr>
@@ -12353,7 +12353,7 @@
           <p:cNvPr id="12" name="Logo Software University Down" descr="Software University logo">
             <a:extLst>
               <a:ext uri="{FF2B5EF4-FFF2-40B4-BE49-F238E27FC236}">
-                <a16:creationId xmlns:a16="http://schemas.microsoft.com/office/drawing/2014/main" xmlns="" id="{7028D2F0-1E67-414B-A93D-D3F8F131A132}"/>
+                <a16:creationId xmlns="" xmlns:a16="http://schemas.microsoft.com/office/drawing/2014/main" id="{7028D2F0-1E67-414B-A93D-D3F8F131A132}"/>
               </a:ext>
             </a:extLst>
           </p:cNvPr>
@@ -12366,7 +12366,7 @@
           <a:blip r:embed="rId2" cstate="print">
             <a:extLst>
               <a:ext uri="{28A0092B-C50C-407E-A947-70E740481C1C}">
-                <a14:useLocalDpi xmlns:a14="http://schemas.microsoft.com/office/drawing/2010/main" xmlns="" val="0"/>
+                <a14:useLocalDpi xmlns="" xmlns:a14="http://schemas.microsoft.com/office/drawing/2010/main" val="0"/>
               </a:ext>
             </a:extLst>
           </a:blip>
@@ -12389,7 +12389,7 @@
           <p:cNvPr id="10" name="Text Placeholder Right">
             <a:extLst>
               <a:ext uri="{FF2B5EF4-FFF2-40B4-BE49-F238E27FC236}">
-                <a16:creationId xmlns:a16="http://schemas.microsoft.com/office/drawing/2014/main" xmlns="" id="{AF69A59F-C564-4A04-B1CC-31C261499991}"/>
+                <a16:creationId xmlns="" xmlns:a16="http://schemas.microsoft.com/office/drawing/2014/main" id="{AF69A59F-C564-4A04-B1CC-31C261499991}"/>
               </a:ext>
             </a:extLst>
           </p:cNvPr>
@@ -12467,7 +12467,7 @@
           <p:cNvPr id="9" name="Text Placeholder Left">
             <a:extLst>
               <a:ext uri="{FF2B5EF4-FFF2-40B4-BE49-F238E27FC236}">
-                <a16:creationId xmlns:a16="http://schemas.microsoft.com/office/drawing/2014/main" xmlns="" id="{C8A626D2-456B-41EF-9818-EA8DD7E314DA}"/>
+                <a16:creationId xmlns="" xmlns:a16="http://schemas.microsoft.com/office/drawing/2014/main" id="{C8A626D2-456B-41EF-9818-EA8DD7E314DA}"/>
               </a:ext>
             </a:extLst>
           </p:cNvPr>
@@ -12545,7 +12545,7 @@
           <p:cNvPr id="13" name="Rectangle Top">
             <a:extLst>
               <a:ext uri="{FF2B5EF4-FFF2-40B4-BE49-F238E27FC236}">
-                <a16:creationId xmlns:a16="http://schemas.microsoft.com/office/drawing/2014/main" xmlns="" id="{E03301DA-D0AF-46FD-8740-2F761250203A}"/>
+                <a16:creationId xmlns="" xmlns:a16="http://schemas.microsoft.com/office/drawing/2014/main" id="{E03301DA-D0AF-46FD-8740-2F761250203A}"/>
               </a:ext>
             </a:extLst>
           </p:cNvPr>
@@ -12626,7 +12626,7 @@
           <p:cNvPr id="14" name="Logo Software University" descr="Software University logo">
             <a:extLst>
               <a:ext uri="{FF2B5EF4-FFF2-40B4-BE49-F238E27FC236}">
-                <a16:creationId xmlns:a16="http://schemas.microsoft.com/office/drawing/2014/main" xmlns="" id="{19A67BB9-D880-4EAD-B90E-89C4219BFC0B}"/>
+                <a16:creationId xmlns="" xmlns:a16="http://schemas.microsoft.com/office/drawing/2014/main" id="{19A67BB9-D880-4EAD-B90E-89C4219BFC0B}"/>
               </a:ext>
             </a:extLst>
           </p:cNvPr>
@@ -12639,7 +12639,7 @@
           <a:blip r:embed="rId3" cstate="print">
             <a:extLst>
               <a:ext uri="{28A0092B-C50C-407E-A947-70E740481C1C}">
-                <a14:useLocalDpi xmlns:a14="http://schemas.microsoft.com/office/drawing/2010/main" xmlns="" val="0"/>
+                <a14:useLocalDpi xmlns="" xmlns:a14="http://schemas.microsoft.com/office/drawing/2010/main" val="0"/>
               </a:ext>
             </a:extLst>
           </a:blip>
@@ -12662,7 +12662,7 @@
           <p:cNvPr id="15" name="Slide Title">
             <a:extLst>
               <a:ext uri="{FF2B5EF4-FFF2-40B4-BE49-F238E27FC236}">
-                <a16:creationId xmlns:a16="http://schemas.microsoft.com/office/drawing/2014/main" xmlns="" id="{EA9A94D1-F9F6-4D7B-85E3-896A987B6A4D}"/>
+                <a16:creationId xmlns="" xmlns:a16="http://schemas.microsoft.com/office/drawing/2014/main" id="{EA9A94D1-F9F6-4D7B-85E3-896A987B6A4D}"/>
               </a:ext>
             </a:extLst>
           </p:cNvPr>
@@ -12701,7 +12701,7 @@
     </p:spTree>
     <p:extLst>
       <p:ext uri="{BB962C8B-B14F-4D97-AF65-F5344CB8AC3E}">
-        <p14:creationId xmlns:p14="http://schemas.microsoft.com/office/powerpoint/2010/main" xmlns="" val="3044033461"/>
+        <p14:creationId xmlns="" xmlns:p14="http://schemas.microsoft.com/office/powerpoint/2010/main" val="3044033461"/>
       </p:ext>
     </p:extLst>
   </p:cSld>
@@ -12709,7 +12709,7 @@
     <a:masterClrMapping/>
   </p:clrMapOvr>
   <mc:AlternateContent xmlns:mc="http://schemas.openxmlformats.org/markup-compatibility/2006">
-    <mc:Choice xmlns:p14="http://schemas.microsoft.com/office/powerpoint/2010/main" xmlns="" Requires="p14">
+    <mc:Choice xmlns="" xmlns:p14="http://schemas.microsoft.com/office/powerpoint/2010/main" Requires="p14">
       <p:transition spd="slow" p14:dur="2000" advClick="0" advTm="5000"/>
     </mc:Choice>
     <mc:Fallback>
@@ -12718,7 +12718,7 @@
   </mc:AlternateContent>
   <p:extLst>
     <p:ext uri="{DCECCB84-F9BA-43D5-87BE-67443E8EF086}">
-      <p15:sldGuideLst xmlns:p15="http://schemas.microsoft.com/office/powerpoint/2012/main" xmlns="">
+      <p15:sldGuideLst xmlns="" xmlns:p15="http://schemas.microsoft.com/office/powerpoint/2012/main">
         <p15:guide id="1" orient="horz" pos="2160">
           <p15:clr>
             <a:srgbClr val="FBAE40"/>
@@ -12765,7 +12765,7 @@
           <p:cNvPr id="4" name="Picture Background" descr="SoftUni Background">
             <a:extLst>
               <a:ext uri="{FF2B5EF4-FFF2-40B4-BE49-F238E27FC236}">
-                <a16:creationId xmlns:a16="http://schemas.microsoft.com/office/drawing/2014/main" xmlns="" id="{5BE90A63-DDD9-4B3B-A234-DF69B9BC812F}"/>
+                <a16:creationId xmlns="" xmlns:a16="http://schemas.microsoft.com/office/drawing/2014/main" id="{5BE90A63-DDD9-4B3B-A234-DF69B9BC812F}"/>
               </a:ext>
             </a:extLst>
           </p:cNvPr>
@@ -12794,7 +12794,7 @@
           <p:cNvPr id="11" name="Slide Body Text">
             <a:extLst>
               <a:ext uri="{FF2B5EF4-FFF2-40B4-BE49-F238E27FC236}">
-                <a16:creationId xmlns:a16="http://schemas.microsoft.com/office/drawing/2014/main" xmlns="" id="{90CBFB32-9F46-4F2F-8A54-9EE8BED27855}"/>
+                <a16:creationId xmlns="" xmlns:a16="http://schemas.microsoft.com/office/drawing/2014/main" id="{90CBFB32-9F46-4F2F-8A54-9EE8BED27855}"/>
               </a:ext>
             </a:extLst>
           </p:cNvPr>
@@ -12862,7 +12862,7 @@
           <p:cNvPr id="10" name="Slide Title">
             <a:extLst>
               <a:ext uri="{FF2B5EF4-FFF2-40B4-BE49-F238E27FC236}">
-                <a16:creationId xmlns:a16="http://schemas.microsoft.com/office/drawing/2014/main" xmlns="" id="{B770C392-3003-4C35-9625-BB041F8257BA}"/>
+                <a16:creationId xmlns="" xmlns:a16="http://schemas.microsoft.com/office/drawing/2014/main" id="{B770C392-3003-4C35-9625-BB041F8257BA}"/>
               </a:ext>
             </a:extLst>
           </p:cNvPr>
@@ -12899,7 +12899,7 @@
     </p:spTree>
     <p:extLst>
       <p:ext uri="{BB962C8B-B14F-4D97-AF65-F5344CB8AC3E}">
-        <p14:creationId xmlns:p14="http://schemas.microsoft.com/office/powerpoint/2010/main" xmlns="" val="156789181"/>
+        <p14:creationId xmlns="" xmlns:p14="http://schemas.microsoft.com/office/powerpoint/2010/main" val="156789181"/>
       </p:ext>
     </p:extLst>
   </p:cSld>
@@ -12923,7 +12923,7 @@
     <p:sldLayoutId id="2147483697" r:id="rId16"/>
   </p:sldLayoutIdLst>
   <mc:AlternateContent xmlns:mc="http://schemas.openxmlformats.org/markup-compatibility/2006">
-    <mc:Choice xmlns:p14="http://schemas.microsoft.com/office/powerpoint/2010/main" xmlns="" Requires="p14">
+    <mc:Choice xmlns="" xmlns:p14="http://schemas.microsoft.com/office/powerpoint/2010/main" Requires="p14">
       <p:transition spd="slow" p14:dur="2000" advClick="0" advTm="5000"/>
     </mc:Choice>
     <mc:Fallback>
@@ -13213,7 +13213,7 @@
   </p:txStyles>
   <p:extLst>
     <p:ext uri="{27BBF7A9-308A-43DC-89C8-2F10F3537804}">
-      <p15:sldGuideLst xmlns:p15="http://schemas.microsoft.com/office/powerpoint/2012/main" xmlns="">
+      <p15:sldGuideLst xmlns="" xmlns:p15="http://schemas.microsoft.com/office/powerpoint/2012/main">
         <p15:guide id="1" orient="horz" pos="2160">
           <p15:clr>
             <a:srgbClr val="F26B43"/>
@@ -13309,7 +13309,7 @@
           <p:cNvPr id="10" name="Author Position">
             <a:extLst>
               <a:ext uri="{FF2B5EF4-FFF2-40B4-BE49-F238E27FC236}">
-                <a16:creationId xmlns:a16="http://schemas.microsoft.com/office/drawing/2014/main" xmlns="" id="{F585BC4C-0F13-4FD4-8F23-99FD46618370}"/>
+                <a16:creationId xmlns="" xmlns:a16="http://schemas.microsoft.com/office/drawing/2014/main" id="{F585BC4C-0F13-4FD4-8F23-99FD46618370}"/>
               </a:ext>
             </a:extLst>
           </p:cNvPr>
@@ -13342,7 +13342,7 @@
           <p:cNvPr id="9" name="Author Name">
             <a:extLst>
               <a:ext uri="{FF2B5EF4-FFF2-40B4-BE49-F238E27FC236}">
-                <a16:creationId xmlns:a16="http://schemas.microsoft.com/office/drawing/2014/main" xmlns="" id="{FA396BB6-2053-4690-9672-BC528007D370}"/>
+                <a16:creationId xmlns="" xmlns:a16="http://schemas.microsoft.com/office/drawing/2014/main" id="{FA396BB6-2053-4690-9672-BC528007D370}"/>
               </a:ext>
             </a:extLst>
           </p:cNvPr>
@@ -13375,7 +13375,7 @@
           <p:cNvPr id="3" name="Presentation Subtitle">
             <a:extLst>
               <a:ext uri="{FF2B5EF4-FFF2-40B4-BE49-F238E27FC236}">
-                <a16:creationId xmlns:a16="http://schemas.microsoft.com/office/drawing/2014/main" xmlns="" id="{A004DC04-DA2A-41C0-8578-4B8D2F08EA7D}"/>
+                <a16:creationId xmlns="" xmlns:a16="http://schemas.microsoft.com/office/drawing/2014/main" id="{A004DC04-DA2A-41C0-8578-4B8D2F08EA7D}"/>
               </a:ext>
             </a:extLst>
           </p:cNvPr>
@@ -13431,7 +13431,7 @@
           <p:cNvPr id="16" name="Title 15">
             <a:extLst>
               <a:ext uri="{FF2B5EF4-FFF2-40B4-BE49-F238E27FC236}">
-                <a16:creationId xmlns:a16="http://schemas.microsoft.com/office/drawing/2014/main" xmlns="" id="{09D526E5-16F9-CDC3-F025-1D308EB5C234}"/>
+                <a16:creationId xmlns="" xmlns:a16="http://schemas.microsoft.com/office/drawing/2014/main" id="{09D526E5-16F9-CDC3-F025-1D308EB5C234}"/>
               </a:ext>
             </a:extLst>
           </p:cNvPr>
@@ -13499,7 +13499,7 @@
     </p:spTree>
     <p:extLst>
       <p:ext uri="{BB962C8B-B14F-4D97-AF65-F5344CB8AC3E}">
-        <p14:creationId xmlns:p14="http://schemas.microsoft.com/office/powerpoint/2010/main" xmlns="" val="3666405375"/>
+        <p14:creationId xmlns="" xmlns:p14="http://schemas.microsoft.com/office/powerpoint/2010/main" val="3666405375"/>
       </p:ext>
     </p:extLst>
   </p:cSld>
@@ -13507,7 +13507,7 @@
     <a:masterClrMapping/>
   </p:clrMapOvr>
   <mc:AlternateContent xmlns:mc="http://schemas.openxmlformats.org/markup-compatibility/2006">
-    <mc:Choice xmlns:p14="http://schemas.microsoft.com/office/powerpoint/2010/main" xmlns="" Requires="p14">
+    <mc:Choice xmlns="" xmlns:p14="http://schemas.microsoft.com/office/powerpoint/2010/main" Requires="p14">
       <p:transition spd="slow" p14:dur="2000" advClick="0" advTm="5000"/>
     </mc:Choice>
     <mc:Fallback>
@@ -13580,11 +13580,7 @@
             <a:pPr lvl="1"/>
             <a:r>
               <a:rPr lang="ru-RU" dirty="0" smtClean="0"/>
-              <a:t>Може </a:t>
-            </a:r>
-            <a:r>
-              <a:rPr lang="ru-RU" dirty="0" smtClean="0"/>
-              <a:t>да съдържа </a:t>
+              <a:t>Може да съдържа </a:t>
             </a:r>
             <a:r>
               <a:rPr lang="ru-RU" b="1" dirty="0" smtClean="0">
@@ -13668,11 +13664,7 @@
           <a:p>
             <a:r>
               <a:rPr lang="ru-RU" dirty="0" smtClean="0"/>
-              <a:t>Препоръчва </a:t>
-            </a:r>
-            <a:r>
-              <a:rPr lang="ru-RU" dirty="0" smtClean="0"/>
-              <a:t>се да бъде в </a:t>
+              <a:t>Препоръчва се да бъде в </a:t>
             </a:r>
             <a:r>
               <a:rPr lang="ru-RU" b="1" dirty="0" smtClean="0">
@@ -14144,7 +14136,7 @@
           <p:cNvPr id="9" name="Slide Number">
             <a:extLst>
               <a:ext uri="{FF2B5EF4-FFF2-40B4-BE49-F238E27FC236}">
-                <a16:creationId xmlns:a16="http://schemas.microsoft.com/office/drawing/2014/main" xmlns="" id="{1E6DEA9D-C952-4CF5-9DA1-D2C0A4A0BCC9}"/>
+                <a16:creationId xmlns="" xmlns:a16="http://schemas.microsoft.com/office/drawing/2014/main" id="{1E6DEA9D-C952-4CF5-9DA1-D2C0A4A0BCC9}"/>
               </a:ext>
             </a:extLst>
           </p:cNvPr>
@@ -14184,7 +14176,7 @@
     </p:spTree>
     <p:extLst>
       <p:ext uri="{BB962C8B-B14F-4D97-AF65-F5344CB8AC3E}">
-        <p14:creationId xmlns:p14="http://schemas.microsoft.com/office/powerpoint/2010/main" xmlns="" val="902498839"/>
+        <p14:creationId xmlns="" xmlns:p14="http://schemas.microsoft.com/office/powerpoint/2010/main" val="902498839"/>
       </p:ext>
     </p:extLst>
   </p:cSld>
@@ -14192,7 +14184,7 @@
     <a:masterClrMapping/>
   </p:clrMapOvr>
   <mc:AlternateContent xmlns:mc="http://schemas.openxmlformats.org/markup-compatibility/2006">
-    <mc:Choice xmlns:p14="http://schemas.microsoft.com/office/powerpoint/2010/main" xmlns="" Requires="p14">
+    <mc:Choice xmlns="" xmlns:p14="http://schemas.microsoft.com/office/powerpoint/2010/main" Requires="p14">
       <p:transition spd="slow" p14:dur="2000" advClick="0" advTm="5000"/>
     </mc:Choice>
     <mc:Fallback>
@@ -14620,11 +14612,7 @@
             </a:r>
             <a:r>
               <a:rPr lang="en-US" dirty="0" smtClean="0"/>
-              <a:t> </a:t>
-            </a:r>
-            <a:r>
-              <a:rPr lang="en-US" dirty="0" smtClean="0"/>
-              <a:t>DbSet</a:t>
+              <a:t> DbSet</a:t>
             </a:r>
             <a:endParaRPr lang="en-US" dirty="0"/>
           </a:p>
@@ -14742,7 +14730,7 @@
           <p:cNvPr id="8" name="Slide Number">
             <a:extLst>
               <a:ext uri="{FF2B5EF4-FFF2-40B4-BE49-F238E27FC236}">
-                <a16:creationId xmlns:a16="http://schemas.microsoft.com/office/drawing/2014/main" xmlns="" id="{45BC1A0E-9A27-4A83-8E81-D8342BA63BC1}"/>
+                <a16:creationId xmlns="" xmlns:a16="http://schemas.microsoft.com/office/drawing/2014/main" id="{45BC1A0E-9A27-4A83-8E81-D8342BA63BC1}"/>
               </a:ext>
             </a:extLst>
           </p:cNvPr>
@@ -14782,7 +14770,7 @@
     </p:spTree>
     <p:extLst>
       <p:ext uri="{BB962C8B-B14F-4D97-AF65-F5344CB8AC3E}">
-        <p14:creationId xmlns:p14="http://schemas.microsoft.com/office/powerpoint/2010/main" xmlns="" val="3858316562"/>
+        <p14:creationId xmlns="" xmlns:p14="http://schemas.microsoft.com/office/powerpoint/2010/main" val="3858316562"/>
       </p:ext>
     </p:extLst>
   </p:cSld>
@@ -14790,7 +14778,7 @@
     <a:masterClrMapping/>
   </p:clrMapOvr>
   <mc:AlternateContent xmlns:mc="http://schemas.openxmlformats.org/markup-compatibility/2006">
-    <mc:Choice xmlns:p14="http://schemas.microsoft.com/office/powerpoint/2010/main" xmlns="" Requires="p14">
+    <mc:Choice xmlns="" xmlns:p14="http://schemas.microsoft.com/office/powerpoint/2010/main" Requires="p14">
       <p:transition spd="slow" p14:dur="2000" advClick="0" advTm="5000"/>
     </mc:Choice>
     <mc:Fallback>
@@ -15158,11 +15146,7 @@
           <a:p>
             <a:r>
               <a:rPr lang="ru-RU" sz="3500" dirty="0" smtClean="0"/>
-              <a:t>Управлява моделни класове с помощта </a:t>
-            </a:r>
-            <a:r>
-              <a:rPr lang="ru-RU" sz="3500" dirty="0" smtClean="0"/>
-              <a:t>на</a:t>
+              <a:t>Управлява моделни класове с помощта на</a:t>
             </a:r>
             <a:r>
               <a:rPr lang="bg-BG" sz="3500" dirty="0" smtClean="0"/>
@@ -15333,7 +15317,7 @@
           <p:cNvPr id="5" name="Slide Number">
             <a:extLst>
               <a:ext uri="{FF2B5EF4-FFF2-40B4-BE49-F238E27FC236}">
-                <a16:creationId xmlns:a16="http://schemas.microsoft.com/office/drawing/2014/main" xmlns="" id="{19AC524D-58D2-4ADA-B9A2-EDA9E534400F}"/>
+                <a16:creationId xmlns="" xmlns:a16="http://schemas.microsoft.com/office/drawing/2014/main" id="{19AC524D-58D2-4ADA-B9A2-EDA9E534400F}"/>
               </a:ext>
             </a:extLst>
           </p:cNvPr>
@@ -15373,7 +15357,7 @@
     </p:spTree>
     <p:extLst>
       <p:ext uri="{BB962C8B-B14F-4D97-AF65-F5344CB8AC3E}">
-        <p14:creationId xmlns:p14="http://schemas.microsoft.com/office/powerpoint/2010/main" xmlns="" val="1076655496"/>
+        <p14:creationId xmlns="" xmlns:p14="http://schemas.microsoft.com/office/powerpoint/2010/main" val="1076655496"/>
       </p:ext>
     </p:extLst>
   </p:cSld>
@@ -15381,7 +15365,7 @@
     <a:masterClrMapping/>
   </p:clrMapOvr>
   <mc:AlternateContent xmlns:mc="http://schemas.openxmlformats.org/markup-compatibility/2006">
-    <mc:Choice xmlns:p14="http://schemas.microsoft.com/office/powerpoint/2010/main" xmlns="" Requires="p14">
+    <mc:Choice xmlns="" xmlns:p14="http://schemas.microsoft.com/office/powerpoint/2010/main" Requires="p14">
       <p:transition spd="slow" p14:dur="2000" advClick="0" advTm="5000"/>
     </mc:Choice>
     <mc:Fallback>
@@ -16052,7 +16036,7 @@
           <p:cNvPr id="9" name="Slide Number">
             <a:extLst>
               <a:ext uri="{FF2B5EF4-FFF2-40B4-BE49-F238E27FC236}">
-                <a16:creationId xmlns:a16="http://schemas.microsoft.com/office/drawing/2014/main" xmlns="" id="{D4894965-BB0F-4259-91AC-3D445FAA5FC1}"/>
+                <a16:creationId xmlns="" xmlns:a16="http://schemas.microsoft.com/office/drawing/2014/main" id="{D4894965-BB0F-4259-91AC-3D445FAA5FC1}"/>
               </a:ext>
             </a:extLst>
           </p:cNvPr>
@@ -16092,7 +16076,7 @@
     </p:spTree>
     <p:extLst>
       <p:ext uri="{BB962C8B-B14F-4D97-AF65-F5344CB8AC3E}">
-        <p14:creationId xmlns:p14="http://schemas.microsoft.com/office/powerpoint/2010/main" xmlns="" val="872825896"/>
+        <p14:creationId xmlns="" xmlns:p14="http://schemas.microsoft.com/office/powerpoint/2010/main" val="872825896"/>
       </p:ext>
     </p:extLst>
   </p:cSld>
@@ -16100,7 +16084,7 @@
     <a:masterClrMapping/>
   </p:clrMapOvr>
   <mc:AlternateContent xmlns:mc="http://schemas.openxmlformats.org/markup-compatibility/2006">
-    <mc:Choice xmlns:p14="http://schemas.microsoft.com/office/powerpoint/2010/main" xmlns="" Requires="p14">
+    <mc:Choice xmlns="" xmlns:p14="http://schemas.microsoft.com/office/powerpoint/2010/main" Requires="p14">
       <p:transition spd="slow" p14:dur="2000" advClick="0" advTm="5000"/>
     </mc:Choice>
     <mc:Fallback>
@@ -16367,7 +16351,6 @@
               <a:rPr lang="en-US" dirty="0" smtClean="0"/>
               <a:t>:</a:t>
             </a:r>
-            <a:endParaRPr lang="en-US" dirty="0" smtClean="0"/>
           </a:p>
           <a:p>
             <a:pPr>
@@ -16447,7 +16430,7 @@
           <p:cNvPr id="7" name="Text Placeholder 4">
             <a:extLst>
               <a:ext uri="{FF2B5EF4-FFF2-40B4-BE49-F238E27FC236}">
-                <a16:creationId xmlns:a16="http://schemas.microsoft.com/office/drawing/2014/main" xmlns="" id="{FBED5352-2A36-4F28-AB8D-6335517E5493}"/>
+                <a16:creationId xmlns="" xmlns:a16="http://schemas.microsoft.com/office/drawing/2014/main" id="{FBED5352-2A36-4F28-AB8D-6335517E5493}"/>
               </a:ext>
             </a:extLst>
           </p:cNvPr>
@@ -16709,14 +16692,7 @@
                 <a:latin typeface="Consolas" pitchFamily="49" charset="0"/>
                 <a:cs typeface="Consolas" pitchFamily="49" charset="0"/>
               </a:rPr>
-              <a:t>	</a:t>
-            </a:r>
-            <a:r>
-              <a:rPr lang="en-US" sz="2000" b="1" noProof="1" smtClean="0">
-                <a:latin typeface="Consolas" pitchFamily="49" charset="0"/>
-                <a:cs typeface="Consolas" pitchFamily="49" charset="0"/>
-              </a:rPr>
-              <a:t>.</a:t>
+              <a:t>	.</a:t>
             </a:r>
             <a:r>
               <a:rPr lang="en-US" sz="2000" b="1" noProof="1" smtClean="0">
@@ -16735,10 +16711,6 @@
               </a:rPr>
               <a:t>();</a:t>
             </a:r>
-            <a:endParaRPr lang="en-US" sz="2000" b="1" noProof="1" smtClean="0">
-              <a:latin typeface="Consolas" pitchFamily="49" charset="0"/>
-              <a:cs typeface="Consolas" pitchFamily="49" charset="0"/>
-            </a:endParaRPr>
           </a:p>
           <a:p>
             <a:pPr marL="0" marR="0" lvl="0" indent="0" algn="l" defTabSz="1218438" rtl="0" eaLnBrk="0" fontAlgn="auto" latinLnBrk="0" hangingPunct="0">
@@ -16797,7 +16769,7 @@
     <a:masterClrMapping/>
   </p:clrMapOvr>
   <mc:AlternateContent xmlns:mc="http://schemas.openxmlformats.org/markup-compatibility/2006">
-    <mc:Choice xmlns:p14="http://schemas.microsoft.com/office/powerpoint/2010/main" xmlns="" Requires="p14">
+    <mc:Choice xmlns="" xmlns:p14="http://schemas.microsoft.com/office/powerpoint/2010/main" Requires="p14">
       <p:transition spd="slow" p14:dur="2000" advClick="0" advTm="5000"/>
     </mc:Choice>
     <mc:Fallback>
@@ -16979,7 +16951,7 @@
           <p:cNvPr id="5" name="Text Placeholder 4">
             <a:extLst>
               <a:ext uri="{FF2B5EF4-FFF2-40B4-BE49-F238E27FC236}">
-                <a16:creationId xmlns:a16="http://schemas.microsoft.com/office/drawing/2014/main" xmlns="" id="{FBED5352-2A36-4F28-AB8D-6335517E5493}"/>
+                <a16:creationId xmlns="" xmlns:a16="http://schemas.microsoft.com/office/drawing/2014/main" id="{FBED5352-2A36-4F28-AB8D-6335517E5493}"/>
               </a:ext>
             </a:extLst>
           </p:cNvPr>
@@ -17111,28 +17083,7 @@
                 <a:latin typeface="Consolas" pitchFamily="49" charset="0"/>
                 <a:cs typeface="Consolas" pitchFamily="49" charset="0"/>
               </a:rPr>
-              <a:t>	var blog = new </a:t>
-            </a:r>
-            <a:r>
-              <a:rPr lang="en-US" sz="2000" b="1" noProof="1" smtClean="0">
-                <a:latin typeface="Consolas" pitchFamily="49" charset="0"/>
-                <a:cs typeface="Consolas" pitchFamily="49" charset="0"/>
-              </a:rPr>
-              <a:t>Blog </a:t>
-            </a:r>
-            <a:r>
-              <a:rPr lang="en-US" sz="2000" b="1" noProof="1" smtClean="0">
-                <a:latin typeface="Consolas" pitchFamily="49" charset="0"/>
-                <a:cs typeface="Consolas" pitchFamily="49" charset="0"/>
-              </a:rPr>
-              <a:t>{ Url </a:t>
-            </a:r>
-            <a:r>
-              <a:rPr lang="en-US" sz="2000" b="1" noProof="1" smtClean="0">
-                <a:latin typeface="Consolas" pitchFamily="49" charset="0"/>
-                <a:cs typeface="Consolas" pitchFamily="49" charset="0"/>
-              </a:rPr>
-              <a:t>= "http://sample.com" }</a:t>
+              <a:t>	var blog = new Blog { Url = "http://sample.com" }</a:t>
             </a:r>
           </a:p>
           <a:p>
@@ -17160,14 +17111,7 @@
                 <a:latin typeface="Consolas" pitchFamily="49" charset="0"/>
                 <a:cs typeface="Consolas" pitchFamily="49" charset="0"/>
               </a:rPr>
-              <a:t>	</a:t>
-            </a:r>
-            <a:r>
-              <a:rPr lang="en-US" sz="2000" b="1" noProof="1" smtClean="0">
-                <a:latin typeface="Consolas" pitchFamily="49" charset="0"/>
-                <a:cs typeface="Consolas" pitchFamily="49" charset="0"/>
-              </a:rPr>
-              <a:t>db.Blogs.</a:t>
+              <a:t>	db.Blogs.</a:t>
             </a:r>
             <a:r>
               <a:rPr lang="en-US" sz="2000" b="1" noProof="1" smtClean="0">
@@ -17212,14 +17156,7 @@
                 <a:latin typeface="Consolas" pitchFamily="49" charset="0"/>
                 <a:cs typeface="Consolas" pitchFamily="49" charset="0"/>
               </a:rPr>
-              <a:t>	</a:t>
-            </a:r>
-            <a:r>
-              <a:rPr lang="en-US" sz="2000" b="1" noProof="1" smtClean="0">
-                <a:latin typeface="Consolas" pitchFamily="49" charset="0"/>
-                <a:cs typeface="Consolas" pitchFamily="49" charset="0"/>
-              </a:rPr>
-              <a:t>db.</a:t>
+              <a:t>	db.</a:t>
             </a:r>
             <a:r>
               <a:rPr lang="en-US" sz="2000" b="1" noProof="1" smtClean="0">
@@ -17292,7 +17229,7 @@
           <p:cNvPr id="6" name="AutoShape 5">
             <a:extLst>
               <a:ext uri="{FF2B5EF4-FFF2-40B4-BE49-F238E27FC236}">
-                <a16:creationId xmlns:a16="http://schemas.microsoft.com/office/drawing/2014/main" xmlns="" id="{F571EDF2-BA8D-4C84-8360-12467530B87E}"/>
+                <a16:creationId xmlns="" xmlns:a16="http://schemas.microsoft.com/office/drawing/2014/main" id="{F571EDF2-BA8D-4C84-8360-12467530B87E}"/>
               </a:ext>
             </a:extLst>
           </p:cNvPr>
@@ -17388,7 +17325,7 @@
           <p:cNvPr id="7" name="AutoShape 5">
             <a:extLst>
               <a:ext uri="{FF2B5EF4-FFF2-40B4-BE49-F238E27FC236}">
-                <a16:creationId xmlns:a16="http://schemas.microsoft.com/office/drawing/2014/main" xmlns="" id="{F571EDF2-BA8D-4C84-8360-12467530B87E}"/>
+                <a16:creationId xmlns="" xmlns:a16="http://schemas.microsoft.com/office/drawing/2014/main" id="{F571EDF2-BA8D-4C84-8360-12467530B87E}"/>
               </a:ext>
             </a:extLst>
           </p:cNvPr>
@@ -17496,7 +17433,7 @@
     <a:masterClrMapping/>
   </p:clrMapOvr>
   <mc:AlternateContent xmlns:mc="http://schemas.openxmlformats.org/markup-compatibility/2006">
-    <mc:Choice xmlns:p14="http://schemas.microsoft.com/office/powerpoint/2010/main" xmlns="" Requires="p14">
+    <mc:Choice xmlns="" xmlns:p14="http://schemas.microsoft.com/office/powerpoint/2010/main" Requires="p14">
       <p:transition spd="slow" p14:dur="2000" advClick="0" advTm="5000"/>
     </mc:Choice>
     <mc:Fallback>
@@ -17810,7 +17747,7 @@
     <a:masterClrMapping/>
   </p:clrMapOvr>
   <mc:AlternateContent xmlns:mc="http://schemas.openxmlformats.org/markup-compatibility/2006">
-    <mc:Choice xmlns:p14="http://schemas.microsoft.com/office/powerpoint/2010/main" xmlns="" Requires="p14">
+    <mc:Choice xmlns="" xmlns:p14="http://schemas.microsoft.com/office/powerpoint/2010/main" Requires="p14">
       <p:transition spd="slow" p14:dur="2000" advClick="0" advTm="5000"/>
     </mc:Choice>
     <mc:Fallback>
@@ -17849,7 +17786,7 @@
           <p:cNvPr id="3" name="Content Placeholder 2">
             <a:extLst>
               <a:ext uri="{FF2B5EF4-FFF2-40B4-BE49-F238E27FC236}">
-                <a16:creationId xmlns:a16="http://schemas.microsoft.com/office/drawing/2014/main" xmlns="" id="{F4D48667-56EE-45C2-BE62-F8164DE5B833}"/>
+                <a16:creationId xmlns="" xmlns:a16="http://schemas.microsoft.com/office/drawing/2014/main" id="{F4D48667-56EE-45C2-BE62-F8164DE5B833}"/>
               </a:ext>
             </a:extLst>
           </p:cNvPr>
@@ -17916,15 +17853,7 @@
                   <a:schemeClr val="bg1"/>
                 </a:solidFill>
               </a:rPr>
-              <a:t>базата </a:t>
-            </a:r>
-            <a:r>
-              <a:rPr lang="ru-RU" b="1" dirty="0" smtClean="0">
-                <a:solidFill>
-                  <a:schemeClr val="bg1"/>
-                </a:solidFill>
-              </a:rPr>
-              <a:t>данни</a:t>
+              <a:t>базата данни</a:t>
             </a:r>
             <a:endParaRPr lang="en-US" b="1" dirty="0">
               <a:solidFill>
@@ -17939,7 +17868,7 @@
           <p:cNvPr id="4" name="Title 3">
             <a:extLst>
               <a:ext uri="{FF2B5EF4-FFF2-40B4-BE49-F238E27FC236}">
-                <a16:creationId xmlns:a16="http://schemas.microsoft.com/office/drawing/2014/main" xmlns="" id="{E8383147-6342-4630-9C10-06F61F79754E}"/>
+                <a16:creationId xmlns="" xmlns:a16="http://schemas.microsoft.com/office/drawing/2014/main" id="{E8383147-6342-4630-9C10-06F61F79754E}"/>
               </a:ext>
             </a:extLst>
           </p:cNvPr>
@@ -17972,7 +17901,7 @@
           <p:cNvPr id="8" name="Picture 7">
             <a:extLst>
               <a:ext uri="{FF2B5EF4-FFF2-40B4-BE49-F238E27FC236}">
-                <a16:creationId xmlns:a16="http://schemas.microsoft.com/office/drawing/2014/main" xmlns="" id="{C6F58F87-06B2-4701-8451-F0DC562F468F}"/>
+                <a16:creationId xmlns="" xmlns:a16="http://schemas.microsoft.com/office/drawing/2014/main" id="{C6F58F87-06B2-4701-8451-F0DC562F468F}"/>
               </a:ext>
             </a:extLst>
           </p:cNvPr>
@@ -17985,7 +17914,7 @@
           <a:blip r:embed="rId2" cstate="print">
             <a:extLst>
               <a:ext uri="{28A0092B-C50C-407E-A947-70E740481C1C}">
-                <a14:useLocalDpi xmlns:a14="http://schemas.microsoft.com/office/drawing/2010/main" xmlns="" val="0"/>
+                <a14:useLocalDpi xmlns="" xmlns:a14="http://schemas.microsoft.com/office/drawing/2010/main" val="0"/>
               </a:ext>
             </a:extLst>
           </a:blip>
@@ -18008,7 +17937,7 @@
           <p:cNvPr id="9" name="Picture 8">
             <a:extLst>
               <a:ext uri="{FF2B5EF4-FFF2-40B4-BE49-F238E27FC236}">
-                <a16:creationId xmlns:a16="http://schemas.microsoft.com/office/drawing/2014/main" xmlns="" id="{C490821E-A007-4AD2-A3D3-7D91241DECA4}"/>
+                <a16:creationId xmlns="" xmlns:a16="http://schemas.microsoft.com/office/drawing/2014/main" id="{C490821E-A007-4AD2-A3D3-7D91241DECA4}"/>
               </a:ext>
             </a:extLst>
           </p:cNvPr>
@@ -18021,7 +17950,7 @@
           <a:blip r:embed="rId3" cstate="print">
             <a:extLst>
               <a:ext uri="{28A0092B-C50C-407E-A947-70E740481C1C}">
-                <a14:useLocalDpi xmlns:a14="http://schemas.microsoft.com/office/drawing/2010/main" xmlns="" val="0"/>
+                <a14:useLocalDpi xmlns="" xmlns:a14="http://schemas.microsoft.com/office/drawing/2010/main" val="0"/>
               </a:ext>
             </a:extLst>
           </a:blip>
@@ -18051,7 +17980,7 @@
           <p:cNvPr id="11" name="Arrow: Right 10">
             <a:extLst>
               <a:ext uri="{FF2B5EF4-FFF2-40B4-BE49-F238E27FC236}">
-                <a16:creationId xmlns:a16="http://schemas.microsoft.com/office/drawing/2014/main" xmlns="" id="{39B7A457-4650-455A-BC28-638AABD92396}"/>
+                <a16:creationId xmlns="" xmlns:a16="http://schemas.microsoft.com/office/drawing/2014/main" id="{39B7A457-4650-455A-BC28-638AABD92396}"/>
               </a:ext>
             </a:extLst>
           </p:cNvPr>
@@ -18127,7 +18056,7 @@
           <p:cNvPr id="10" name="Slide Number">
             <a:extLst>
               <a:ext uri="{FF2B5EF4-FFF2-40B4-BE49-F238E27FC236}">
-                <a16:creationId xmlns:a16="http://schemas.microsoft.com/office/drawing/2014/main" xmlns="" id="{47E7C245-92F7-4A03-8422-9ACE1E62CD80}"/>
+                <a16:creationId xmlns="" xmlns:a16="http://schemas.microsoft.com/office/drawing/2014/main" id="{47E7C245-92F7-4A03-8422-9ACE1E62CD80}"/>
               </a:ext>
             </a:extLst>
           </p:cNvPr>
@@ -18167,7 +18096,7 @@
     </p:spTree>
     <p:extLst>
       <p:ext uri="{BB962C8B-B14F-4D97-AF65-F5344CB8AC3E}">
-        <p14:creationId xmlns:p14="http://schemas.microsoft.com/office/powerpoint/2010/main" xmlns="" val="1450947276"/>
+        <p14:creationId xmlns="" xmlns:p14="http://schemas.microsoft.com/office/powerpoint/2010/main" val="1450947276"/>
       </p:ext>
     </p:extLst>
   </p:cSld>
@@ -18175,7 +18104,7 @@
     <a:masterClrMapping/>
   </p:clrMapOvr>
   <mc:AlternateContent xmlns:mc="http://schemas.openxmlformats.org/markup-compatibility/2006">
-    <mc:Choice xmlns:p14="http://schemas.microsoft.com/office/powerpoint/2010/main" xmlns="" Requires="p14">
+    <mc:Choice xmlns="" xmlns:p14="http://schemas.microsoft.com/office/powerpoint/2010/main" Requires="p14">
       <p:transition spd="slow" p14:dur="2000" advClick="0" advTm="5000"/>
     </mc:Choice>
     <mc:Fallback>
@@ -18381,15 +18310,7 @@
                   <a:schemeClr val="bg1"/>
                 </a:solidFill>
               </a:rPr>
-              <a:t>тип </a:t>
-            </a:r>
-            <a:r>
-              <a:rPr lang="bg-BG" b="1" dirty="0" smtClean="0">
-                <a:solidFill>
-                  <a:schemeClr val="bg1"/>
-                </a:solidFill>
-              </a:rPr>
-              <a:t>класове обекти</a:t>
+              <a:t>тип класове обекти</a:t>
             </a:r>
             <a:r>
               <a:rPr lang="bg-BG" dirty="0" smtClean="0"/>
@@ -18420,7 +18341,6 @@
               <a:rPr lang="en-US" dirty="0" smtClean="0"/>
               <a:t> </a:t>
             </a:r>
-            <a:endParaRPr lang="en-US" dirty="0" smtClean="0"/>
           </a:p>
           <a:p>
             <a:pPr lvl="1">
@@ -18430,11 +18350,7 @@
             </a:pPr>
             <a:r>
               <a:rPr lang="bg-BG" dirty="0" smtClean="0"/>
-              <a:t>Въз </a:t>
-            </a:r>
-            <a:r>
-              <a:rPr lang="bg-BG" dirty="0" smtClean="0"/>
-              <a:t>основа на </a:t>
+              <a:t>Въз основа на </a:t>
             </a:r>
             <a:r>
               <a:rPr lang="bg-BG" b="1" dirty="0" smtClean="0">
@@ -18472,11 +18388,7 @@
           <a:p>
             <a:r>
               <a:rPr lang="bg-BG" dirty="0" smtClean="0"/>
-              <a:t>Може </a:t>
-            </a:r>
-            <a:r>
-              <a:rPr lang="bg-BG" dirty="0" smtClean="0"/>
-              <a:t>да се извърши с помощта на </a:t>
+              <a:t>Може да се извърши с помощта на </a:t>
             </a:r>
             <a:r>
               <a:rPr lang="bg-BG" b="1" dirty="0" smtClean="0">
@@ -18519,15 +18431,7 @@
                   <a:schemeClr val="bg1"/>
                 </a:solidFill>
               </a:rPr>
-              <a:t>EF </a:t>
-            </a:r>
-            <a:r>
-              <a:rPr lang="en-US" b="1" dirty="0" smtClean="0">
-                <a:solidFill>
-                  <a:schemeClr val="bg1"/>
-                </a:solidFill>
-              </a:rPr>
-              <a:t>Core Package Manager Console </a:t>
+              <a:t>EF Core Package Manager Console </a:t>
             </a:r>
             <a:r>
               <a:rPr lang="en-US" dirty="0" smtClean="0"/>
@@ -18586,13 +18490,7 @@
               <a:rPr lang="en-US" b="1" dirty="0" smtClean="0">
                 <a:latin typeface="Consolas" pitchFamily="49" charset="0"/>
               </a:rPr>
-              <a:t> </a:t>
-            </a:r>
-            <a:r>
-              <a:rPr lang="en-US" b="1" dirty="0" smtClean="0">
-                <a:latin typeface="Consolas" pitchFamily="49" charset="0"/>
-              </a:rPr>
-              <a:t>scaffold</a:t>
+              <a:t> scaffold</a:t>
             </a:r>
             <a:r>
               <a:rPr lang="bg-BG" b="1" dirty="0" smtClean="0">
@@ -18669,7 +18567,7 @@
     <a:masterClrMapping/>
   </p:clrMapOvr>
   <mc:AlternateContent xmlns:mc="http://schemas.openxmlformats.org/markup-compatibility/2006">
-    <mc:Choice xmlns:p14="http://schemas.microsoft.com/office/powerpoint/2010/main" xmlns="" Requires="p14">
+    <mc:Choice xmlns="" xmlns:p14="http://schemas.microsoft.com/office/powerpoint/2010/main" Requires="p14">
       <p:transition spd="slow" p14:dur="2000" advClick="0" advTm="5000"/>
     </mc:Choice>
     <mc:Fallback>
@@ -18860,7 +18758,7 @@
           <p:cNvPr id="3" name="Content Placeholder 2">
             <a:extLst>
               <a:ext uri="{FF2B5EF4-FFF2-40B4-BE49-F238E27FC236}">
-                <a16:creationId xmlns:a16="http://schemas.microsoft.com/office/drawing/2014/main" xmlns="" id="{F4D48667-56EE-45C2-BE62-F8164DE5B833}"/>
+                <a16:creationId xmlns="" xmlns:a16="http://schemas.microsoft.com/office/drawing/2014/main" id="{F4D48667-56EE-45C2-BE62-F8164DE5B833}"/>
               </a:ext>
             </a:extLst>
           </p:cNvPr>
@@ -18968,15 +18866,7 @@
             </a:r>
             <a:r>
               <a:rPr lang="ru-RU" dirty="0" smtClean="0"/>
-              <a:t>в </a:t>
-            </a:r>
-            <a:r>
-              <a:rPr lang="ru-RU" dirty="0" smtClean="0"/>
-              <a:t>базата данни, </a:t>
-            </a:r>
-            <a:r>
-              <a:rPr lang="ru-RU" dirty="0" smtClean="0"/>
-              <a:t>използвайте флага </a:t>
+              <a:t>в базата данни, използвайте флага </a:t>
             </a:r>
             <a:r>
               <a:rPr lang="ru-RU" b="1" dirty="0" smtClean="0">
@@ -19036,11 +18926,7 @@
             </a:r>
             <a:r>
               <a:rPr lang="ru-RU" dirty="0" smtClean="0"/>
-              <a:t> </a:t>
-            </a:r>
-            <a:r>
-              <a:rPr lang="ru-RU" dirty="0" smtClean="0"/>
-              <a:t>следните </a:t>
+              <a:t> следните </a:t>
             </a:r>
             <a:r>
               <a:rPr lang="ru-RU" b="1" dirty="0" smtClean="0">
@@ -19125,7 +19011,7 @@
           <p:cNvPr id="4" name="Title 3">
             <a:extLst>
               <a:ext uri="{FF2B5EF4-FFF2-40B4-BE49-F238E27FC236}">
-                <a16:creationId xmlns:a16="http://schemas.microsoft.com/office/drawing/2014/main" xmlns="" id="{E8383147-6342-4630-9C10-06F61F79754E}"/>
+                <a16:creationId xmlns="" xmlns:a16="http://schemas.microsoft.com/office/drawing/2014/main" id="{E8383147-6342-4630-9C10-06F61F79754E}"/>
               </a:ext>
             </a:extLst>
           </p:cNvPr>
@@ -19147,11 +19033,7 @@
             </a:r>
             <a:r>
               <a:rPr lang="en-US" dirty="0" smtClean="0"/>
-              <a:t>Scaffolding) </a:t>
-            </a:r>
-            <a:r>
-              <a:rPr lang="en-US" dirty="0" smtClean="0"/>
-              <a:t>(2)</a:t>
+              <a:t>Scaffolding) (2)</a:t>
             </a:r>
             <a:endParaRPr lang="en-US" dirty="0"/>
           </a:p>
@@ -19162,7 +19044,7 @@
           <p:cNvPr id="5" name="Text Placeholder 4">
             <a:extLst>
               <a:ext uri="{FF2B5EF4-FFF2-40B4-BE49-F238E27FC236}">
-                <a16:creationId xmlns:a16="http://schemas.microsoft.com/office/drawing/2014/main" xmlns="" id="{EDF09BDA-12FC-4567-86D2-FE08A50BD86D}"/>
+                <a16:creationId xmlns="" xmlns:a16="http://schemas.microsoft.com/office/drawing/2014/main" id="{EDF09BDA-12FC-4567-86D2-FE08A50BD86D}"/>
               </a:ext>
             </a:extLst>
           </p:cNvPr>
@@ -19229,7 +19111,7 @@
           <p:cNvPr id="7" name="Slide Number">
             <a:extLst>
               <a:ext uri="{FF2B5EF4-FFF2-40B4-BE49-F238E27FC236}">
-                <a16:creationId xmlns:a16="http://schemas.microsoft.com/office/drawing/2014/main" xmlns="" id="{7DB96373-D144-4F90-9A4E-43824AA46BC7}"/>
+                <a16:creationId xmlns="" xmlns:a16="http://schemas.microsoft.com/office/drawing/2014/main" id="{7DB96373-D144-4F90-9A4E-43824AA46BC7}"/>
               </a:ext>
             </a:extLst>
           </p:cNvPr>
@@ -19271,7 +19153,7 @@
           <p:cNvPr id="11" name="Text Placeholder 4">
             <a:extLst>
               <a:ext uri="{FF2B5EF4-FFF2-40B4-BE49-F238E27FC236}">
-                <a16:creationId xmlns:a16="http://schemas.microsoft.com/office/drawing/2014/main" xmlns="" id="{179D0854-CC73-4FEE-90E8-71BD1BFF3A1D}"/>
+                <a16:creationId xmlns="" xmlns:a16="http://schemas.microsoft.com/office/drawing/2014/main" id="{179D0854-CC73-4FEE-90E8-71BD1BFF3A1D}"/>
               </a:ext>
             </a:extLst>
           </p:cNvPr>
@@ -19366,7 +19248,7 @@
     </p:spTree>
     <p:extLst>
       <p:ext uri="{BB962C8B-B14F-4D97-AF65-F5344CB8AC3E}">
-        <p14:creationId xmlns:p14="http://schemas.microsoft.com/office/powerpoint/2010/main" xmlns="" val="4132932835"/>
+        <p14:creationId xmlns="" xmlns:p14="http://schemas.microsoft.com/office/powerpoint/2010/main" val="4132932835"/>
       </p:ext>
     </p:extLst>
   </p:cSld>
@@ -19374,7 +19256,7 @@
     <a:masterClrMapping/>
   </p:clrMapOvr>
   <mc:AlternateContent xmlns:mc="http://schemas.openxmlformats.org/markup-compatibility/2006">
-    <mc:Choice xmlns:p14="http://schemas.microsoft.com/office/powerpoint/2010/main" xmlns="" Requires="p14">
+    <mc:Choice xmlns="" xmlns:p14="http://schemas.microsoft.com/office/powerpoint/2010/main" Requires="p14">
       <p:transition spd="slow" p14:dur="2000" advClick="0" advTm="5000"/>
     </mc:Choice>
     <mc:Fallback>
@@ -19693,7 +19575,7 @@
           <p:cNvPr id="5" name="Slide Number">
             <a:extLst>
               <a:ext uri="{FF2B5EF4-FFF2-40B4-BE49-F238E27FC236}">
-                <a16:creationId xmlns:a16="http://schemas.microsoft.com/office/drawing/2014/main" xmlns="" id="{6A760D59-0056-4F39-B077-DBDBE3D2927E}"/>
+                <a16:creationId xmlns="" xmlns:a16="http://schemas.microsoft.com/office/drawing/2014/main" id="{6A760D59-0056-4F39-B077-DBDBE3D2927E}"/>
               </a:ext>
             </a:extLst>
           </p:cNvPr>
@@ -19989,7 +19871,7 @@
     </p:spTree>
     <p:extLst>
       <p:ext uri="{BB962C8B-B14F-4D97-AF65-F5344CB8AC3E}">
-        <p14:creationId xmlns:p14="http://schemas.microsoft.com/office/powerpoint/2010/main" xmlns="" val="1646986932"/>
+        <p14:creationId xmlns="" xmlns:p14="http://schemas.microsoft.com/office/powerpoint/2010/main" val="1646986932"/>
       </p:ext>
     </p:extLst>
   </p:cSld>
@@ -19997,7 +19879,7 @@
     <a:masterClrMapping/>
   </p:clrMapOvr>
   <mc:AlternateContent xmlns:mc="http://schemas.openxmlformats.org/markup-compatibility/2006">
-    <mc:Choice xmlns:p14="http://schemas.microsoft.com/office/powerpoint/2010/main" xmlns="" Requires="p14">
+    <mc:Choice xmlns="" xmlns:p14="http://schemas.microsoft.com/office/powerpoint/2010/main" Requires="p14">
       <p:transition spd="slow" p14:dur="2000" advClick="0" advTm="5000"/>
     </mc:Choice>
     <mc:Fallback>
@@ -20287,7 +20169,7 @@
     <a:masterClrMapping/>
   </p:clrMapOvr>
   <mc:AlternateContent xmlns:mc="http://schemas.openxmlformats.org/markup-compatibility/2006">
-    <mc:Choice xmlns:p14="http://schemas.microsoft.com/office/powerpoint/2010/main" xmlns="" Requires="p14">
+    <mc:Choice xmlns="" xmlns:p14="http://schemas.microsoft.com/office/powerpoint/2010/main" Requires="p14">
       <p:transition spd="slow" p14:dur="2000" advClick="0" advTm="5000"/>
     </mc:Choice>
     <mc:Fallback>
@@ -20613,15 +20495,7 @@
                   <a:schemeClr val="bg1"/>
                 </a:solidFill>
               </a:rPr>
-              <a:t> </a:t>
-            </a:r>
-            <a:r>
-              <a:rPr lang="ru-RU" sz="3700" b="1" dirty="0" smtClean="0">
-                <a:solidFill>
-                  <a:schemeClr val="bg1"/>
-                </a:solidFill>
-              </a:rPr>
-              <a:t>SQL </a:t>
+              <a:t> SQL </a:t>
             </a:r>
             <a:r>
               <a:rPr lang="ru-RU" sz="3700" dirty="0" smtClean="0"/>
@@ -20637,11 +20511,7 @@
             </a:pPr>
             <a:r>
               <a:rPr lang="ru-RU" sz="3700" dirty="0" smtClean="0"/>
-              <a:t>Управление </a:t>
-            </a:r>
-            <a:r>
-              <a:rPr lang="ru-RU" sz="3700" dirty="0" smtClean="0"/>
-              <a:t>на </a:t>
+              <a:t>Управление на </a:t>
             </a:r>
             <a:r>
               <a:rPr lang="ru-RU" sz="3700" b="1" dirty="0" smtClean="0">
@@ -20715,7 +20585,7 @@
           <p:cNvPr id="8" name="Slide Number">
             <a:extLst>
               <a:ext uri="{FF2B5EF4-FFF2-40B4-BE49-F238E27FC236}">
-                <a16:creationId xmlns:a16="http://schemas.microsoft.com/office/drawing/2014/main" xmlns="" id="{B2680860-9C41-4249-9484-64E406C3FC4E}"/>
+                <a16:creationId xmlns="" xmlns:a16="http://schemas.microsoft.com/office/drawing/2014/main" id="{B2680860-9C41-4249-9484-64E406C3FC4E}"/>
               </a:ext>
             </a:extLst>
           </p:cNvPr>
@@ -20755,7 +20625,7 @@
     </p:spTree>
     <p:extLst>
       <p:ext uri="{BB962C8B-B14F-4D97-AF65-F5344CB8AC3E}">
-        <p14:creationId xmlns:p14="http://schemas.microsoft.com/office/powerpoint/2010/main" xmlns="" val="871489354"/>
+        <p14:creationId xmlns="" xmlns:p14="http://schemas.microsoft.com/office/powerpoint/2010/main" val="871489354"/>
       </p:ext>
     </p:extLst>
   </p:cSld>
@@ -20763,7 +20633,7 @@
     <a:masterClrMapping/>
   </p:clrMapOvr>
   <mc:AlternateContent xmlns:mc="http://schemas.openxmlformats.org/markup-compatibility/2006">
-    <mc:Choice xmlns:p14="http://schemas.microsoft.com/office/powerpoint/2010/main" xmlns="" Requires="p14">
+    <mc:Choice xmlns="" xmlns:p14="http://schemas.microsoft.com/office/powerpoint/2010/main" Requires="p14">
       <p:transition spd="slow" p14:dur="2000" advClick="0" advTm="5000"/>
     </mc:Choice>
     <mc:Fallback>
@@ -21138,6 +21008,27 @@
               <a:rPr lang="bg-BG" dirty="0" smtClean="0"/>
               <a:t>Информация за: </a:t>
             </a:r>
+            <a:endParaRPr lang="en-US" dirty="0" smtClean="0"/>
+          </a:p>
+          <a:p>
+            <a:endParaRPr lang="en-US" dirty="0" smtClean="0"/>
+          </a:p>
+          <a:p>
+            <a:endParaRPr lang="en-US" dirty="0" smtClean="0"/>
+          </a:p>
+          <a:p>
+            <a:r>
+              <a:rPr lang="en-US" dirty="0" err="1" smtClean="0"/>
+              <a:t>Src</a:t>
+            </a:r>
+            <a:r>
+              <a:rPr lang="en-US" dirty="0" smtClean="0"/>
+              <a:t> (scaffolding): </a:t>
+            </a:r>
+            <a:r>
+              <a:rPr lang="en-US" dirty="0" smtClean="0"/>
+              <a:t>https://learn.microsoft.com/en-us/ef/core/managing-schemas/scaffolding/?tabs=dotnet-core-cli#tabpanel_2_vs</a:t>
+            </a:r>
             <a:endParaRPr lang="en-US" dirty="0"/>
           </a:p>
         </p:txBody>
@@ -21207,7 +21098,7 @@
     <a:masterClrMapping/>
   </p:clrMapOvr>
   <mc:AlternateContent xmlns:mc="http://schemas.openxmlformats.org/markup-compatibility/2006">
-    <mc:Choice xmlns="" xmlns:p14="http://schemas.microsoft.com/office/powerpoint/2010/main" Requires="p14">
+    <mc:Choice xmlns:p14="http://schemas.microsoft.com/office/powerpoint/2010/main" xmlns="" Requires="p14">
       <p:transition spd="slow" p14:dur="2000" advClick="0" advTm="5000"/>
     </mc:Choice>
     <mc:Fallback>
@@ -21246,7 +21137,7 @@
           <p:cNvPr id="9" name="Summary Box Group">
             <a:extLst>
               <a:ext uri="{FF2B5EF4-FFF2-40B4-BE49-F238E27FC236}">
-                <a16:creationId xmlns:a16="http://schemas.microsoft.com/office/drawing/2014/main" xmlns="" id="{EBAFE522-EB7D-4931-A015-9A7E8A98517D}"/>
+                <a16:creationId xmlns="" xmlns:a16="http://schemas.microsoft.com/office/drawing/2014/main" id="{EBAFE522-EB7D-4931-A015-9A7E8A98517D}"/>
               </a:ext>
             </a:extLst>
           </p:cNvPr>
@@ -21266,7 +21157,7 @@
             <p:cNvPr id="10" name="Rounded Rectangle Blue">
               <a:extLst>
                 <a:ext uri="{FF2B5EF4-FFF2-40B4-BE49-F238E27FC236}">
-                  <a16:creationId xmlns:a16="http://schemas.microsoft.com/office/drawing/2014/main" xmlns="" id="{18F78F23-3D09-4B63-8DF9-D49CFBB145EE}"/>
+                  <a16:creationId xmlns="" xmlns:a16="http://schemas.microsoft.com/office/drawing/2014/main" id="{18F78F23-3D09-4B63-8DF9-D49CFBB145EE}"/>
                 </a:ext>
               </a:extLst>
             </p:cNvPr>
@@ -21320,7 +21211,7 @@
             <p:cNvPr id="11" name="Rounded Rectangle Left">
               <a:extLst>
                 <a:ext uri="{FF2B5EF4-FFF2-40B4-BE49-F238E27FC236}">
-                  <a16:creationId xmlns:a16="http://schemas.microsoft.com/office/drawing/2014/main" xmlns="" id="{F12C06CE-2BBE-46C2-B718-813794C58DF9}"/>
+                  <a16:creationId xmlns="" xmlns:a16="http://schemas.microsoft.com/office/drawing/2014/main" id="{F12C06CE-2BBE-46C2-B718-813794C58DF9}"/>
                 </a:ext>
               </a:extLst>
             </p:cNvPr>
@@ -21380,7 +21271,7 @@
             <p:cNvPr id="12" name="Half Frame Top Right">
               <a:extLst>
                 <a:ext uri="{FF2B5EF4-FFF2-40B4-BE49-F238E27FC236}">
-                  <a16:creationId xmlns:a16="http://schemas.microsoft.com/office/drawing/2014/main" xmlns="" id="{66CDBB1E-AF3C-43FC-9F34-2DD691F81726}"/>
+                  <a16:creationId xmlns="" xmlns:a16="http://schemas.microsoft.com/office/drawing/2014/main" id="{66CDBB1E-AF3C-43FC-9F34-2DD691F81726}"/>
                 </a:ext>
               </a:extLst>
             </p:cNvPr>
@@ -21442,7 +21333,7 @@
           <p:cNvPr id="14" name="Text Placeholder Body">
             <a:extLst>
               <a:ext uri="{FF2B5EF4-FFF2-40B4-BE49-F238E27FC236}">
-                <a16:creationId xmlns:a16="http://schemas.microsoft.com/office/drawing/2014/main" xmlns="" id="{0E49D336-45B6-44D3-97C4-E28F8DEA2022}"/>
+                <a16:creationId xmlns="" xmlns:a16="http://schemas.microsoft.com/office/drawing/2014/main" id="{0E49D336-45B6-44D3-97C4-E28F8DEA2022}"/>
               </a:ext>
             </a:extLst>
           </p:cNvPr>
@@ -21538,7 +21429,7 @@
           <p:cNvPr id="17" name="Slide Number">
             <a:extLst>
               <a:ext uri="{FF2B5EF4-FFF2-40B4-BE49-F238E27FC236}">
-                <a16:creationId xmlns:a16="http://schemas.microsoft.com/office/drawing/2014/main" xmlns="" id="{9DE5559F-55C2-47F1-A321-B593B1EC63C1}"/>
+                <a16:creationId xmlns="" xmlns:a16="http://schemas.microsoft.com/office/drawing/2014/main" id="{9DE5559F-55C2-47F1-A321-B593B1EC63C1}"/>
               </a:ext>
             </a:extLst>
           </p:cNvPr>
@@ -21580,7 +21471,7 @@
           <p:cNvPr id="13" name="Picture SoftUni Mascot">
             <a:extLst>
               <a:ext uri="{FF2B5EF4-FFF2-40B4-BE49-F238E27FC236}">
-                <a16:creationId xmlns:a16="http://schemas.microsoft.com/office/drawing/2014/main" xmlns="" id="{CCC3A316-993C-4741-8826-E104F27650A3}"/>
+                <a16:creationId xmlns="" xmlns:a16="http://schemas.microsoft.com/office/drawing/2014/main" id="{CCC3A316-993C-4741-8826-E104F27650A3}"/>
               </a:ext>
             </a:extLst>
           </p:cNvPr>
@@ -21593,7 +21484,7 @@
           <a:blip r:embed="rId3" cstate="print">
             <a:extLst>
               <a:ext uri="{28A0092B-C50C-407E-A947-70E740481C1C}">
-                <a14:useLocalDpi xmlns:a14="http://schemas.microsoft.com/office/drawing/2010/main" xmlns="" val="0"/>
+                <a14:useLocalDpi xmlns="" xmlns:a14="http://schemas.microsoft.com/office/drawing/2010/main" val="0"/>
               </a:ext>
             </a:extLst>
           </a:blip>
@@ -21638,7 +21529,7 @@
     </p:spTree>
     <p:extLst>
       <p:ext uri="{BB962C8B-B14F-4D97-AF65-F5344CB8AC3E}">
-        <p14:creationId xmlns:p14="http://schemas.microsoft.com/office/powerpoint/2010/main" xmlns="" val="2087190546"/>
+        <p14:creationId xmlns="" xmlns:p14="http://schemas.microsoft.com/office/powerpoint/2010/main" val="2087190546"/>
       </p:ext>
     </p:extLst>
   </p:cSld>
@@ -21646,7 +21537,7 @@
     <a:masterClrMapping/>
   </p:clrMapOvr>
   <mc:AlternateContent xmlns:mc="http://schemas.openxmlformats.org/markup-compatibility/2006">
-    <mc:Choice xmlns:p14="http://schemas.microsoft.com/office/powerpoint/2010/main" xmlns="" Requires="p14">
+    <mc:Choice xmlns="" xmlns:p14="http://schemas.microsoft.com/office/powerpoint/2010/main" Requires="p14">
       <p:transition spd="slow" p14:dur="2000" advClick="0" advTm="5000"/>
     </mc:Choice>
     <mc:Fallback>
@@ -21685,7 +21576,7 @@
           <p:cNvPr id="5" name="Group 4">
             <a:extLst>
               <a:ext uri="{FF2B5EF4-FFF2-40B4-BE49-F238E27FC236}">
-                <a16:creationId xmlns:a16="http://schemas.microsoft.com/office/drawing/2014/main" xmlns="" id="{1A67F800-7980-E3CA-7188-3C478C8E98B8}"/>
+                <a16:creationId xmlns="" xmlns:a16="http://schemas.microsoft.com/office/drawing/2014/main" id="{1A67F800-7980-E3CA-7188-3C478C8E98B8}"/>
               </a:ext>
             </a:extLst>
           </p:cNvPr>
@@ -21705,7 +21596,7 @@
             <p:cNvPr id="7" name="Picture 6" descr="A picture containing text, sign, vector graphics&#10;&#10;Description automatically generated">
               <a:extLst>
                 <a:ext uri="{FF2B5EF4-FFF2-40B4-BE49-F238E27FC236}">
-                  <a16:creationId xmlns:a16="http://schemas.microsoft.com/office/drawing/2014/main" xmlns="" id="{15CE28B1-02BA-4014-E149-BF1EE09447ED}"/>
+                  <a16:creationId xmlns="" xmlns:a16="http://schemas.microsoft.com/office/drawing/2014/main" id="{15CE28B1-02BA-4014-E149-BF1EE09447ED}"/>
                 </a:ext>
               </a:extLst>
             </p:cNvPr>
@@ -21735,7 +21626,7 @@
             <p:cNvPr id="9" name="Picture 8" descr="Logo&#10;&#10;Description automatically generated">
               <a:extLst>
                 <a:ext uri="{FF2B5EF4-FFF2-40B4-BE49-F238E27FC236}">
-                  <a16:creationId xmlns:a16="http://schemas.microsoft.com/office/drawing/2014/main" xmlns="" id="{5F82FF4F-4AD2-4B3B-1445-F3C6BA268522}"/>
+                  <a16:creationId xmlns="" xmlns:a16="http://schemas.microsoft.com/office/drawing/2014/main" id="{5F82FF4F-4AD2-4B3B-1445-F3C6BA268522}"/>
                 </a:ext>
               </a:extLst>
             </p:cNvPr>
@@ -21765,7 +21656,7 @@
             <p:cNvPr id="11" name="Picture 10" descr="Logo&#10;&#10;Description automatically generated">
               <a:extLst>
                 <a:ext uri="{FF2B5EF4-FFF2-40B4-BE49-F238E27FC236}">
-                  <a16:creationId xmlns:a16="http://schemas.microsoft.com/office/drawing/2014/main" xmlns="" id="{68CCA8DB-9EFC-F9BC-57AE-81E4F843E863}"/>
+                  <a16:creationId xmlns="" xmlns:a16="http://schemas.microsoft.com/office/drawing/2014/main" id="{68CCA8DB-9EFC-F9BC-57AE-81E4F843E863}"/>
                 </a:ext>
               </a:extLst>
             </p:cNvPr>
@@ -21795,7 +21686,7 @@
             <p:cNvPr id="13" name="Picture 12" descr="Logo&#10;&#10;Description automatically generated">
               <a:extLst>
                 <a:ext uri="{FF2B5EF4-FFF2-40B4-BE49-F238E27FC236}">
-                  <a16:creationId xmlns:a16="http://schemas.microsoft.com/office/drawing/2014/main" xmlns="" id="{3FDF9297-50FA-E866-B6CE-9D64B1E892BF}"/>
+                  <a16:creationId xmlns="" xmlns:a16="http://schemas.microsoft.com/office/drawing/2014/main" id="{3FDF9297-50FA-E866-B6CE-9D64B1E892BF}"/>
                 </a:ext>
               </a:extLst>
             </p:cNvPr>
@@ -21825,7 +21716,7 @@
             <p:cNvPr id="18" name="Graphic 17">
               <a:extLst>
                 <a:ext uri="{FF2B5EF4-FFF2-40B4-BE49-F238E27FC236}">
-                  <a16:creationId xmlns:a16="http://schemas.microsoft.com/office/drawing/2014/main" xmlns="" id="{2A1BC0C9-7A7B-9C5B-B457-3E86E59EF29E}"/>
+                  <a16:creationId xmlns="" xmlns:a16="http://schemas.microsoft.com/office/drawing/2014/main" id="{2A1BC0C9-7A7B-9C5B-B457-3E86E59EF29E}"/>
                 </a:ext>
               </a:extLst>
             </p:cNvPr>
@@ -21838,7 +21729,7 @@
             <a:blip r:embed="rId7" cstate="print">
               <a:extLst>
                 <a:ext uri="{96DAC541-7B7A-43D3-8B79-37D633B846F1}">
-                  <asvg:svgBlip xmlns:asvg="http://schemas.microsoft.com/office/drawing/2016/SVG/main" xmlns="" r:embed="rId8"/>
+                  <asvg:svgBlip xmlns="" xmlns:asvg="http://schemas.microsoft.com/office/drawing/2016/SVG/main" r:embed="rId8"/>
                 </a:ext>
               </a:extLst>
             </a:blip>
@@ -21861,7 +21752,7 @@
             <p:cNvPr id="20" name="Graphic 19">
               <a:extLst>
                 <a:ext uri="{FF2B5EF4-FFF2-40B4-BE49-F238E27FC236}">
-                  <a16:creationId xmlns:a16="http://schemas.microsoft.com/office/drawing/2014/main" xmlns="" id="{DBE174DA-A182-7E57-06D4-86AFA26D484D}"/>
+                  <a16:creationId xmlns="" xmlns:a16="http://schemas.microsoft.com/office/drawing/2014/main" id="{DBE174DA-A182-7E57-06D4-86AFA26D484D}"/>
                 </a:ext>
               </a:extLst>
             </p:cNvPr>
@@ -21874,7 +21765,7 @@
             <a:blip r:embed="rId9" cstate="print">
               <a:extLst>
                 <a:ext uri="{96DAC541-7B7A-43D3-8B79-37D633B846F1}">
-                  <asvg:svgBlip xmlns:asvg="http://schemas.microsoft.com/office/drawing/2016/SVG/main" xmlns="" r:embed="rId10"/>
+                  <asvg:svgBlip xmlns="" xmlns:asvg="http://schemas.microsoft.com/office/drawing/2016/SVG/main" r:embed="rId10"/>
                 </a:ext>
               </a:extLst>
             </a:blip>
@@ -21897,7 +21788,7 @@
             <p:cNvPr id="22" name="Picture 21" descr="Logo&#10;&#10;Description automatically generated">
               <a:extLst>
                 <a:ext uri="{FF2B5EF4-FFF2-40B4-BE49-F238E27FC236}">
-                  <a16:creationId xmlns:a16="http://schemas.microsoft.com/office/drawing/2014/main" xmlns="" id="{9B7FFC36-A4BC-7A53-AB82-82C398A47538}"/>
+                  <a16:creationId xmlns="" xmlns:a16="http://schemas.microsoft.com/office/drawing/2014/main" id="{9B7FFC36-A4BC-7A53-AB82-82C398A47538}"/>
                 </a:ext>
               </a:extLst>
             </p:cNvPr>
@@ -21927,7 +21818,7 @@
             <p:cNvPr id="36" name="Group 35">
               <a:extLst>
                 <a:ext uri="{FF2B5EF4-FFF2-40B4-BE49-F238E27FC236}">
-                  <a16:creationId xmlns:a16="http://schemas.microsoft.com/office/drawing/2014/main" xmlns="" id="{3FB2AEAC-BDEE-9D5F-67A3-17CEDA699052}"/>
+                  <a16:creationId xmlns="" xmlns:a16="http://schemas.microsoft.com/office/drawing/2014/main" id="{3FB2AEAC-BDEE-9D5F-67A3-17CEDA699052}"/>
                 </a:ext>
               </a:extLst>
             </p:cNvPr>
@@ -21947,7 +21838,7 @@
               <p:cNvPr id="31" name="Straight Connector 30">
                 <a:extLst>
                   <a:ext uri="{FF2B5EF4-FFF2-40B4-BE49-F238E27FC236}">
-                    <a16:creationId xmlns:a16="http://schemas.microsoft.com/office/drawing/2014/main" xmlns="" id="{AA38ABD5-1637-DC80-A922-DF10E4F75CDE}"/>
+                    <a16:creationId xmlns="" xmlns:a16="http://schemas.microsoft.com/office/drawing/2014/main" id="{AA38ABD5-1637-DC80-A922-DF10E4F75CDE}"/>
                   </a:ext>
                 </a:extLst>
               </p:cNvPr>
@@ -21990,7 +21881,7 @@
               <p:cNvPr id="33" name="Picture 32">
                 <a:extLst>
                   <a:ext uri="{FF2B5EF4-FFF2-40B4-BE49-F238E27FC236}">
-                    <a16:creationId xmlns:a16="http://schemas.microsoft.com/office/drawing/2014/main" xmlns="" id="{617B586A-0BC5-5E32-7E67-FD277547ED69}"/>
+                    <a16:creationId xmlns="" xmlns:a16="http://schemas.microsoft.com/office/drawing/2014/main" id="{617B586A-0BC5-5E32-7E67-FD277547ED69}"/>
                   </a:ext>
                 </a:extLst>
               </p:cNvPr>
@@ -22022,7 +21913,7 @@
           <p:cNvPr id="40" name="Picture 39" descr="Logo&#10;&#10;Description automatically generated">
             <a:extLst>
               <a:ext uri="{FF2B5EF4-FFF2-40B4-BE49-F238E27FC236}">
-                <a16:creationId xmlns:a16="http://schemas.microsoft.com/office/drawing/2014/main" xmlns="" id="{9C30DD70-D438-6D27-35D3-8BB874966D84}"/>
+                <a16:creationId xmlns="" xmlns:a16="http://schemas.microsoft.com/office/drawing/2014/main" id="{9C30DD70-D438-6D27-35D3-8BB874966D84}"/>
               </a:ext>
             </a:extLst>
           </p:cNvPr>
@@ -22052,7 +21943,7 @@
           <p:cNvPr id="2" name="Google Shape;441;p37">
             <a:extLst>
               <a:ext uri="{FF2B5EF4-FFF2-40B4-BE49-F238E27FC236}">
-                <a16:creationId xmlns:a16="http://schemas.microsoft.com/office/drawing/2014/main" xmlns="" id="{2AFB472C-93C2-241B-75FA-457782840F92}"/>
+                <a16:creationId xmlns="" xmlns:a16="http://schemas.microsoft.com/office/drawing/2014/main" id="{2AFB472C-93C2-241B-75FA-457782840F92}"/>
               </a:ext>
             </a:extLst>
           </p:cNvPr>
@@ -22357,7 +22248,7 @@
           <p:cNvPr id="14" name="Картина 13">
             <a:extLst>
               <a:ext uri="{FF2B5EF4-FFF2-40B4-BE49-F238E27FC236}">
-                <a16:creationId xmlns:a16="http://schemas.microsoft.com/office/drawing/2014/main" xmlns="" id="{54B365E9-8FD0-6D5B-2DFC-723EE5DDD555}"/>
+                <a16:creationId xmlns="" xmlns:a16="http://schemas.microsoft.com/office/drawing/2014/main" id="{54B365E9-8FD0-6D5B-2DFC-723EE5DDD555}"/>
               </a:ext>
             </a:extLst>
           </p:cNvPr>
@@ -22387,7 +22278,7 @@
           <p:cNvPr id="16" name="Картина 15">
             <a:extLst>
               <a:ext uri="{FF2B5EF4-FFF2-40B4-BE49-F238E27FC236}">
-                <a16:creationId xmlns:a16="http://schemas.microsoft.com/office/drawing/2014/main" xmlns="" id="{3BD6ABFC-02BF-2D42-B42B-6929222F37B6}"/>
+                <a16:creationId xmlns="" xmlns:a16="http://schemas.microsoft.com/office/drawing/2014/main" id="{3BD6ABFC-02BF-2D42-B42B-6929222F37B6}"/>
               </a:ext>
             </a:extLst>
           </p:cNvPr>
@@ -22415,7 +22306,7 @@
     </p:spTree>
     <p:extLst>
       <p:ext uri="{BB962C8B-B14F-4D97-AF65-F5344CB8AC3E}">
-        <p14:creationId xmlns:p14="http://schemas.microsoft.com/office/powerpoint/2010/main" xmlns="" val="2144060659"/>
+        <p14:creationId xmlns="" xmlns:p14="http://schemas.microsoft.com/office/powerpoint/2010/main" val="2144060659"/>
       </p:ext>
     </p:extLst>
   </p:cSld>
@@ -22454,7 +22345,7 @@
           <p:cNvPr id="5" name="Slide Number">
             <a:extLst>
               <a:ext uri="{FF2B5EF4-FFF2-40B4-BE49-F238E27FC236}">
-                <a16:creationId xmlns:a16="http://schemas.microsoft.com/office/drawing/2014/main" xmlns="" id="{F48C3C93-90A1-4D31-BEA6-B54D1106CE31}"/>
+                <a16:creationId xmlns="" xmlns:a16="http://schemas.microsoft.com/office/drawing/2014/main" id="{F48C3C93-90A1-4D31-BEA6-B54D1106CE31}"/>
               </a:ext>
             </a:extLst>
           </p:cNvPr>
@@ -22496,7 +22387,7 @@
           <p:cNvPr id="2" name="Slide Body">
             <a:extLst>
               <a:ext uri="{FF2B5EF4-FFF2-40B4-BE49-F238E27FC236}">
-                <a16:creationId xmlns:a16="http://schemas.microsoft.com/office/drawing/2014/main" xmlns="" id="{980F49B1-E4BE-4389-A747-7AB9B71AD920}"/>
+                <a16:creationId xmlns="" xmlns:a16="http://schemas.microsoft.com/office/drawing/2014/main" id="{980F49B1-E4BE-4389-A747-7AB9B71AD920}"/>
               </a:ext>
             </a:extLst>
           </p:cNvPr>
@@ -22630,7 +22521,7 @@
           <p:cNvPr id="6" name="Picture License" descr="License">
             <a:extLst>
               <a:ext uri="{FF2B5EF4-FFF2-40B4-BE49-F238E27FC236}">
-                <a16:creationId xmlns:a16="http://schemas.microsoft.com/office/drawing/2014/main" xmlns="" id="{A10A2585-858C-4B1E-8846-27CF1C15729E}"/>
+                <a16:creationId xmlns="" xmlns:a16="http://schemas.microsoft.com/office/drawing/2014/main" id="{A10A2585-858C-4B1E-8846-27CF1C15729E}"/>
               </a:ext>
             </a:extLst>
           </p:cNvPr>
@@ -22671,7 +22562,7 @@
           <p:cNvPr id="3" name="Slide Title">
             <a:extLst>
               <a:ext uri="{FF2B5EF4-FFF2-40B4-BE49-F238E27FC236}">
-                <a16:creationId xmlns:a16="http://schemas.microsoft.com/office/drawing/2014/main" xmlns="" id="{E5F1FB41-80C3-4816-BC47-CCC50632E6E8}"/>
+                <a16:creationId xmlns="" xmlns:a16="http://schemas.microsoft.com/office/drawing/2014/main" id="{E5F1FB41-80C3-4816-BC47-CCC50632E6E8}"/>
               </a:ext>
             </a:extLst>
           </p:cNvPr>
@@ -22697,7 +22588,7 @@
     </p:spTree>
     <p:extLst>
       <p:ext uri="{BB962C8B-B14F-4D97-AF65-F5344CB8AC3E}">
-        <p14:creationId xmlns:p14="http://schemas.microsoft.com/office/powerpoint/2010/main" xmlns="" val="3506533871"/>
+        <p14:creationId xmlns="" xmlns:p14="http://schemas.microsoft.com/office/powerpoint/2010/main" val="3506533871"/>
       </p:ext>
     </p:extLst>
   </p:cSld>
@@ -22705,7 +22596,7 @@
     <a:masterClrMapping/>
   </p:clrMapOvr>
   <mc:AlternateContent xmlns:mc="http://schemas.openxmlformats.org/markup-compatibility/2006">
-    <mc:Choice xmlns:p14="http://schemas.microsoft.com/office/powerpoint/2010/main" xmlns="" Requires="p14">
+    <mc:Choice xmlns="" xmlns:p14="http://schemas.microsoft.com/office/powerpoint/2010/main" Requires="p14">
       <p:transition spd="slow" p14:dur="2000" advClick="0" advTm="5000"/>
     </mc:Choice>
     <mc:Fallback>
@@ -22884,7 +22775,7 @@
     <a:masterClrMapping/>
   </p:clrMapOvr>
   <mc:AlternateContent xmlns:mc="http://schemas.openxmlformats.org/markup-compatibility/2006">
-    <mc:Choice xmlns:p14="http://schemas.microsoft.com/office/powerpoint/2010/main" xmlns="" Requires="p14">
+    <mc:Choice xmlns="" xmlns:p14="http://schemas.microsoft.com/office/powerpoint/2010/main" Requires="p14">
       <p:transition spd="slow" p14:dur="2000" advClick="0" advTm="5000"/>
     </mc:Choice>
     <mc:Fallback>
@@ -23172,7 +23063,7 @@
     <a:masterClrMapping/>
   </p:clrMapOvr>
   <mc:AlternateContent xmlns:mc="http://schemas.openxmlformats.org/markup-compatibility/2006">
-    <mc:Choice xmlns:p14="http://schemas.microsoft.com/office/powerpoint/2010/main" xmlns="" Requires="p14">
+    <mc:Choice xmlns="" xmlns:p14="http://schemas.microsoft.com/office/powerpoint/2010/main" Requires="p14">
       <p:transition spd="slow" p14:dur="2000" advClick="0" advTm="5000"/>
     </mc:Choice>
     <mc:Fallback>
@@ -23797,7 +23688,7 @@
     <a:masterClrMapping/>
   </p:clrMapOvr>
   <mc:AlternateContent xmlns:mc="http://schemas.openxmlformats.org/markup-compatibility/2006">
-    <mc:Choice xmlns:p14="http://schemas.microsoft.com/office/powerpoint/2010/main" xmlns="" Requires="p14">
+    <mc:Choice xmlns="" xmlns:p14="http://schemas.microsoft.com/office/powerpoint/2010/main" Requires="p14">
       <p:transition spd="slow" p14:dur="2000" advClick="0" advTm="5000"/>
     </mc:Choice>
     <mc:Fallback>
@@ -24382,7 +24273,7 @@
     <a:masterClrMapping/>
   </p:clrMapOvr>
   <mc:AlternateContent xmlns:mc="http://schemas.openxmlformats.org/markup-compatibility/2006">
-    <mc:Choice xmlns:p14="http://schemas.microsoft.com/office/powerpoint/2010/main" xmlns="" Requires="p14">
+    <mc:Choice xmlns="" xmlns:p14="http://schemas.microsoft.com/office/powerpoint/2010/main" Requires="p14">
       <p:transition spd="slow" p14:dur="2000" advClick="0" advTm="5000"/>
     </mc:Choice>
     <mc:Fallback>
@@ -24495,15 +24386,7 @@
                   <a:schemeClr val="bg1"/>
                 </a:solidFill>
               </a:rPr>
-              <a:t> </a:t>
-            </a:r>
-            <a:r>
-              <a:rPr lang="ru-RU" b="1" dirty="0" smtClean="0">
-                <a:solidFill>
-                  <a:schemeClr val="bg1"/>
-                </a:solidFill>
-              </a:rPr>
-              <a:t>.NET </a:t>
+              <a:t> .NET </a:t>
             </a:r>
             <a:r>
               <a:rPr lang="ru-RU" dirty="0" smtClean="0"/>
@@ -24543,15 +24426,7 @@
             </a:r>
             <a:r>
               <a:rPr lang="ru-RU" dirty="0" smtClean="0"/>
-              <a:t> </a:t>
-            </a:r>
-            <a:r>
-              <a:rPr lang="ru-RU" dirty="0" smtClean="0"/>
-              <a:t>базирани</a:t>
-            </a:r>
-            <a:r>
-              <a:rPr lang="ru-RU" dirty="0" smtClean="0"/>
-              <a:t> </a:t>
+              <a:t> базирани </a:t>
             </a:r>
             <a:r>
               <a:rPr lang="ru-RU" b="1" dirty="0" smtClean="0">
@@ -24623,11 +24498,7 @@
             </a:pPr>
             <a:r>
               <a:rPr lang="ru-RU" dirty="0" smtClean="0"/>
-              <a:t>Работи </a:t>
-            </a:r>
-            <a:r>
-              <a:rPr lang="ru-RU" dirty="0" smtClean="0"/>
-              <a:t>с много релационни бази данни (с различни доставчици)</a:t>
+              <a:t>Работи с много релационни бази данни (с различни доставчици)</a:t>
             </a:r>
             <a:endParaRPr lang="en-US" dirty="0"/>
           </a:p>
@@ -24650,7 +24521,7 @@
           <p:cNvPr id="5" name="Slide Number">
             <a:extLst>
               <a:ext uri="{FF2B5EF4-FFF2-40B4-BE49-F238E27FC236}">
-                <a16:creationId xmlns:a16="http://schemas.microsoft.com/office/drawing/2014/main" xmlns="" id="{003D4DBF-6B09-4447-B07C-37DC1FFBE1A7}"/>
+                <a16:creationId xmlns="" xmlns:a16="http://schemas.microsoft.com/office/drawing/2014/main" id="{003D4DBF-6B09-4447-B07C-37DC1FFBE1A7}"/>
               </a:ext>
             </a:extLst>
           </p:cNvPr>
@@ -24778,7 +24649,7 @@
     </p:spTree>
     <p:extLst>
       <p:ext uri="{BB962C8B-B14F-4D97-AF65-F5344CB8AC3E}">
-        <p14:creationId xmlns:p14="http://schemas.microsoft.com/office/powerpoint/2010/main" xmlns="" val="277931054"/>
+        <p14:creationId xmlns="" xmlns:p14="http://schemas.microsoft.com/office/powerpoint/2010/main" val="277931054"/>
       </p:ext>
     </p:extLst>
   </p:cSld>
@@ -24786,7 +24657,7 @@
     <a:masterClrMapping/>
   </p:clrMapOvr>
   <mc:AlternateContent xmlns:mc="http://schemas.openxmlformats.org/markup-compatibility/2006">
-    <mc:Choice xmlns:p14="http://schemas.microsoft.com/office/powerpoint/2010/main" xmlns="" Requires="p14">
+    <mc:Choice xmlns="" xmlns:p14="http://schemas.microsoft.com/office/powerpoint/2010/main" Requires="p14">
       <p:transition spd="slow" p14:dur="2000" advClick="0" advTm="5000"/>
     </mc:Choice>
     <mc:Fallback>
@@ -24976,7 +24847,7 @@
                                         <p:tgtEl>
                                           <p:spTgt spid="3">
                                             <p:txEl>
-                                              <p:charRg st="212" end="254"/>
+                                              <p:pRg st="4" end="4"/>
                                             </p:txEl>
                                           </p:spTgt>
                                         </p:tgtEl>
@@ -25261,7 +25132,7 @@
     <a:masterClrMapping/>
   </p:clrMapOvr>
   <mc:AlternateContent xmlns:mc="http://schemas.openxmlformats.org/markup-compatibility/2006">
-    <mc:Choice xmlns:p14="http://schemas.microsoft.com/office/powerpoint/2010/main" xmlns="" Requires="p14">
+    <mc:Choice xmlns="" xmlns:p14="http://schemas.microsoft.com/office/powerpoint/2010/main" Requires="p14">
       <p:transition spd="slow" p14:dur="2000" advClick="0" advTm="5000"/>
     </mc:Choice>
     <mc:Fallback>
@@ -25708,7 +25579,7 @@
     <a:masterClrMapping/>
   </p:clrMapOvr>
   <mc:AlternateContent xmlns:mc="http://schemas.openxmlformats.org/markup-compatibility/2006">
-    <mc:Choice xmlns:p14="http://schemas.microsoft.com/office/powerpoint/2010/main" xmlns="" Requires="p14">
+    <mc:Choice xmlns="" xmlns:p14="http://schemas.microsoft.com/office/powerpoint/2010/main" Requires="p14">
       <p:transition spd="slow" p14:dur="2000" advClick="0" advTm="5000"/>
     </mc:Choice>
     <mc:Fallback>
@@ -26193,7 +26064,7 @@
   <a:extraClrSchemeLst/>
   <a:extLst>
     <a:ext uri="{05A4C25C-085E-4340-85A3-A5531E510DB2}">
-      <thm15:themeFamily xmlns:thm15="http://schemas.microsoft.com/office/thememl/2012/main" xmlns="" name="SoftUni" id="{D61FAD9B-6E74-4E03-BFE4-B363D484F1DA}" vid="{7089C1A3-635B-4B03-A017-DAF10A3A396B}"/>
+      <thm15:themeFamily xmlns="" xmlns:thm15="http://schemas.microsoft.com/office/thememl/2012/main" name="SoftUni" id="{D61FAD9B-6E74-4E03-BFE4-B363D484F1DA}" vid="{7089C1A3-635B-4B03-A017-DAF10A3A396B}"/>
     </a:ext>
   </a:extLst>
 </a:theme>
@@ -26488,7 +26359,7 @@
   <a:extraClrSchemeLst/>
   <a:extLst>
     <a:ext uri="{05A4C25C-085E-4340-85A3-A5531E510DB2}">
-      <thm15:themeFamily xmlns:thm15="http://schemas.microsoft.com/office/thememl/2012/main" xmlns="" name="Office Theme" id="{62F939B6-93AF-4DB8-9C6B-D6C7DFDC589F}" vid="{4A3C46E8-61CC-4603-A589-7422A47A8E4A}"/>
+      <thm15:themeFamily xmlns="" xmlns:thm15="http://schemas.microsoft.com/office/thememl/2012/main" name="Office Theme" id="{62F939B6-93AF-4DB8-9C6B-D6C7DFDC589F}" vid="{4A3C46E8-61CC-4603-A589-7422A47A8E4A}"/>
     </a:ext>
   </a:extLst>
 </a:theme>
@@ -26783,16 +26654,19 @@
   <a:extraClrSchemeLst/>
   <a:extLst>
     <a:ext uri="{05A4C25C-085E-4340-85A3-A5531E510DB2}">
-      <thm15:themeFamily xmlns:thm15="http://schemas.microsoft.com/office/thememl/2012/main" xmlns="" name="Office Theme" id="{62F939B6-93AF-4DB8-9C6B-D6C7DFDC589F}" vid="{4A3C46E8-61CC-4603-A589-7422A47A8E4A}"/>
+      <thm15:themeFamily xmlns="" xmlns:thm15="http://schemas.microsoft.com/office/thememl/2012/main" name="Office Theme" id="{62F939B6-93AF-4DB8-9C6B-D6C7DFDC589F}" vid="{4A3C46E8-61CC-4603-A589-7422A47A8E4A}"/>
     </a:ext>
   </a:extLst>
 </a:theme>
 </file>
 
 <file path=customXml/item1.xml><?xml version="1.0" encoding="utf-8"?>
-<p:properties xmlns:p="http://schemas.microsoft.com/office/2006/metadata/properties" xmlns:xsi="http://www.w3.org/2001/XMLSchema-instance" xmlns:pc="http://schemas.microsoft.com/office/infopath/2007/PartnerControls">
-  <documentManagement/>
-</p:properties>
+<?mso-contentType ?>
+<FormTemplates xmlns="http://schemas.microsoft.com/sharepoint/v3/contenttype/forms">
+  <Display>DocumentLibraryForm</Display>
+  <Edit>DocumentLibraryForm</Edit>
+  <New>DocumentLibraryForm</New>
+</FormTemplates>
 </file>
 
 <file path=customXml/item2.xml><?xml version="1.0" encoding="utf-8"?>
@@ -26968,26 +26842,15 @@
 </file>
 
 <file path=customXml/item3.xml><?xml version="1.0" encoding="utf-8"?>
-<?mso-contentType ?>
-<FormTemplates xmlns="http://schemas.microsoft.com/sharepoint/v3/contenttype/forms">
-  <Display>DocumentLibraryForm</Display>
-  <Edit>DocumentLibraryForm</Edit>
-  <New>DocumentLibraryForm</New>
-</FormTemplates>
+<p:properties xmlns:p="http://schemas.microsoft.com/office/2006/metadata/properties" xmlns:xsi="http://www.w3.org/2001/XMLSchema-instance" xmlns:pc="http://schemas.microsoft.com/office/infopath/2007/PartnerControls">
+  <documentManagement/>
+</p:properties>
 </file>
 
 <file path=customXml/itemProps1.xml><?xml version="1.0" encoding="utf-8"?>
-<ds:datastoreItem xmlns:ds="http://schemas.openxmlformats.org/officeDocument/2006/customXml" ds:itemID="{5E2F4A33-1866-4BB8-8A35-8D6BDFE8D9F5}">
+<ds:datastoreItem xmlns:ds="http://schemas.openxmlformats.org/officeDocument/2006/customXml" ds:itemID="{68A20BEC-F81B-49CD-951D-E62C4BAE7796}">
   <ds:schemaRefs>
-    <ds:schemaRef ds:uri="http://schemas.microsoft.com/office/infopath/2007/PartnerControls"/>
-    <ds:schemaRef ds:uri="http://purl.org/dc/dcmitype/"/>
-    <ds:schemaRef ds:uri="http://schemas.microsoft.com/office/2006/documentManagement/types"/>
-    <ds:schemaRef ds:uri="http://schemas.microsoft.com/office/2006/metadata/properties"/>
-    <ds:schemaRef ds:uri="http://www.w3.org/XML/1998/namespace"/>
-    <ds:schemaRef ds:uri="4f985cec-e092-4bcf-a1e1-b816bd0221d8"/>
-    <ds:schemaRef ds:uri="http://schemas.openxmlformats.org/package/2006/metadata/core-properties"/>
-    <ds:schemaRef ds:uri="http://purl.org/dc/terms/"/>
-    <ds:schemaRef ds:uri="http://purl.org/dc/elements/1.1/"/>
+    <ds:schemaRef ds:uri="http://schemas.microsoft.com/sharepoint/v3/contenttype/forms"/>
   </ds:schemaRefs>
 </ds:datastoreItem>
 </file>
@@ -27011,9 +26874,17 @@
 </file>
 
 <file path=customXml/itemProps3.xml><?xml version="1.0" encoding="utf-8"?>
-<ds:datastoreItem xmlns:ds="http://schemas.openxmlformats.org/officeDocument/2006/customXml" ds:itemID="{68A20BEC-F81B-49CD-951D-E62C4BAE7796}">
+<ds:datastoreItem xmlns:ds="http://schemas.openxmlformats.org/officeDocument/2006/customXml" ds:itemID="{5E2F4A33-1866-4BB8-8A35-8D6BDFE8D9F5}">
   <ds:schemaRefs>
-    <ds:schemaRef ds:uri="http://schemas.microsoft.com/sharepoint/v3/contenttype/forms"/>
+    <ds:schemaRef ds:uri="http://schemas.microsoft.com/office/infopath/2007/PartnerControls"/>
+    <ds:schemaRef ds:uri="http://purl.org/dc/dcmitype/"/>
+    <ds:schemaRef ds:uri="http://schemas.microsoft.com/office/2006/documentManagement/types"/>
+    <ds:schemaRef ds:uri="http://schemas.microsoft.com/office/2006/metadata/properties"/>
+    <ds:schemaRef ds:uri="http://www.w3.org/XML/1998/namespace"/>
+    <ds:schemaRef ds:uri="4f985cec-e092-4bcf-a1e1-b816bd0221d8"/>
+    <ds:schemaRef ds:uri="http://schemas.openxmlformats.org/package/2006/metadata/core-properties"/>
+    <ds:schemaRef ds:uri="http://purl.org/dc/terms/"/>
+    <ds:schemaRef ds:uri="http://purl.org/dc/elements/1.1/"/>
   </ds:schemaRefs>
 </ds:datastoreItem>
 </file>
</xml_diff>

<commit_message>
Fixes for connection between c# and database slides
</commit_message>
<xml_diff>
--- a/Courses/Software-Sciences/Module-3-Databases-New/12-Connection-Between-C#-and-Database/12-Connection-Between-C#-and-Database.pptx
+++ b/Courses/Software-Sciences/Module-3-Databases-New/12-Connection-Between-C#-and-Database/12-Connection-Between-C#-and-Database.pptx
@@ -363,7 +363,7 @@
             <a:fld id="{4E087215-0C8F-4762-A664-737A353EC9A4}" type="datetimeFigureOut">
               <a:rPr lang="bg-BG" smtClean="0"/>
               <a:pPr/>
-              <a:t>19.9.2023 г.</a:t>
+              <a:t>29.09.23 г.</a:t>
             </a:fld>
             <a:endParaRPr lang="bg-BG" dirty="0"/>
           </a:p>
@@ -556,7 +556,7 @@
             <a:fld id="{72D84649-876A-46C9-8472-14CB09C070D8}" type="datetimeFigureOut">
               <a:rPr lang="en-US" smtClean="0"/>
               <a:pPr/>
-              <a:t>9/19/2023</a:t>
+              <a:t>9/29/23</a:t>
             </a:fld>
             <a:endParaRPr lang="en-US" dirty="0"/>
           </a:p>
@@ -1649,135 +1649,29 @@
           <a:bodyPr/>
           <a:lstStyle/>
           <a:p>
-            <a:endParaRPr lang="en-US" dirty="0"/>
+            <a:endParaRPr lang="bg-BG" dirty="0"/>
           </a:p>
         </p:txBody>
       </p:sp>
       <p:sp>
         <p:nvSpPr>
-          <p:cNvPr id="7" name="Slide Number Placeholder 5">
-            <a:extLst>
-              <a:ext uri="{FF2B5EF4-FFF2-40B4-BE49-F238E27FC236}">
-                <a16:creationId xmlns:a16="http://schemas.microsoft.com/office/drawing/2014/main" id="{E65F1CA9-65DC-416B-8882-B3A5E415CE67}"/>
-              </a:ext>
-            </a:extLst>
-          </p:cNvPr>
-          <p:cNvSpPr txBox="1">
-            <a:spLocks/>
+          <p:cNvPr id="4" name="Slide Number Placeholder 3"/>
+          <p:cNvSpPr>
+            <a:spLocks noGrp="1"/>
           </p:cNvSpPr>
-          <p:nvPr/>
+          <p:nvPr>
+            <p:ph type="sldNum" sz="quarter" idx="5"/>
+          </p:nvPr>
         </p:nvSpPr>
-        <p:spPr>
-          <a:xfrm>
-            <a:off x="6488999" y="8847000"/>
-            <a:ext cx="367414" cy="297000"/>
-          </a:xfrm>
-          <a:prstGeom prst="rect">
-            <a:avLst/>
-          </a:prstGeom>
-        </p:spPr>
+        <p:spPr/>
         <p:txBody>
-          <a:bodyPr vert="horz" lIns="91440" tIns="45720" rIns="91440" bIns="45720" rtlCol="0" anchor="b"/>
-          <a:lstStyle>
-            <a:defPPr>
-              <a:defRPr lang="en-US"/>
-            </a:defPPr>
-            <a:lvl1pPr marL="0" algn="r" defTabSz="914400" rtl="0" eaLnBrk="1" latinLnBrk="0" hangingPunct="1">
-              <a:defRPr sz="1200" kern="1200">
-                <a:solidFill>
-                  <a:schemeClr val="tx1"/>
-                </a:solidFill>
-                <a:latin typeface="+mn-lt"/>
-                <a:ea typeface="+mn-ea"/>
-                <a:cs typeface="+mn-cs"/>
-              </a:defRPr>
-            </a:lvl1pPr>
-            <a:lvl2pPr marL="457200" algn="l" defTabSz="914400" rtl="0" eaLnBrk="1" latinLnBrk="0" hangingPunct="1">
-              <a:defRPr sz="1800" kern="1200">
-                <a:solidFill>
-                  <a:schemeClr val="tx1"/>
-                </a:solidFill>
-                <a:latin typeface="+mn-lt"/>
-                <a:ea typeface="+mn-ea"/>
-                <a:cs typeface="+mn-cs"/>
-              </a:defRPr>
-            </a:lvl2pPr>
-            <a:lvl3pPr marL="914400" algn="l" defTabSz="914400" rtl="0" eaLnBrk="1" latinLnBrk="0" hangingPunct="1">
-              <a:defRPr sz="1800" kern="1200">
-                <a:solidFill>
-                  <a:schemeClr val="tx1"/>
-                </a:solidFill>
-                <a:latin typeface="+mn-lt"/>
-                <a:ea typeface="+mn-ea"/>
-                <a:cs typeface="+mn-cs"/>
-              </a:defRPr>
-            </a:lvl3pPr>
-            <a:lvl4pPr marL="1371600" algn="l" defTabSz="914400" rtl="0" eaLnBrk="1" latinLnBrk="0" hangingPunct="1">
-              <a:defRPr sz="1800" kern="1200">
-                <a:solidFill>
-                  <a:schemeClr val="tx1"/>
-                </a:solidFill>
-                <a:latin typeface="+mn-lt"/>
-                <a:ea typeface="+mn-ea"/>
-                <a:cs typeface="+mn-cs"/>
-              </a:defRPr>
-            </a:lvl4pPr>
-            <a:lvl5pPr marL="1828800" algn="l" defTabSz="914400" rtl="0" eaLnBrk="1" latinLnBrk="0" hangingPunct="1">
-              <a:defRPr sz="1800" kern="1200">
-                <a:solidFill>
-                  <a:schemeClr val="tx1"/>
-                </a:solidFill>
-                <a:latin typeface="+mn-lt"/>
-                <a:ea typeface="+mn-ea"/>
-                <a:cs typeface="+mn-cs"/>
-              </a:defRPr>
-            </a:lvl5pPr>
-            <a:lvl6pPr marL="2286000" algn="l" defTabSz="914400" rtl="0" eaLnBrk="1" latinLnBrk="0" hangingPunct="1">
-              <a:defRPr sz="1800" kern="1200">
-                <a:solidFill>
-                  <a:schemeClr val="tx1"/>
-                </a:solidFill>
-                <a:latin typeface="+mn-lt"/>
-                <a:ea typeface="+mn-ea"/>
-                <a:cs typeface="+mn-cs"/>
-              </a:defRPr>
-            </a:lvl6pPr>
-            <a:lvl7pPr marL="2743200" algn="l" defTabSz="914400" rtl="0" eaLnBrk="1" latinLnBrk="0" hangingPunct="1">
-              <a:defRPr sz="1800" kern="1200">
-                <a:solidFill>
-                  <a:schemeClr val="tx1"/>
-                </a:solidFill>
-                <a:latin typeface="+mn-lt"/>
-                <a:ea typeface="+mn-ea"/>
-                <a:cs typeface="+mn-cs"/>
-              </a:defRPr>
-            </a:lvl7pPr>
-            <a:lvl8pPr marL="3200400" algn="l" defTabSz="914400" rtl="0" eaLnBrk="1" latinLnBrk="0" hangingPunct="1">
-              <a:defRPr sz="1800" kern="1200">
-                <a:solidFill>
-                  <a:schemeClr val="tx1"/>
-                </a:solidFill>
-                <a:latin typeface="+mn-lt"/>
-                <a:ea typeface="+mn-ea"/>
-                <a:cs typeface="+mn-cs"/>
-              </a:defRPr>
-            </a:lvl8pPr>
-            <a:lvl9pPr marL="3657600" algn="l" defTabSz="914400" rtl="0" eaLnBrk="1" latinLnBrk="0" hangingPunct="1">
-              <a:defRPr sz="1800" kern="1200">
-                <a:solidFill>
-                  <a:schemeClr val="tx1"/>
-                </a:solidFill>
-                <a:latin typeface="+mn-lt"/>
-                <a:ea typeface="+mn-ea"/>
-                <a:cs typeface="+mn-cs"/>
-              </a:defRPr>
-            </a:lvl9pPr>
-          </a:lstStyle>
-          <a:p>
-            <a:fld id="{3EBA5BD7-F043-4D1B-AA17-CD412FC534DE}" type="slidenum">
+          <a:bodyPr/>
+          <a:lstStyle/>
+          <a:p>
+            <a:fld id="{2BF067CD-8E6B-4360-9AA8-C5DF2A48A6D1}" type="slidenum">
               <a:rPr lang="en-US" smtClean="0"/>
               <a:pPr/>
-              <a:t>29</a:t>
+              <a:t>25</a:t>
             </a:fld>
             <a:endParaRPr lang="en-US" dirty="0"/>
           </a:p>
@@ -1785,13 +1679,7 @@
       </p:sp>
       <p:sp>
         <p:nvSpPr>
-          <p:cNvPr id="4" name="Footer Placeholder 3">
-            <a:extLst>
-              <a:ext uri="{FF2B5EF4-FFF2-40B4-BE49-F238E27FC236}">
-                <a16:creationId xmlns:a16="http://schemas.microsoft.com/office/drawing/2014/main" id="{C5BD11C3-9FCD-4EAE-876D-E766924FAFF2}"/>
-              </a:ext>
-            </a:extLst>
-          </p:cNvPr>
+          <p:cNvPr id="5" name="Footer Placeholder 4"/>
           <p:cNvSpPr>
             <a:spLocks noGrp="1"/>
           </p:cNvSpPr>
@@ -1805,26 +1693,27 @@
           <a:lstStyle/>
           <a:p>
             <a:r>
-              <a:rPr lang="en-US" dirty="0"/>
+              <a:rPr lang="en-US"/>
               <a:t>© SoftUni – </a:t>
             </a:r>
             <a:r>
-              <a:rPr lang="en-US" u="sng" dirty="0">
+              <a:rPr lang="en-US" u="sng">
                 <a:hlinkClick r:id="rId3"/>
               </a:rPr>
               <a:t>https://softuni.org</a:t>
             </a:r>
             <a:r>
-              <a:rPr lang="en-US" dirty="0"/>
+              <a:rPr lang="en-US"/>
               <a:t>. Copyrighted document. Unauthorized copy or reproduction is not permitted.</a:t>
             </a:r>
+            <a:endParaRPr lang="en-US" dirty="0"/>
           </a:p>
         </p:txBody>
       </p:sp>
     </p:spTree>
     <p:extLst>
       <p:ext uri="{BB962C8B-B14F-4D97-AF65-F5344CB8AC3E}">
-        <p14:creationId xmlns:p14="http://schemas.microsoft.com/office/powerpoint/2010/main" val="1860974293"/>
+        <p14:creationId xmlns:p14="http://schemas.microsoft.com/office/powerpoint/2010/main" val="4064119551"/>
       </p:ext>
     </p:extLst>
   </p:cSld>
@@ -1878,6 +1767,235 @@
           <a:bodyPr/>
           <a:lstStyle/>
           <a:p>
+            <a:endParaRPr lang="en-US" dirty="0"/>
+          </a:p>
+        </p:txBody>
+      </p:sp>
+      <p:sp>
+        <p:nvSpPr>
+          <p:cNvPr id="7" name="Slide Number Placeholder 5">
+            <a:extLst>
+              <a:ext uri="{FF2B5EF4-FFF2-40B4-BE49-F238E27FC236}">
+                <a16:creationId xmlns:a16="http://schemas.microsoft.com/office/drawing/2014/main" id="{E65F1CA9-65DC-416B-8882-B3A5E415CE67}"/>
+              </a:ext>
+            </a:extLst>
+          </p:cNvPr>
+          <p:cNvSpPr txBox="1">
+            <a:spLocks/>
+          </p:cNvSpPr>
+          <p:nvPr/>
+        </p:nvSpPr>
+        <p:spPr>
+          <a:xfrm>
+            <a:off x="6488999" y="8847000"/>
+            <a:ext cx="367414" cy="297000"/>
+          </a:xfrm>
+          <a:prstGeom prst="rect">
+            <a:avLst/>
+          </a:prstGeom>
+        </p:spPr>
+        <p:txBody>
+          <a:bodyPr vert="horz" lIns="91440" tIns="45720" rIns="91440" bIns="45720" rtlCol="0" anchor="b"/>
+          <a:lstStyle>
+            <a:defPPr>
+              <a:defRPr lang="en-US"/>
+            </a:defPPr>
+            <a:lvl1pPr marL="0" algn="r" defTabSz="914400" rtl="0" eaLnBrk="1" latinLnBrk="0" hangingPunct="1">
+              <a:defRPr sz="1200" kern="1200">
+                <a:solidFill>
+                  <a:schemeClr val="tx1"/>
+                </a:solidFill>
+                <a:latin typeface="+mn-lt"/>
+                <a:ea typeface="+mn-ea"/>
+                <a:cs typeface="+mn-cs"/>
+              </a:defRPr>
+            </a:lvl1pPr>
+            <a:lvl2pPr marL="457200" algn="l" defTabSz="914400" rtl="0" eaLnBrk="1" latinLnBrk="0" hangingPunct="1">
+              <a:defRPr sz="1800" kern="1200">
+                <a:solidFill>
+                  <a:schemeClr val="tx1"/>
+                </a:solidFill>
+                <a:latin typeface="+mn-lt"/>
+                <a:ea typeface="+mn-ea"/>
+                <a:cs typeface="+mn-cs"/>
+              </a:defRPr>
+            </a:lvl2pPr>
+            <a:lvl3pPr marL="914400" algn="l" defTabSz="914400" rtl="0" eaLnBrk="1" latinLnBrk="0" hangingPunct="1">
+              <a:defRPr sz="1800" kern="1200">
+                <a:solidFill>
+                  <a:schemeClr val="tx1"/>
+                </a:solidFill>
+                <a:latin typeface="+mn-lt"/>
+                <a:ea typeface="+mn-ea"/>
+                <a:cs typeface="+mn-cs"/>
+              </a:defRPr>
+            </a:lvl3pPr>
+            <a:lvl4pPr marL="1371600" algn="l" defTabSz="914400" rtl="0" eaLnBrk="1" latinLnBrk="0" hangingPunct="1">
+              <a:defRPr sz="1800" kern="1200">
+                <a:solidFill>
+                  <a:schemeClr val="tx1"/>
+                </a:solidFill>
+                <a:latin typeface="+mn-lt"/>
+                <a:ea typeface="+mn-ea"/>
+                <a:cs typeface="+mn-cs"/>
+              </a:defRPr>
+            </a:lvl4pPr>
+            <a:lvl5pPr marL="1828800" algn="l" defTabSz="914400" rtl="0" eaLnBrk="1" latinLnBrk="0" hangingPunct="1">
+              <a:defRPr sz="1800" kern="1200">
+                <a:solidFill>
+                  <a:schemeClr val="tx1"/>
+                </a:solidFill>
+                <a:latin typeface="+mn-lt"/>
+                <a:ea typeface="+mn-ea"/>
+                <a:cs typeface="+mn-cs"/>
+              </a:defRPr>
+            </a:lvl5pPr>
+            <a:lvl6pPr marL="2286000" algn="l" defTabSz="914400" rtl="0" eaLnBrk="1" latinLnBrk="0" hangingPunct="1">
+              <a:defRPr sz="1800" kern="1200">
+                <a:solidFill>
+                  <a:schemeClr val="tx1"/>
+                </a:solidFill>
+                <a:latin typeface="+mn-lt"/>
+                <a:ea typeface="+mn-ea"/>
+                <a:cs typeface="+mn-cs"/>
+              </a:defRPr>
+            </a:lvl6pPr>
+            <a:lvl7pPr marL="2743200" algn="l" defTabSz="914400" rtl="0" eaLnBrk="1" latinLnBrk="0" hangingPunct="1">
+              <a:defRPr sz="1800" kern="1200">
+                <a:solidFill>
+                  <a:schemeClr val="tx1"/>
+                </a:solidFill>
+                <a:latin typeface="+mn-lt"/>
+                <a:ea typeface="+mn-ea"/>
+                <a:cs typeface="+mn-cs"/>
+              </a:defRPr>
+            </a:lvl7pPr>
+            <a:lvl8pPr marL="3200400" algn="l" defTabSz="914400" rtl="0" eaLnBrk="1" latinLnBrk="0" hangingPunct="1">
+              <a:defRPr sz="1800" kern="1200">
+                <a:solidFill>
+                  <a:schemeClr val="tx1"/>
+                </a:solidFill>
+                <a:latin typeface="+mn-lt"/>
+                <a:ea typeface="+mn-ea"/>
+                <a:cs typeface="+mn-cs"/>
+              </a:defRPr>
+            </a:lvl8pPr>
+            <a:lvl9pPr marL="3657600" algn="l" defTabSz="914400" rtl="0" eaLnBrk="1" latinLnBrk="0" hangingPunct="1">
+              <a:defRPr sz="1800" kern="1200">
+                <a:solidFill>
+                  <a:schemeClr val="tx1"/>
+                </a:solidFill>
+                <a:latin typeface="+mn-lt"/>
+                <a:ea typeface="+mn-ea"/>
+                <a:cs typeface="+mn-cs"/>
+              </a:defRPr>
+            </a:lvl9pPr>
+          </a:lstStyle>
+          <a:p>
+            <a:fld id="{3EBA5BD7-F043-4D1B-AA17-CD412FC534DE}" type="slidenum">
+              <a:rPr lang="en-US" smtClean="0"/>
+              <a:pPr/>
+              <a:t>29</a:t>
+            </a:fld>
+            <a:endParaRPr lang="en-US" dirty="0"/>
+          </a:p>
+        </p:txBody>
+      </p:sp>
+      <p:sp>
+        <p:nvSpPr>
+          <p:cNvPr id="4" name="Footer Placeholder 3">
+            <a:extLst>
+              <a:ext uri="{FF2B5EF4-FFF2-40B4-BE49-F238E27FC236}">
+                <a16:creationId xmlns:a16="http://schemas.microsoft.com/office/drawing/2014/main" id="{C5BD11C3-9FCD-4EAE-876D-E766924FAFF2}"/>
+              </a:ext>
+            </a:extLst>
+          </p:cNvPr>
+          <p:cNvSpPr>
+            <a:spLocks noGrp="1"/>
+          </p:cNvSpPr>
+          <p:nvPr>
+            <p:ph type="ftr" sz="quarter" idx="4"/>
+          </p:nvPr>
+        </p:nvSpPr>
+        <p:spPr/>
+        <p:txBody>
+          <a:bodyPr/>
+          <a:lstStyle/>
+          <a:p>
+            <a:r>
+              <a:rPr lang="en-US" dirty="0"/>
+              <a:t>© SoftUni – </a:t>
+            </a:r>
+            <a:r>
+              <a:rPr lang="en-US" u="sng" dirty="0">
+                <a:hlinkClick r:id="rId3"/>
+              </a:rPr>
+              <a:t>https://softuni.org</a:t>
+            </a:r>
+            <a:r>
+              <a:rPr lang="en-US" dirty="0"/>
+              <a:t>. Copyrighted document. Unauthorized copy or reproduction is not permitted.</a:t>
+            </a:r>
+          </a:p>
+        </p:txBody>
+      </p:sp>
+    </p:spTree>
+    <p:extLst>
+      <p:ext uri="{BB962C8B-B14F-4D97-AF65-F5344CB8AC3E}">
+        <p14:creationId xmlns:p14="http://schemas.microsoft.com/office/powerpoint/2010/main" val="1860974293"/>
+      </p:ext>
+    </p:extLst>
+  </p:cSld>
+  <p:clrMapOvr>
+    <a:masterClrMapping/>
+  </p:clrMapOvr>
+</p:notes>
+</file>
+
+<file path=ppt/notesSlides/notesSlide8.xml><?xml version="1.0" encoding="utf-8"?>
+<p:notes xmlns:a="http://schemas.openxmlformats.org/drawingml/2006/main" xmlns:r="http://schemas.openxmlformats.org/officeDocument/2006/relationships" xmlns:p="http://schemas.openxmlformats.org/presentationml/2006/main">
+  <p:cSld>
+    <p:spTree>
+      <p:nvGrpSpPr>
+        <p:cNvPr id="1" name=""/>
+        <p:cNvGrpSpPr/>
+        <p:nvPr/>
+      </p:nvGrpSpPr>
+      <p:grpSpPr>
+        <a:xfrm>
+          <a:off x="0" y="0"/>
+          <a:ext cx="0" cy="0"/>
+          <a:chOff x="0" y="0"/>
+          <a:chExt cx="0" cy="0"/>
+        </a:xfrm>
+      </p:grpSpPr>
+      <p:sp>
+        <p:nvSpPr>
+          <p:cNvPr id="2" name="Slide Image Placeholder 1"/>
+          <p:cNvSpPr>
+            <a:spLocks noGrp="1" noRot="1" noChangeAspect="1"/>
+          </p:cNvSpPr>
+          <p:nvPr>
+            <p:ph type="sldImg"/>
+          </p:nvPr>
+        </p:nvSpPr>
+        <p:spPr/>
+      </p:sp>
+      <p:sp>
+        <p:nvSpPr>
+          <p:cNvPr id="3" name="Notes Placeholder 2"/>
+          <p:cNvSpPr>
+            <a:spLocks noGrp="1"/>
+          </p:cNvSpPr>
+          <p:nvPr>
+            <p:ph type="body" idx="1"/>
+          </p:nvPr>
+        </p:nvSpPr>
+        <p:spPr/>
+        <p:txBody>
+          <a:bodyPr/>
+          <a:lstStyle/>
+          <a:p>
             <a:endParaRPr lang="x-none"/>
           </a:p>
         </p:txBody>
@@ -1919,7 +2037,7 @@
 </p:notes>
 </file>
 
-<file path=ppt/notesSlides/notesSlide8.xml><?xml version="1.0" encoding="utf-8"?>
+<file path=ppt/notesSlides/notesSlide9.xml><?xml version="1.0" encoding="utf-8"?>
 <p:notes xmlns:a="http://schemas.openxmlformats.org/drawingml/2006/main" xmlns:r="http://schemas.openxmlformats.org/officeDocument/2006/relationships" xmlns:p="http://schemas.openxmlformats.org/presentationml/2006/main">
   <p:cSld>
     <p:spTree>
@@ -5285,7 +5403,7 @@
             <a:fld id="{1CF2F75B-1C4E-1E47-AE31-5B79E79ADF4F}" type="datetimeFigureOut">
               <a:rPr lang="x-none" smtClean="0"/>
               <a:pPr/>
-              <a:t>9/19/2023</a:t>
+              <a:t>29.09.23</a:t>
             </a:fld>
             <a:endParaRPr lang="x-none"/>
           </a:p>
@@ -6399,7 +6517,7 @@
             <a:fld id="{1D8BD707-D9CF-40AE-B4C6-C98DA3205C09}" type="datetimeFigureOut">
               <a:rPr lang="en-US"/>
               <a:pPr/>
-              <a:t>9/19/2023</a:t>
+              <a:t>9/29/23</a:t>
             </a:fld>
             <a:endParaRPr lang="en-US" dirty="0"/>
           </a:p>
@@ -13263,13 +13381,13 @@
         <p:spPr/>
         <p:txBody>
           <a:bodyPr>
-            <a:normAutofit fontScale="92500" lnSpcReduction="20000"/>
+            <a:normAutofit fontScale="92500" lnSpcReduction="10000"/>
           </a:bodyPr>
           <a:lstStyle/>
           <a:p>
             <a:r>
               <a:rPr lang="ru-RU" dirty="0"/>
-              <a:t>Куп нормални </a:t>
+              <a:t>Съвкупност от нормални </a:t>
             </a:r>
             <a:r>
               <a:rPr lang="ru-RU" b="1" dirty="0">
@@ -13297,7 +13415,7 @@
                   <a:schemeClr val="bg1"/>
                 </a:solidFill>
               </a:rPr>
-              <a:t>пропъртита</a:t>
+              <a:t>свойства</a:t>
             </a:r>
             <a:r>
               <a:rPr lang="ru-RU" dirty="0"/>
@@ -13436,8 +13554,8 @@
         </p:nvSpPr>
         <p:spPr>
           <a:xfrm>
-            <a:off x="915749" y="2895600"/>
-            <a:ext cx="10360501" cy="2504649"/>
+            <a:off x="915749" y="2737199"/>
+            <a:ext cx="10360501" cy="2596801"/>
           </a:xfrm>
           <a:prstGeom prst="rect">
             <a:avLst/>
@@ -13476,6 +13594,14 @@
             </a:lvl1pPr>
           </a:lstStyle>
           <a:p>
+            <a:pPr>
+              <a:lnSpc>
+                <a:spcPct val="100000"/>
+              </a:lnSpc>
+              <a:spcBef>
+                <a:spcPts val="500"/>
+              </a:spcBef>
+            </a:pPr>
             <a:r>
               <a:rPr lang="en-US" sz="2799" noProof="1"/>
               <a:t>public class PostAnswer</a:t>
@@ -13577,7 +13703,7 @@
         </p:nvSpPr>
         <p:spPr bwMode="auto">
           <a:xfrm>
-            <a:off x="6595402" y="2985195"/>
+            <a:off x="6595402" y="2895600"/>
             <a:ext cx="2548598" cy="510778"/>
           </a:xfrm>
           <a:prstGeom prst="wedgeRoundRectCallout">
@@ -13668,12 +13794,12 @@
         </p:nvSpPr>
         <p:spPr bwMode="auto">
           <a:xfrm>
-            <a:off x="8649754" y="4180773"/>
+            <a:off x="8649754" y="4061222"/>
             <a:ext cx="2399246" cy="510778"/>
           </a:xfrm>
           <a:prstGeom prst="wedgeRoundRectCallout">
             <a:avLst>
-              <a:gd name="adj1" fmla="val -70444"/>
+              <a:gd name="adj1" fmla="val -79972"/>
               <a:gd name="adj2" fmla="val 18384"/>
               <a:gd name="adj3" fmla="val 16667"/>
             </a:avLst>
@@ -13759,7 +13885,7 @@
         </p:nvSpPr>
         <p:spPr bwMode="auto">
           <a:xfrm>
-            <a:off x="7107932" y="5140683"/>
+            <a:off x="7107932" y="5029200"/>
             <a:ext cx="4169668" cy="510778"/>
           </a:xfrm>
           <a:prstGeom prst="wedgeRoundRectCallout">
@@ -13823,7 +13949,7 @@
                   </a:outerShdw>
                 </a:effectLst>
               </a:rPr>
-              <a:t>Навигационно пропърти</a:t>
+              <a:t>Навигационно свойство</a:t>
             </a:r>
             <a:endParaRPr lang="en-US" sz="2400" b="1" noProof="1">
               <a:solidFill>
@@ -14164,6 +14290,18 @@
                   <a:schemeClr val="bg1"/>
                 </a:solidFill>
               </a:rPr>
+              <a:t> таблица </a:t>
+            </a:r>
+            <a:r>
+              <a:rPr lang="ru-RU" dirty="0"/>
+              <a:t>към</a:t>
+            </a:r>
+            <a:r>
+              <a:rPr lang="ru-RU" b="1" dirty="0">
+                <a:solidFill>
+                  <a:schemeClr val="bg1"/>
+                </a:solidFill>
+              </a:rPr>
               <a:t> колекция </a:t>
             </a:r>
             <a:r>
@@ -14177,18 +14315,6 @@
                 </a:solidFill>
               </a:rPr>
               <a:t> обекти </a:t>
-            </a:r>
-            <a:r>
-              <a:rPr lang="ru-RU" dirty="0"/>
-              <a:t>от</a:t>
-            </a:r>
-            <a:r>
-              <a:rPr lang="ru-RU" b="1" dirty="0">
-                <a:solidFill>
-                  <a:schemeClr val="bg1"/>
-                </a:solidFill>
-              </a:rPr>
-              <a:t> таблица</a:t>
             </a:r>
             <a:endParaRPr lang="en-US" b="1" dirty="0">
               <a:solidFill>
@@ -14294,7 +14420,7 @@
             </a:r>
             <a:r>
               <a:rPr lang="bg-BG" dirty="0"/>
-              <a:t>пропъртита</a:t>
+              <a:t>свойства</a:t>
             </a:r>
             <a:endParaRPr lang="en-US" dirty="0"/>
           </a:p>
@@ -18427,15 +18553,7 @@
             </a:r>
             <a:r>
               <a:rPr lang="en-US" dirty="0"/>
-              <a:t> </a:t>
-            </a:r>
-            <a:r>
-              <a:rPr lang="en-US" dirty="0" err="1"/>
-              <a:t>от</a:t>
-            </a:r>
-            <a:r>
-              <a:rPr lang="en-US" dirty="0"/>
-              <a:t> </a:t>
+              <a:t> от </a:t>
             </a:r>
             <a:r>
               <a:rPr lang="bg-BG" b="1" dirty="0">
@@ -20051,7 +20169,7 @@
                   <a:schemeClr val="bg1"/>
                 </a:solidFill>
               </a:rPr>
-              <a:t> навигационни пропъртита</a:t>
+              <a:t> навигационни свойства</a:t>
             </a:r>
             <a:endParaRPr lang="en-US" sz="3700" b="1" dirty="0">
               <a:solidFill>
@@ -20623,7 +20741,7 @@
             </a:r>
             <a:r>
               <a:rPr lang="bg-BG" sz="3399" dirty="0"/>
-              <a:t>пропъртита</a:t>
+              <a:t>свойства</a:t>
             </a:r>
             <a:r>
               <a:rPr lang="en-US" sz="3399" dirty="0"/>
@@ -20750,7 +20868,7 @@
             </a:pPr>
             <a:r>
               <a:rPr lang="ru-RU" dirty="0"/>
-              <a:t>Всички класове обекти (таблици) са посочени като пропъртита</a:t>
+              <a:t>Всички класове обекти (таблици) са посочени като свойства</a:t>
             </a:r>
             <a:endParaRPr lang="en-US" dirty="0"/>
           </a:p>
@@ -21324,7 +21442,7 @@
             </a:r>
             <a:r>
               <a:rPr lang="bg-BG" dirty="0"/>
-              <a:t>пропърти в</a:t>
+              <a:t>свойство в</a:t>
             </a:r>
             <a:r>
               <a:rPr lang="en-US" dirty="0"/>
@@ -22072,6 +22190,9 @@
             <a:endParaRPr lang="en-US" dirty="0"/>
           </a:p>
           <a:p>
+            <a:pPr marL="0" indent="0">
+              <a:buNone/>
+            </a:pPr>
             <a:endParaRPr lang="bg-BG" dirty="0"/>
           </a:p>
           <a:p>
@@ -22547,7 +22668,7 @@
         <p:spPr bwMode="auto">
           <a:xfrm>
             <a:off x="3733800" y="4061222"/>
-            <a:ext cx="5166600" cy="510778"/>
+            <a:ext cx="5257800" cy="510778"/>
           </a:xfrm>
           <a:prstGeom prst="wedgeRoundRectCallout">
             <a:avLst>
@@ -22888,7 +23009,19 @@
           <a:p>
             <a:r>
               <a:rPr lang="ru-RU" noProof="1"/>
-              <a:t>За да създадете нов ред на таблица на база данни, използвайте метода</a:t>
+              <a:t>За да създадете </a:t>
+            </a:r>
+            <a:r>
+              <a:rPr lang="ru-RU" b="1" noProof="1">
+                <a:solidFill>
+                  <a:schemeClr val="bg1"/>
+                </a:solidFill>
+              </a:rPr>
+              <a:t>нов ред </a:t>
+            </a:r>
+            <a:r>
+              <a:rPr lang="ru-RU" noProof="1"/>
+              <a:t>на таблица на база данни, използвайте метода</a:t>
             </a:r>
             <a:r>
               <a:rPr lang="en-US" noProof="1"/>
@@ -24493,12 +24626,12 @@
               <a:t> на </a:t>
             </a:r>
             <a:r>
-              <a:rPr lang="ru-RU" b="1" dirty="0">
+              <a:rPr lang="ru-RU" b="1" dirty="0" err="1">
                 <a:solidFill>
                   <a:schemeClr val="bg1"/>
                 </a:solidFill>
               </a:rPr>
-              <a:t>пропъртитата</a:t>
+              <a:t>свойствата</a:t>
             </a:r>
             <a:r>
               <a:rPr lang="ru-RU" dirty="0"/>
@@ -24763,8 +24896,8 @@
           </a:xfrm>
           <a:prstGeom prst="wedgeRoundRectCallout">
             <a:avLst>
-              <a:gd name="adj1" fmla="val -58872"/>
-              <a:gd name="adj2" fmla="val -52092"/>
+              <a:gd name="adj1" fmla="val -49983"/>
+              <a:gd name="adj2" fmla="val -68668"/>
               <a:gd name="adj3" fmla="val 16667"/>
             </a:avLst>
           </a:prstGeom>
@@ -25654,7 +25787,7 @@
         <p:spPr bwMode="auto">
           <a:xfrm>
             <a:off x="6553081" y="5838110"/>
-            <a:ext cx="3415314" cy="510778"/>
+            <a:ext cx="2209919" cy="510778"/>
           </a:xfrm>
           <a:prstGeom prst="wedgeRoundRectCallout">
             <a:avLst>
@@ -26734,7 +26867,7 @@
                   <a:schemeClr val="bg2"/>
                 </a:solidFill>
               </a:rPr>
-              <a:t>, които упростяват манипулацията с </a:t>
+              <a:t>, които опростяват манипулацията с </a:t>
             </a:r>
             <a:r>
               <a:rPr lang="ru-RU" sz="2400" b="1" dirty="0">
@@ -28567,12 +28700,20 @@
               <a:t>Използва се за </a:t>
             </a:r>
             <a:r>
-              <a:rPr lang="ru-RU" b="1" dirty="0">
+              <a:rPr lang="bg-BG" b="1" dirty="0">
                 <a:solidFill>
                   <a:schemeClr val="bg1"/>
                 </a:solidFill>
               </a:rPr>
-              <a:t>упростяване</a:t>
+              <a:t>о</a:t>
+            </a:r>
+            <a:r>
+              <a:rPr lang="ru-RU" b="1" dirty="0" err="1">
+                <a:solidFill>
+                  <a:schemeClr val="bg1"/>
+                </a:solidFill>
+              </a:rPr>
+              <a:t>простяване</a:t>
             </a:r>
             <a:r>
               <a:rPr lang="ru-RU" dirty="0"/>
@@ -28974,7 +29115,7 @@
         <p:spPr/>
         <p:txBody>
           <a:bodyPr>
-            <a:normAutofit fontScale="92500" lnSpcReduction="10000"/>
+            <a:normAutofit/>
           </a:bodyPr>
           <a:lstStyle/>
           <a:p>
@@ -28998,16 +29139,28 @@
               </a:buClr>
             </a:pPr>
             <a:r>
-              <a:rPr lang="bg-BG" b="1" dirty="0">
+              <a:rPr lang="ru-RU" dirty="0"/>
+              <a:t>Превръщане на </a:t>
+            </a:r>
+            <a:r>
+              <a:rPr lang="ru-RU" b="1" dirty="0">
                 <a:solidFill>
                   <a:schemeClr val="bg1"/>
                 </a:solidFill>
               </a:rPr>
-              <a:t>Обектно-релационно</a:t>
-            </a:r>
-            <a:r>
-              <a:rPr lang="bg-BG" dirty="0"/>
-              <a:t> съответствие</a:t>
+              <a:t>обекти</a:t>
+            </a:r>
+            <a:r>
+              <a:rPr lang="ru-RU" dirty="0"/>
+              <a:t> към </a:t>
+            </a:r>
+            <a:r>
+              <a:rPr lang="ru-RU" b="1" dirty="0">
+                <a:solidFill>
+                  <a:schemeClr val="bg1"/>
+                </a:solidFill>
+              </a:rPr>
+              <a:t>таблици</a:t>
             </a:r>
           </a:p>
           <a:p>
@@ -29017,28 +29170,59 @@
               </a:buClr>
             </a:pPr>
             <a:r>
-              <a:rPr lang="ru-RU" dirty="0"/>
-              <a:t>Превръщане на </a:t>
-            </a:r>
-            <a:r>
-              <a:rPr lang="ru-RU" b="1" dirty="0">
+              <a:rPr lang="bg-BG" b="1" dirty="0">
                 <a:solidFill>
                   <a:schemeClr val="bg1"/>
                 </a:solidFill>
               </a:rPr>
-              <a:t>обекти</a:t>
-            </a:r>
-            <a:r>
-              <a:rPr lang="ru-RU" dirty="0"/>
-              <a:t> към </a:t>
-            </a:r>
-            <a:r>
-              <a:rPr lang="ru-RU" b="1" dirty="0">
+              <a:t>Заявки</a:t>
+            </a:r>
+            <a:r>
+              <a:rPr lang="bg-BG" dirty="0"/>
+              <a:t> и </a:t>
+            </a:r>
+            <a:r>
+              <a:rPr lang="bg-BG" b="1" dirty="0">
                 <a:solidFill>
                   <a:schemeClr val="bg1"/>
                 </a:solidFill>
               </a:rPr>
-              <a:t>таблици</a:t>
+              <a:t>транзакции</a:t>
+            </a:r>
+          </a:p>
+          <a:p>
+            <a:pPr>
+              <a:buClr>
+                <a:schemeClr val="tx1"/>
+              </a:buClr>
+            </a:pPr>
+            <a:r>
+              <a:rPr lang="bg-BG" dirty="0"/>
+              <a:t>Популярни </a:t>
+            </a:r>
+            <a:r>
+              <a:rPr lang="en-US" b="1" dirty="0">
+                <a:solidFill>
+                  <a:schemeClr val="bg1"/>
+                </a:solidFill>
+              </a:rPr>
+              <a:t>ORM</a:t>
+            </a:r>
+            <a:r>
+              <a:rPr lang="en-US" dirty="0"/>
+              <a:t> </a:t>
+            </a:r>
+            <a:r>
+              <a:rPr lang="bg-BG" b="1" dirty="0" err="1">
+                <a:solidFill>
+                  <a:schemeClr val="bg1"/>
+                </a:solidFill>
+              </a:rPr>
+              <a:t>фреймуърци</a:t>
+            </a:r>
+            <a:r>
+              <a:rPr lang="bg-BG" dirty="0"/>
+              <a:t>:</a:t>
             </a:r>
           </a:p>
           <a:p>
@@ -29048,69 +29232,7 @@
               </a:buClr>
             </a:pPr>
             <a:r>
-              <a:rPr lang="bg-BG" b="1" dirty="0">
-                <a:solidFill>
-                  <a:schemeClr val="bg1"/>
-                </a:solidFill>
-              </a:rPr>
-              <a:t>Заявки</a:t>
-            </a:r>
-            <a:r>
-              <a:rPr lang="bg-BG" dirty="0"/>
-              <a:t> и </a:t>
-            </a:r>
-            <a:r>
-              <a:rPr lang="bg-BG" b="1" dirty="0">
-                <a:solidFill>
-                  <a:schemeClr val="bg1"/>
-                </a:solidFill>
-              </a:rPr>
-              <a:t>транзакции</a:t>
-            </a:r>
-          </a:p>
-          <a:p>
-            <a:pPr>
-              <a:buClr>
-                <a:schemeClr val="tx1"/>
-              </a:buClr>
-            </a:pPr>
-            <a:r>
-              <a:rPr lang="bg-BG" dirty="0"/>
-              <a:t>Популярни </a:t>
-            </a:r>
-            <a:r>
               <a:rPr lang="en-US" b="1" dirty="0">
-                <a:solidFill>
-                  <a:schemeClr val="bg1"/>
-                </a:solidFill>
-              </a:rPr>
-              <a:t>ORM</a:t>
-            </a:r>
-            <a:r>
-              <a:rPr lang="en-US" dirty="0"/>
-              <a:t> </a:t>
-            </a:r>
-            <a:r>
-              <a:rPr lang="bg-BG" b="1" dirty="0">
-                <a:solidFill>
-                  <a:schemeClr val="bg1"/>
-                </a:solidFill>
-              </a:rPr>
-              <a:t>фреймуърки</a:t>
-            </a:r>
-            <a:r>
-              <a:rPr lang="bg-BG" dirty="0"/>
-              <a:t>:</a:t>
-            </a:r>
-          </a:p>
-          <a:p>
-            <a:pPr lvl="1">
-              <a:buClr>
-                <a:schemeClr val="tx1"/>
-              </a:buClr>
-            </a:pPr>
-            <a:r>
-              <a:rPr lang="en-US" b="1" dirty="0" err="1">
                 <a:solidFill>
                   <a:schemeClr val="bg1"/>
                 </a:solidFill>
@@ -29261,7 +29383,7 @@
         </p:blipFill>
         <p:spPr bwMode="auto">
           <a:xfrm>
-            <a:off x="4648200" y="4038600"/>
+            <a:off x="5934075" y="3886200"/>
             <a:ext cx="1676398" cy="609600"/>
           </a:xfrm>
           <a:prstGeom prst="rect">
@@ -29287,7 +29409,7 @@
         </p:blipFill>
         <p:spPr bwMode="auto">
           <a:xfrm>
-            <a:off x="5486400" y="4495800"/>
+            <a:off x="6553200" y="4419600"/>
             <a:ext cx="1524000" cy="1066800"/>
           </a:xfrm>
           <a:prstGeom prst="rect">
@@ -29313,7 +29435,7 @@
         </p:blipFill>
         <p:spPr bwMode="auto">
           <a:xfrm>
-            <a:off x="4648200" y="5257800"/>
+            <a:off x="5638800" y="5105400"/>
             <a:ext cx="798787" cy="827315"/>
           </a:xfrm>
           <a:prstGeom prst="rect">
@@ -29339,7 +29461,7 @@
         </p:blipFill>
         <p:spPr bwMode="auto">
           <a:xfrm>
-            <a:off x="4495800" y="6019800"/>
+            <a:off x="5781675" y="5867400"/>
             <a:ext cx="3133725" cy="742951"/>
           </a:xfrm>
           <a:prstGeom prst="rect">
@@ -29365,7 +29487,7 @@
         </p:blipFill>
         <p:spPr bwMode="auto">
           <a:xfrm>
-            <a:off x="7086600" y="2514600"/>
+            <a:off x="7400753" y="1728471"/>
             <a:ext cx="4719691" cy="2400300"/>
           </a:xfrm>
           <a:prstGeom prst="rect">
@@ -29487,33 +29609,15 @@
                                   </p:childTnLst>
                                 </p:cTn>
                               </p:par>
-                            </p:childTnLst>
-                          </p:cTn>
-                        </p:par>
-                      </p:childTnLst>
-                    </p:cTn>
-                  </p:par>
-                  <p:par>
-                    <p:cTn id="11" fill="hold">
-                      <p:stCondLst>
-                        <p:cond delay="indefinite"/>
-                      </p:stCondLst>
-                      <p:childTnLst>
-                        <p:par>
-                          <p:cTn id="12" fill="hold">
-                            <p:stCondLst>
-                              <p:cond delay="0"/>
-                            </p:stCondLst>
-                            <p:childTnLst>
                               <p:par>
-                                <p:cTn id="13" presetID="1" presetClass="entr" presetSubtype="0" fill="hold" nodeType="clickEffect">
+                                <p:cTn id="11" presetID="1" presetClass="entr" presetSubtype="0" fill="hold" nodeType="withEffect">
                                   <p:stCondLst>
                                     <p:cond delay="0"/>
                                   </p:stCondLst>
                                   <p:childTnLst>
                                     <p:set>
                                       <p:cBhvr>
-                                        <p:cTn id="14" dur="1" fill="hold">
+                                        <p:cTn id="12" dur="1" fill="hold">
                                           <p:stCondLst>
                                             <p:cond delay="0"/>
                                           </p:stCondLst>
@@ -29537,45 +29641,14 @@
                                 </p:cTn>
                               </p:par>
                               <p:par>
-                                <p:cTn id="15" presetID="1" presetClass="entr" presetSubtype="0" fill="hold" nodeType="withEffect">
+                                <p:cTn id="13" presetID="1" presetClass="entr" presetSubtype="0" fill="hold" nodeType="withEffect">
                                   <p:stCondLst>
                                     <p:cond delay="0"/>
                                   </p:stCondLst>
                                   <p:childTnLst>
                                     <p:set>
                                       <p:cBhvr>
-                                        <p:cTn id="16" dur="1" fill="hold">
-                                          <p:stCondLst>
-                                            <p:cond delay="0"/>
-                                          </p:stCondLst>
-                                        </p:cTn>
-                                        <p:tgtEl>
-                                          <p:spTgt spid="3">
-                                            <p:txEl>
-                                              <p:pRg st="5" end="5"/>
-                                            </p:txEl>
-                                          </p:spTgt>
-                                        </p:tgtEl>
-                                        <p:attrNameLst>
-                                          <p:attrName>style.visibility</p:attrName>
-                                        </p:attrNameLst>
-                                      </p:cBhvr>
-                                      <p:to>
-                                        <p:strVal val="visible"/>
-                                      </p:to>
-                                    </p:set>
-                                  </p:childTnLst>
-                                </p:cTn>
-                              </p:par>
-                              <p:par>
-                                <p:cTn id="17" presetID="1" presetClass="entr" presetSubtype="0" fill="hold" nodeType="withEffect">
-                                  <p:stCondLst>
-                                    <p:cond delay="0"/>
-                                  </p:stCondLst>
-                                  <p:childTnLst>
-                                    <p:set>
-                                      <p:cBhvr>
-                                        <p:cTn id="18" dur="1" fill="hold">
+                                        <p:cTn id="14" dur="1" fill="hold">
                                           <p:stCondLst>
                                             <p:cond delay="0"/>
                                           </p:stCondLst>
@@ -29601,26 +29674,26 @@
                     </p:cTn>
                   </p:par>
                   <p:par>
-                    <p:cTn id="19" fill="hold">
+                    <p:cTn id="15" fill="hold">
                       <p:stCondLst>
                         <p:cond delay="indefinite"/>
                       </p:stCondLst>
                       <p:childTnLst>
                         <p:par>
-                          <p:cTn id="20" fill="hold">
+                          <p:cTn id="16" fill="hold">
                             <p:stCondLst>
                               <p:cond delay="0"/>
                             </p:stCondLst>
                             <p:childTnLst>
                               <p:par>
-                                <p:cTn id="21" presetID="1" presetClass="entr" presetSubtype="0" fill="hold" nodeType="clickEffect">
+                                <p:cTn id="17" presetID="1" presetClass="entr" presetSubtype="0" fill="hold" nodeType="clickEffect">
                                   <p:stCondLst>
                                     <p:cond delay="0"/>
                                   </p:stCondLst>
                                   <p:childTnLst>
                                     <p:set>
                                       <p:cBhvr>
-                                        <p:cTn id="22" dur="1" fill="hold">
+                                        <p:cTn id="18" dur="1" fill="hold">
                                           <p:stCondLst>
                                             <p:cond delay="0"/>
                                           </p:stCondLst>
@@ -29628,7 +29701,7 @@
                                         <p:tgtEl>
                                           <p:spTgt spid="3">
                                             <p:txEl>
-                                              <p:pRg st="6" end="6"/>
+                                              <p:pRg st="5" end="5"/>
                                             </p:txEl>
                                           </p:spTgt>
                                         </p:tgtEl>
@@ -29644,14 +29717,14 @@
                                 </p:cTn>
                               </p:par>
                               <p:par>
-                                <p:cTn id="23" presetID="1" presetClass="entr" presetSubtype="0" fill="hold" nodeType="withEffect">
+                                <p:cTn id="19" presetID="1" presetClass="entr" presetSubtype="0" fill="hold" nodeType="withEffect">
                                   <p:stCondLst>
                                     <p:cond delay="0"/>
                                   </p:stCondLst>
                                   <p:childTnLst>
                                     <p:set>
                                       <p:cBhvr>
-                                        <p:cTn id="24" dur="1" fill="hold">
+                                        <p:cTn id="20" dur="1" fill="hold">
                                           <p:stCondLst>
                                             <p:cond delay="0"/>
                                           </p:stCondLst>
@@ -29677,26 +29750,26 @@
                     </p:cTn>
                   </p:par>
                   <p:par>
-                    <p:cTn id="25" fill="hold">
+                    <p:cTn id="21" fill="hold">
                       <p:stCondLst>
                         <p:cond delay="indefinite"/>
                       </p:stCondLst>
                       <p:childTnLst>
                         <p:par>
-                          <p:cTn id="26" fill="hold">
+                          <p:cTn id="22" fill="hold">
                             <p:stCondLst>
                               <p:cond delay="0"/>
                             </p:stCondLst>
                             <p:childTnLst>
                               <p:par>
-                                <p:cTn id="27" presetID="1" presetClass="entr" presetSubtype="0" fill="hold" nodeType="clickEffect">
+                                <p:cTn id="23" presetID="1" presetClass="entr" presetSubtype="0" fill="hold" nodeType="clickEffect">
                                   <p:stCondLst>
                                     <p:cond delay="0"/>
                                   </p:stCondLst>
                                   <p:childTnLst>
                                     <p:set>
                                       <p:cBhvr>
-                                        <p:cTn id="28" dur="1" fill="hold">
+                                        <p:cTn id="24" dur="1" fill="hold">
                                           <p:stCondLst>
                                             <p:cond delay="0"/>
                                           </p:stCondLst>
@@ -29704,7 +29777,7 @@
                                         <p:tgtEl>
                                           <p:spTgt spid="3">
                                             <p:txEl>
-                                              <p:pRg st="7" end="7"/>
+                                              <p:pRg st="6" end="6"/>
                                             </p:txEl>
                                           </p:spTgt>
                                         </p:tgtEl>
@@ -29720,14 +29793,14 @@
                                 </p:cTn>
                               </p:par>
                               <p:par>
-                                <p:cTn id="29" presetID="1" presetClass="entr" presetSubtype="0" fill="hold" nodeType="withEffect">
+                                <p:cTn id="25" presetID="1" presetClass="entr" presetSubtype="0" fill="hold" nodeType="withEffect">
                                   <p:stCondLst>
                                     <p:cond delay="0"/>
                                   </p:stCondLst>
                                   <p:childTnLst>
                                     <p:set>
                                       <p:cBhvr>
-                                        <p:cTn id="30" dur="1" fill="hold">
+                                        <p:cTn id="26" dur="1" fill="hold">
                                           <p:stCondLst>
                                             <p:cond delay="0"/>
                                           </p:stCondLst>
@@ -29753,26 +29826,26 @@
                     </p:cTn>
                   </p:par>
                   <p:par>
-                    <p:cTn id="31" fill="hold">
+                    <p:cTn id="27" fill="hold">
                       <p:stCondLst>
                         <p:cond delay="indefinite"/>
                       </p:stCondLst>
                       <p:childTnLst>
                         <p:par>
-                          <p:cTn id="32" fill="hold">
+                          <p:cTn id="28" fill="hold">
                             <p:stCondLst>
                               <p:cond delay="0"/>
                             </p:stCondLst>
                             <p:childTnLst>
                               <p:par>
-                                <p:cTn id="33" presetID="1" presetClass="entr" presetSubtype="0" fill="hold" nodeType="clickEffect">
+                                <p:cTn id="29" presetID="1" presetClass="entr" presetSubtype="0" fill="hold" nodeType="clickEffect">
                                   <p:stCondLst>
                                     <p:cond delay="0"/>
                                   </p:stCondLst>
                                   <p:childTnLst>
                                     <p:set>
                                       <p:cBhvr>
-                                        <p:cTn id="34" dur="1" fill="hold">
+                                        <p:cTn id="30" dur="1" fill="hold">
                                           <p:stCondLst>
                                             <p:cond delay="0"/>
                                           </p:stCondLst>
@@ -29780,7 +29853,7 @@
                                         <p:tgtEl>
                                           <p:spTgt spid="3">
                                             <p:txEl>
-                                              <p:pRg st="8" end="8"/>
+                                              <p:pRg st="7" end="7"/>
                                             </p:txEl>
                                           </p:spTgt>
                                         </p:tgtEl>
@@ -29796,14 +29869,14 @@
                                 </p:cTn>
                               </p:par>
                               <p:par>
-                                <p:cTn id="35" presetID="1" presetClass="entr" presetSubtype="0" fill="hold" nodeType="withEffect">
+                                <p:cTn id="31" presetID="1" presetClass="entr" presetSubtype="0" fill="hold" nodeType="withEffect">
                                   <p:stCondLst>
                                     <p:cond delay="0"/>
                                   </p:stCondLst>
                                   <p:childTnLst>
                                     <p:set>
                                       <p:cBhvr>
-                                        <p:cTn id="36" dur="1" fill="hold">
+                                        <p:cTn id="32" dur="1" fill="hold">
                                           <p:stCondLst>
                                             <p:cond delay="0"/>
                                           </p:stCondLst>
@@ -30694,11 +30767,27 @@
                   <a:schemeClr val="bg1"/>
                 </a:solidFill>
               </a:rPr>
-              <a:t>контекстен обект</a:t>
+              <a:t>контекстен обект </a:t>
+            </a:r>
+            <a:r>
+              <a:rPr lang="en-US" dirty="0"/>
+              <a:t>(</a:t>
+            </a:r>
+            <a:r>
+              <a:rPr lang="en-US" b="1" dirty="0">
+                <a:solidFill>
+                  <a:schemeClr val="bg1"/>
+                </a:solidFill>
+              </a:rPr>
+              <a:t>DbContext</a:t>
+            </a:r>
+            <a:r>
+              <a:rPr lang="en-US" dirty="0"/>
+              <a:t>)</a:t>
             </a:r>
             <a:r>
               <a:rPr lang="ru-RU" dirty="0"/>
-              <a:t>, който представлява </a:t>
+              <a:t> , който представлява </a:t>
             </a:r>
             <a:r>
               <a:rPr lang="ru-RU" b="1" dirty="0">
@@ -30724,24 +30813,8 @@
               <a:t>Контекстният обект </a:t>
             </a:r>
             <a:r>
-              <a:rPr lang="en-US" dirty="0"/>
-              <a:t>(</a:t>
-            </a:r>
-            <a:r>
-              <a:rPr lang="en-US" b="1" dirty="0">
-                <a:solidFill>
-                  <a:schemeClr val="bg1"/>
-                </a:solidFill>
-              </a:rPr>
-              <a:t>DbContext</a:t>
-            </a:r>
-            <a:r>
-              <a:rPr lang="en-US" dirty="0"/>
-              <a:t>)</a:t>
-            </a:r>
-            <a:r>
               <a:rPr lang="ru-RU" dirty="0"/>
-              <a:t> позволява </a:t>
+              <a:t>позволява </a:t>
             </a:r>
             <a:r>
               <a:rPr lang="ru-RU" b="1" dirty="0">
@@ -30842,7 +30915,7 @@
         </p:blipFill>
         <p:spPr bwMode="auto">
           <a:xfrm>
-            <a:off x="6629400" y="4002888"/>
+            <a:off x="4686300" y="3993067"/>
             <a:ext cx="2819400" cy="2819400"/>
           </a:xfrm>
           <a:prstGeom prst="rect">

</xml_diff>